<commit_message>
Work on fundamentals.Rmd in data-viz-03
</commit_message>
<xml_diff>
--- a/data-viz-03/component/fundamentals.pptx
+++ b/data-viz-03/component/fundamentals.pptx
@@ -5,7 +5,7 @@
     <p:sldMasterId id="2147483648" r:id="rId1"/>
   </p:sldMasterIdLst>
   <p:notesMasterIdLst>
-    <p:NotesMasterId r:id="rId26"/>
+    <p:NotesMasterId r:id="rId29"/>
   </p:notesMasterIdLst>
   <p:sldIdLst>
     <p:sldId id="256" r:id="rId2"/>
@@ -32,6 +32,9 @@
     <p:sldId id="277" r:id="rId23"/>
     <p:sldId id="278" r:id="rId24"/>
     <p:sldId id="279" r:id="rId25"/>
+    <p:sldId id="280" r:id="rId26"/>
+    <p:sldId id="281" r:id="rId27"/>
+    <p:sldId id="282" r:id="rId28"/>
   </p:sldIdLst>
   <p:sldSz cx="9144000" cy="6858000" type="screen4x3"/>
   <p:notesSz cx="6858000" cy="9144000"/>
@@ -1025,6 +1028,1248 @@
             <a:fld id="{18BDFEC3-8487-43E8-A154-7C12CBC1FFF2}" type="slidenum">
               <a:rPr lang="en-US"/>
               <a:t>2</a:t>
+            </a:fld>
+            <a:endParaRPr lang="en-US"/>
+          </a:p>
+        </p:txBody>
+      </p:sp>
+    </p:spTree>
+  </p:cSld>
+</p:notes>
+</file>
+
+<file path=ppt/notesSlides/notesSlide2.xml><?xml version="1.0" encoding="utf-8"?>
+<p:notes xmlns:a="http://schemas.openxmlformats.org/drawingml/2006/main" xmlns:r="http://schemas.openxmlformats.org/officeDocument/2006/relationships" xmlns:p="http://schemas.openxmlformats.org/presentationml/2006/main">
+  <p:cSld>
+    <p:spTree>
+      <p:nvGrpSpPr>
+        <p:cNvPr id="1" name=""/>
+        <p:cNvGrpSpPr/>
+        <p:nvPr/>
+      </p:nvGrpSpPr>
+      <p:grpSpPr>
+        <a:xfrm>
+          <a:off x="0" y="0"/>
+          <a:ext cx="0" cy="0"/>
+          <a:chOff x="0" y="0"/>
+          <a:chExt cx="0" cy="0"/>
+        </a:xfrm>
+      </p:grpSpPr>
+      <p:sp>
+        <p:nvSpPr>
+          <p:cNvPr id="2" name="Slide Image Placeholder 1"/>
+          <p:cNvSpPr>
+            <a:spLocks noGrp="1" noRot="1" noChangeAspect="1"/>
+          </p:cNvSpPr>
+          <p:nvPr>
+            <p:ph type="sldImg"/>
+          </p:nvPr>
+        </p:nvSpPr>
+        <p:spPr/>
+      </p:sp>
+      <p:sp>
+        <p:nvSpPr>
+          <p:cNvPr id="3" name="Notes Placeholder 2"/>
+          <p:cNvSpPr>
+            <a:spLocks noGrp="1"/>
+          </p:cNvSpPr>
+          <p:nvPr>
+            <p:ph type="body" idx="1"/>
+          </p:nvPr>
+        </p:nvSpPr>
+        <p:spPr/>
+        <p:txBody>
+          <a:bodyPr/>
+          <a:lstStyle/>
+          <a:p>
+            <a:pPr lvl="0" marL="0" indent="0">
+              <a:buNone/>
+            </a:pPr>
+            <a:r>
+              <a:rPr/>
+              <a:t>Lines</a:t>
+            </a:r>
+            <a:r>
+              <a:rPr/>
+              <a:t> </a:t>
+            </a:r>
+            <a:r>
+              <a:rPr/>
+              <a:t>can</a:t>
+            </a:r>
+            <a:r>
+              <a:rPr/>
+              <a:t> </a:t>
+            </a:r>
+            <a:r>
+              <a:rPr/>
+              <a:t>change</a:t>
+            </a:r>
+            <a:r>
+              <a:rPr/>
+              <a:t> </a:t>
+            </a:r>
+            <a:r>
+              <a:rPr/>
+              <a:t>size,</a:t>
+            </a:r>
+            <a:r>
+              <a:rPr/>
+              <a:t> </a:t>
+            </a:r>
+            <a:r>
+              <a:rPr/>
+              <a:t>but</a:t>
+            </a:r>
+            <a:r>
+              <a:rPr/>
+              <a:t> </a:t>
+            </a:r>
+            <a:r>
+              <a:rPr/>
+              <a:t>most</a:t>
+            </a:r>
+            <a:r>
+              <a:rPr/>
+              <a:t> </a:t>
+            </a:r>
+            <a:r>
+              <a:rPr/>
+              <a:t>systems</a:t>
+            </a:r>
+            <a:r>
+              <a:rPr/>
+              <a:t> </a:t>
+            </a:r>
+            <a:r>
+              <a:rPr/>
+              <a:t>refer</a:t>
+            </a:r>
+            <a:r>
+              <a:rPr/>
+              <a:t> </a:t>
+            </a:r>
+            <a:r>
+              <a:rPr/>
+              <a:t>to</a:t>
+            </a:r>
+            <a:r>
+              <a:rPr/>
+              <a:t> </a:t>
+            </a:r>
+            <a:r>
+              <a:rPr/>
+              <a:t>this</a:t>
+            </a:r>
+            <a:r>
+              <a:rPr/>
+              <a:t> </a:t>
+            </a:r>
+            <a:r>
+              <a:rPr/>
+              <a:t>as</a:t>
+            </a:r>
+            <a:r>
+              <a:rPr/>
+              <a:t> </a:t>
+            </a:r>
+            <a:r>
+              <a:rPr/>
+              <a:t>line</a:t>
+            </a:r>
+            <a:r>
+              <a:rPr/>
+              <a:t> </a:t>
+            </a:r>
+            <a:r>
+              <a:rPr/>
+              <a:t>width</a:t>
+            </a:r>
+            <a:r>
+              <a:rPr/>
+              <a:t> </a:t>
+            </a:r>
+            <a:r>
+              <a:rPr/>
+              <a:t>rather</a:t>
+            </a:r>
+            <a:r>
+              <a:rPr/>
+              <a:t> </a:t>
+            </a:r>
+            <a:r>
+              <a:rPr/>
+              <a:t>than</a:t>
+            </a:r>
+            <a:r>
+              <a:rPr/>
+              <a:t> </a:t>
+            </a:r>
+            <a:r>
+              <a:rPr/>
+              <a:t>size.</a:t>
+            </a:r>
+          </a:p>
+        </p:txBody>
+      </p:sp>
+      <p:sp>
+        <p:nvSpPr>
+          <p:cNvPr id="4" name="Slide Number Placeholder 3"/>
+          <p:cNvSpPr>
+            <a:spLocks noGrp="1"/>
+          </p:cNvSpPr>
+          <p:nvPr>
+            <p:ph type="sldNum" sz="quarter" idx="10"/>
+          </p:nvPr>
+        </p:nvSpPr>
+        <p:spPr/>
+        <p:txBody>
+          <a:bodyPr/>
+          <a:lstStyle/>
+          <a:p>
+            <a:fld id="{18BDFEC3-8487-43E8-A154-7C12CBC1FFF2}" type="slidenum">
+              <a:rPr lang="en-US"/>
+              <a:t>4</a:t>
+            </a:fld>
+            <a:endParaRPr lang="en-US"/>
+          </a:p>
+        </p:txBody>
+      </p:sp>
+    </p:spTree>
+  </p:cSld>
+</p:notes>
+</file>
+
+<file path=ppt/notesSlides/notesSlide3.xml><?xml version="1.0" encoding="utf-8"?>
+<p:notes xmlns:a="http://schemas.openxmlformats.org/drawingml/2006/main" xmlns:r="http://schemas.openxmlformats.org/officeDocument/2006/relationships" xmlns:p="http://schemas.openxmlformats.org/presentationml/2006/main">
+  <p:cSld>
+    <p:spTree>
+      <p:nvGrpSpPr>
+        <p:cNvPr id="1" name=""/>
+        <p:cNvGrpSpPr/>
+        <p:nvPr/>
+      </p:nvGrpSpPr>
+      <p:grpSpPr>
+        <a:xfrm>
+          <a:off x="0" y="0"/>
+          <a:ext cx="0" cy="0"/>
+          <a:chOff x="0" y="0"/>
+          <a:chExt cx="0" cy="0"/>
+        </a:xfrm>
+      </p:grpSpPr>
+      <p:sp>
+        <p:nvSpPr>
+          <p:cNvPr id="2" name="Slide Image Placeholder 1"/>
+          <p:cNvSpPr>
+            <a:spLocks noGrp="1" noRot="1" noChangeAspect="1"/>
+          </p:cNvSpPr>
+          <p:nvPr>
+            <p:ph type="sldImg"/>
+          </p:nvPr>
+        </p:nvSpPr>
+        <p:spPr/>
+      </p:sp>
+      <p:sp>
+        <p:nvSpPr>
+          <p:cNvPr id="3" name="Notes Placeholder 2"/>
+          <p:cNvSpPr>
+            <a:spLocks noGrp="1"/>
+          </p:cNvSpPr>
+          <p:nvPr>
+            <p:ph type="body" idx="1"/>
+          </p:nvPr>
+        </p:nvSpPr>
+        <p:spPr/>
+        <p:txBody>
+          <a:bodyPr/>
+          <a:lstStyle/>
+          <a:p>
+            <a:pPr lvl="0" marL="0" indent="0">
+              <a:buNone/>
+            </a:pPr>
+            <a:r>
+              <a:rPr/>
+              <a:t>The</a:t>
+            </a:r>
+            <a:r>
+              <a:rPr/>
+              <a:t> </a:t>
+            </a:r>
+            <a:r>
+              <a:rPr/>
+              <a:t>shape</a:t>
+            </a:r>
+            <a:r>
+              <a:rPr/>
+              <a:t> </a:t>
+            </a:r>
+            <a:r>
+              <a:rPr/>
+              <a:t>of</a:t>
+            </a:r>
+            <a:r>
+              <a:rPr/>
+              <a:t> </a:t>
+            </a:r>
+            <a:r>
+              <a:rPr/>
+              <a:t>a</a:t>
+            </a:r>
+            <a:r>
+              <a:rPr/>
+              <a:t> </a:t>
+            </a:r>
+            <a:r>
+              <a:rPr/>
+              <a:t>line</a:t>
+            </a:r>
+            <a:r>
+              <a:rPr/>
+              <a:t> </a:t>
+            </a:r>
+            <a:r>
+              <a:rPr/>
+              <a:t>is</a:t>
+            </a:r>
+            <a:r>
+              <a:rPr/>
+              <a:t> </a:t>
+            </a:r>
+            <a:r>
+              <a:rPr/>
+              <a:t>not</a:t>
+            </a:r>
+            <a:r>
+              <a:rPr/>
+              <a:t> </a:t>
+            </a:r>
+            <a:r>
+              <a:rPr/>
+              <a:t>whether</a:t>
+            </a:r>
+            <a:r>
+              <a:rPr/>
+              <a:t> </a:t>
+            </a:r>
+            <a:r>
+              <a:rPr/>
+              <a:t>it</a:t>
+            </a:r>
+            <a:r>
+              <a:rPr/>
+              <a:t> </a:t>
+            </a:r>
+            <a:r>
+              <a:rPr/>
+              <a:t>is</a:t>
+            </a:r>
+            <a:r>
+              <a:rPr/>
+              <a:t> </a:t>
+            </a:r>
+            <a:r>
+              <a:rPr/>
+              <a:t>curved</a:t>
+            </a:r>
+            <a:r>
+              <a:rPr/>
+              <a:t> </a:t>
+            </a:r>
+            <a:r>
+              <a:rPr/>
+              <a:t>or</a:t>
+            </a:r>
+            <a:r>
+              <a:rPr/>
+              <a:t> </a:t>
+            </a:r>
+            <a:r>
+              <a:rPr/>
+              <a:t>straight.</a:t>
+            </a:r>
+            <a:r>
+              <a:rPr/>
+              <a:t> </a:t>
+            </a:r>
+            <a:r>
+              <a:rPr/>
+              <a:t>The</a:t>
+            </a:r>
+            <a:r>
+              <a:rPr/>
+              <a:t> </a:t>
+            </a:r>
+            <a:r>
+              <a:rPr/>
+              <a:t>shape</a:t>
+            </a:r>
+            <a:r>
+              <a:rPr/>
+              <a:t> </a:t>
+            </a:r>
+            <a:r>
+              <a:rPr/>
+              <a:t>of</a:t>
+            </a:r>
+            <a:r>
+              <a:rPr/>
+              <a:t> </a:t>
+            </a:r>
+            <a:r>
+              <a:rPr/>
+              <a:t>a</a:t>
+            </a:r>
+            <a:r>
+              <a:rPr/>
+              <a:t> </a:t>
+            </a:r>
+            <a:r>
+              <a:rPr/>
+              <a:t>line</a:t>
+            </a:r>
+            <a:r>
+              <a:rPr/>
+              <a:t> </a:t>
+            </a:r>
+            <a:r>
+              <a:rPr/>
+              <a:t>is</a:t>
+            </a:r>
+            <a:r>
+              <a:rPr/>
+              <a:t> </a:t>
+            </a:r>
+            <a:r>
+              <a:rPr/>
+              <a:t>whether</a:t>
+            </a:r>
+            <a:r>
+              <a:rPr/>
+              <a:t> </a:t>
+            </a:r>
+            <a:r>
+              <a:rPr/>
+              <a:t>it</a:t>
+            </a:r>
+            <a:r>
+              <a:rPr/>
+              <a:t> </a:t>
+            </a:r>
+            <a:r>
+              <a:rPr/>
+              <a:t>is</a:t>
+            </a:r>
+            <a:r>
+              <a:rPr/>
+              <a:t> </a:t>
+            </a:r>
+            <a:r>
+              <a:rPr/>
+              <a:t>represented</a:t>
+            </a:r>
+            <a:r>
+              <a:rPr/>
+              <a:t> </a:t>
+            </a:r>
+            <a:r>
+              <a:rPr/>
+              <a:t>using</a:t>
+            </a:r>
+            <a:r>
+              <a:rPr/>
+              <a:t> </a:t>
+            </a:r>
+            <a:r>
+              <a:rPr/>
+              <a:t>solid,</a:t>
+            </a:r>
+            <a:r>
+              <a:rPr/>
+              <a:t> </a:t>
+            </a:r>
+            <a:r>
+              <a:rPr/>
+              <a:t>dashed,</a:t>
+            </a:r>
+            <a:r>
+              <a:rPr/>
+              <a:t> </a:t>
+            </a:r>
+            <a:r>
+              <a:rPr/>
+              <a:t>or</a:t>
+            </a:r>
+            <a:r>
+              <a:rPr/>
+              <a:t> </a:t>
+            </a:r>
+            <a:r>
+              <a:rPr/>
+              <a:t>dotted</a:t>
+            </a:r>
+            <a:r>
+              <a:rPr/>
+              <a:t> </a:t>
+            </a:r>
+            <a:r>
+              <a:rPr/>
+              <a:t>lines.</a:t>
+            </a:r>
+            <a:r>
+              <a:rPr/>
+              <a:t> </a:t>
+            </a:r>
+            <a:r>
+              <a:rPr/>
+              <a:t>Most</a:t>
+            </a:r>
+            <a:r>
+              <a:rPr/>
+              <a:t> </a:t>
+            </a:r>
+            <a:r>
+              <a:rPr/>
+              <a:t>visualizations</a:t>
+            </a:r>
+            <a:r>
+              <a:rPr/>
+              <a:t> </a:t>
+            </a:r>
+            <a:r>
+              <a:rPr/>
+              <a:t>call</a:t>
+            </a:r>
+            <a:r>
+              <a:rPr/>
+              <a:t> </a:t>
+            </a:r>
+            <a:r>
+              <a:rPr/>
+              <a:t>this</a:t>
+            </a:r>
+            <a:r>
+              <a:rPr/>
+              <a:t> </a:t>
+            </a:r>
+            <a:r>
+              <a:rPr/>
+              <a:t>a</a:t>
+            </a:r>
+            <a:r>
+              <a:rPr/>
+              <a:t> </a:t>
+            </a:r>
+            <a:r>
+              <a:rPr/>
+              <a:t>line</a:t>
+            </a:r>
+            <a:r>
+              <a:rPr/>
+              <a:t> </a:t>
+            </a:r>
+            <a:r>
+              <a:rPr/>
+              <a:t>type</a:t>
+            </a:r>
+            <a:r>
+              <a:rPr/>
+              <a:t> </a:t>
+            </a:r>
+            <a:r>
+              <a:rPr/>
+              <a:t>rather</a:t>
+            </a:r>
+            <a:r>
+              <a:rPr/>
+              <a:t> </a:t>
+            </a:r>
+            <a:r>
+              <a:rPr/>
+              <a:t>than</a:t>
+            </a:r>
+            <a:r>
+              <a:rPr/>
+              <a:t> </a:t>
+            </a:r>
+            <a:r>
+              <a:rPr/>
+              <a:t>a</a:t>
+            </a:r>
+            <a:r>
+              <a:rPr/>
+              <a:t> </a:t>
+            </a:r>
+            <a:r>
+              <a:rPr/>
+              <a:t>line</a:t>
+            </a:r>
+            <a:r>
+              <a:rPr/>
+              <a:t> </a:t>
+            </a:r>
+            <a:r>
+              <a:rPr/>
+              <a:t>shape.</a:t>
+            </a:r>
+          </a:p>
+        </p:txBody>
+      </p:sp>
+      <p:sp>
+        <p:nvSpPr>
+          <p:cNvPr id="4" name="Slide Number Placeholder 3"/>
+          <p:cNvSpPr>
+            <a:spLocks noGrp="1"/>
+          </p:cNvSpPr>
+          <p:nvPr>
+            <p:ph type="sldNum" sz="quarter" idx="10"/>
+          </p:nvPr>
+        </p:nvSpPr>
+        <p:spPr/>
+        <p:txBody>
+          <a:bodyPr/>
+          <a:lstStyle/>
+          <a:p>
+            <a:fld id="{18BDFEC3-8487-43E8-A154-7C12CBC1FFF2}" type="slidenum">
+              <a:rPr lang="en-US"/>
+              <a:t>5</a:t>
+            </a:fld>
+            <a:endParaRPr lang="en-US"/>
+          </a:p>
+        </p:txBody>
+      </p:sp>
+    </p:spTree>
+  </p:cSld>
+</p:notes>
+</file>
+
+<file path=ppt/notesSlides/notesSlide4.xml><?xml version="1.0" encoding="utf-8"?>
+<p:notes xmlns:a="http://schemas.openxmlformats.org/drawingml/2006/main" xmlns:r="http://schemas.openxmlformats.org/officeDocument/2006/relationships" xmlns:p="http://schemas.openxmlformats.org/presentationml/2006/main">
+  <p:cSld>
+    <p:spTree>
+      <p:nvGrpSpPr>
+        <p:cNvPr id="1" name=""/>
+        <p:cNvGrpSpPr/>
+        <p:nvPr/>
+      </p:nvGrpSpPr>
+      <p:grpSpPr>
+        <a:xfrm>
+          <a:off x="0" y="0"/>
+          <a:ext cx="0" cy="0"/>
+          <a:chOff x="0" y="0"/>
+          <a:chExt cx="0" cy="0"/>
+        </a:xfrm>
+      </p:grpSpPr>
+      <p:sp>
+        <p:nvSpPr>
+          <p:cNvPr id="2" name="Slide Image Placeholder 1"/>
+          <p:cNvSpPr>
+            <a:spLocks noGrp="1" noRot="1" noChangeAspect="1"/>
+          </p:cNvSpPr>
+          <p:nvPr>
+            <p:ph type="sldImg"/>
+          </p:nvPr>
+        </p:nvSpPr>
+        <p:spPr/>
+      </p:sp>
+      <p:sp>
+        <p:nvSpPr>
+          <p:cNvPr id="3" name="Notes Placeholder 2"/>
+          <p:cNvSpPr>
+            <a:spLocks noGrp="1"/>
+          </p:cNvSpPr>
+          <p:nvPr>
+            <p:ph type="body" idx="1"/>
+          </p:nvPr>
+        </p:nvSpPr>
+        <p:spPr/>
+        <p:txBody>
+          <a:bodyPr/>
+          <a:lstStyle/>
+          <a:p>
+            <a:pPr lvl="0" marL="0" indent="0">
+              <a:buNone/>
+            </a:pPr>
+            <a:r>
+              <a:rPr/>
+              <a:t>If</a:t>
+            </a:r>
+            <a:r>
+              <a:rPr/>
+              <a:t> </a:t>
+            </a:r>
+            <a:r>
+              <a:rPr/>
+              <a:t>you</a:t>
+            </a:r>
+            <a:r>
+              <a:rPr/>
+              <a:t> </a:t>
+            </a:r>
+            <a:r>
+              <a:rPr/>
+              <a:t>have</a:t>
+            </a:r>
+            <a:r>
+              <a:rPr/>
+              <a:t> </a:t>
+            </a:r>
+            <a:r>
+              <a:rPr/>
+              <a:t>a</a:t>
+            </a:r>
+            <a:r>
+              <a:rPr/>
+              <a:t> </a:t>
+            </a:r>
+            <a:r>
+              <a:rPr/>
+              <a:t>lot</a:t>
+            </a:r>
+            <a:r>
+              <a:rPr/>
+              <a:t> </a:t>
+            </a:r>
+            <a:r>
+              <a:rPr/>
+              <a:t>of</a:t>
+            </a:r>
+            <a:r>
+              <a:rPr/>
+              <a:t> </a:t>
+            </a:r>
+            <a:r>
+              <a:rPr/>
+              <a:t>data,</a:t>
+            </a:r>
+            <a:r>
+              <a:rPr/>
+              <a:t> </a:t>
+            </a:r>
+            <a:r>
+              <a:rPr/>
+              <a:t>a</a:t>
+            </a:r>
+            <a:r>
+              <a:rPr/>
+              <a:t> </a:t>
+            </a:r>
+            <a:r>
+              <a:rPr/>
+              <a:t>line</a:t>
+            </a:r>
+            <a:r>
+              <a:rPr/>
+              <a:t> </a:t>
+            </a:r>
+            <a:r>
+              <a:rPr/>
+              <a:t>can</a:t>
+            </a:r>
+            <a:r>
+              <a:rPr/>
+              <a:t> </a:t>
+            </a:r>
+            <a:r>
+              <a:rPr/>
+              <a:t>sometimes</a:t>
+            </a:r>
+            <a:r>
+              <a:rPr/>
+              <a:t> </a:t>
+            </a:r>
+            <a:r>
+              <a:rPr/>
+              <a:t>emphasize</a:t>
+            </a:r>
+            <a:r>
+              <a:rPr/>
+              <a:t> </a:t>
+            </a:r>
+            <a:r>
+              <a:rPr/>
+              <a:t>patterns</a:t>
+            </a:r>
+            <a:r>
+              <a:rPr/>
+              <a:t> </a:t>
+            </a:r>
+            <a:r>
+              <a:rPr/>
+              <a:t>or</a:t>
+            </a:r>
+            <a:r>
+              <a:rPr/>
+              <a:t> </a:t>
+            </a:r>
+            <a:r>
+              <a:rPr/>
+              <a:t>trends</a:t>
+            </a:r>
+            <a:r>
+              <a:rPr/>
+              <a:t> </a:t>
+            </a:r>
+            <a:r>
+              <a:rPr/>
+              <a:t>that</a:t>
+            </a:r>
+            <a:r>
+              <a:rPr/>
+              <a:t> </a:t>
+            </a:r>
+            <a:r>
+              <a:rPr/>
+              <a:t>oyu</a:t>
+            </a:r>
+            <a:r>
+              <a:rPr/>
+              <a:t> </a:t>
+            </a:r>
+            <a:r>
+              <a:rPr/>
+              <a:t>might</a:t>
+            </a:r>
+            <a:r>
+              <a:rPr/>
+              <a:t> </a:t>
+            </a:r>
+            <a:r>
+              <a:rPr/>
+              <a:t>miss</a:t>
+            </a:r>
+            <a:r>
+              <a:rPr/>
+              <a:t> </a:t>
+            </a:r>
+            <a:r>
+              <a:rPr/>
+              <a:t>with</a:t>
+            </a:r>
+            <a:r>
+              <a:rPr/>
+              <a:t> </a:t>
+            </a:r>
+            <a:r>
+              <a:rPr/>
+              <a:t>just</a:t>
+            </a:r>
+            <a:r>
+              <a:rPr/>
+              <a:t> </a:t>
+            </a:r>
+            <a:r>
+              <a:rPr/>
+              <a:t>a</a:t>
+            </a:r>
+            <a:r>
+              <a:rPr/>
+              <a:t> </a:t>
+            </a:r>
+            <a:r>
+              <a:rPr/>
+              <a:t>scatterplot.</a:t>
+            </a:r>
+          </a:p>
+        </p:txBody>
+      </p:sp>
+      <p:sp>
+        <p:nvSpPr>
+          <p:cNvPr id="4" name="Slide Number Placeholder 3"/>
+          <p:cNvSpPr>
+            <a:spLocks noGrp="1"/>
+          </p:cNvSpPr>
+          <p:nvPr>
+            <p:ph type="sldNum" sz="quarter" idx="10"/>
+          </p:nvPr>
+        </p:nvSpPr>
+        <p:spPr/>
+        <p:txBody>
+          <a:bodyPr/>
+          <a:lstStyle/>
+          <a:p>
+            <a:fld id="{18BDFEC3-8487-43E8-A154-7C12CBC1FFF2}" type="slidenum">
+              <a:rPr lang="en-US"/>
+              <a:t>9</a:t>
+            </a:fld>
+            <a:endParaRPr lang="en-US"/>
+          </a:p>
+        </p:txBody>
+      </p:sp>
+    </p:spTree>
+  </p:cSld>
+</p:notes>
+</file>
+
+<file path=ppt/notesSlides/notesSlide5.xml><?xml version="1.0" encoding="utf-8"?>
+<p:notes xmlns:a="http://schemas.openxmlformats.org/drawingml/2006/main" xmlns:r="http://schemas.openxmlformats.org/officeDocument/2006/relationships" xmlns:p="http://schemas.openxmlformats.org/presentationml/2006/main">
+  <p:cSld>
+    <p:spTree>
+      <p:nvGrpSpPr>
+        <p:cNvPr id="1" name=""/>
+        <p:cNvGrpSpPr/>
+        <p:nvPr/>
+      </p:nvGrpSpPr>
+      <p:grpSpPr>
+        <a:xfrm>
+          <a:off x="0" y="0"/>
+          <a:ext cx="0" cy="0"/>
+          <a:chOff x="0" y="0"/>
+          <a:chExt cx="0" cy="0"/>
+        </a:xfrm>
+      </p:grpSpPr>
+      <p:sp>
+        <p:nvSpPr>
+          <p:cNvPr id="2" name="Slide Image Placeholder 1"/>
+          <p:cNvSpPr>
+            <a:spLocks noGrp="1" noRot="1" noChangeAspect="1"/>
+          </p:cNvSpPr>
+          <p:nvPr>
+            <p:ph type="sldImg"/>
+          </p:nvPr>
+        </p:nvSpPr>
+        <p:spPr/>
+      </p:sp>
+      <p:sp>
+        <p:nvSpPr>
+          <p:cNvPr id="3" name="Notes Placeholder 2"/>
+          <p:cNvSpPr>
+            <a:spLocks noGrp="1"/>
+          </p:cNvSpPr>
+          <p:nvPr>
+            <p:ph type="body" idx="1"/>
+          </p:nvPr>
+        </p:nvSpPr>
+        <p:spPr/>
+        <p:txBody>
+          <a:bodyPr/>
+          <a:lstStyle/>
+          <a:p>
+            <a:pPr lvl="0" marL="0" indent="0">
+              <a:buNone/>
+            </a:pPr>
+            <a:r>
+              <a:rPr/>
+              <a:t>This</a:t>
+            </a:r>
+            <a:r>
+              <a:rPr/>
+              <a:t> </a:t>
+            </a:r>
+            <a:r>
+              <a:rPr/>
+              <a:t>image</a:t>
+            </a:r>
+            <a:r>
+              <a:rPr/>
+              <a:t> </a:t>
+            </a:r>
+            <a:r>
+              <a:rPr/>
+              <a:t>replaces</a:t>
+            </a:r>
+            <a:r>
+              <a:rPr/>
+              <a:t> </a:t>
+            </a:r>
+            <a:r>
+              <a:rPr/>
+              <a:t>a</a:t>
+            </a:r>
+            <a:r>
+              <a:rPr/>
+              <a:t> </a:t>
+            </a:r>
+            <a:r>
+              <a:rPr/>
+              <a:t>bunch</a:t>
+            </a:r>
+            <a:r>
+              <a:rPr/>
+              <a:t> </a:t>
+            </a:r>
+            <a:r>
+              <a:rPr/>
+              <a:t>of</a:t>
+            </a:r>
+            <a:r>
+              <a:rPr/>
+              <a:t> </a:t>
+            </a:r>
+            <a:r>
+              <a:rPr/>
+              <a:t>data</a:t>
+            </a:r>
+            <a:r>
+              <a:rPr/>
+              <a:t> </a:t>
+            </a:r>
+            <a:r>
+              <a:rPr/>
+              <a:t>points</a:t>
+            </a:r>
+            <a:r>
+              <a:rPr/>
+              <a:t> </a:t>
+            </a:r>
+            <a:r>
+              <a:rPr/>
+              <a:t>with</a:t>
+            </a:r>
+            <a:r>
+              <a:rPr/>
+              <a:t> </a:t>
+            </a:r>
+            <a:r>
+              <a:rPr/>
+              <a:t>an</a:t>
+            </a:r>
+            <a:r>
+              <a:rPr/>
+              <a:t> </a:t>
+            </a:r>
+            <a:r>
+              <a:rPr/>
+              <a:t>average</a:t>
+            </a:r>
+            <a:r>
+              <a:rPr/>
+              <a:t> </a:t>
+            </a:r>
+            <a:r>
+              <a:rPr/>
+              <a:t>computed</a:t>
+            </a:r>
+            <a:r>
+              <a:rPr/>
+              <a:t> </a:t>
+            </a:r>
+            <a:r>
+              <a:rPr/>
+              <a:t>at</a:t>
+            </a:r>
+            <a:r>
+              <a:rPr/>
+              <a:t> </a:t>
+            </a:r>
+            <a:r>
+              <a:rPr/>
+              <a:t>each</a:t>
+            </a:r>
+            <a:r>
+              <a:rPr/>
+              <a:t> </a:t>
+            </a:r>
+            <a:r>
+              <a:rPr/>
+              <a:t>X-value.</a:t>
+            </a:r>
+          </a:p>
+        </p:txBody>
+      </p:sp>
+      <p:sp>
+        <p:nvSpPr>
+          <p:cNvPr id="4" name="Slide Number Placeholder 3"/>
+          <p:cNvSpPr>
+            <a:spLocks noGrp="1"/>
+          </p:cNvSpPr>
+          <p:nvPr>
+            <p:ph type="sldNum" sz="quarter" idx="10"/>
+          </p:nvPr>
+        </p:nvSpPr>
+        <p:spPr/>
+        <p:txBody>
+          <a:bodyPr/>
+          <a:lstStyle/>
+          <a:p>
+            <a:fld id="{18BDFEC3-8487-43E8-A154-7C12CBC1FFF2}" type="slidenum">
+              <a:rPr lang="en-US"/>
+              <a:t>10</a:t>
+            </a:fld>
+            <a:endParaRPr lang="en-US"/>
+          </a:p>
+        </p:txBody>
+      </p:sp>
+    </p:spTree>
+  </p:cSld>
+</p:notes>
+</file>
+
+<file path=ppt/notesSlides/notesSlide6.xml><?xml version="1.0" encoding="utf-8"?>
+<p:notes xmlns:a="http://schemas.openxmlformats.org/drawingml/2006/main" xmlns:r="http://schemas.openxmlformats.org/officeDocument/2006/relationships" xmlns:p="http://schemas.openxmlformats.org/presentationml/2006/main">
+  <p:cSld>
+    <p:spTree>
+      <p:nvGrpSpPr>
+        <p:cNvPr id="1" name=""/>
+        <p:cNvGrpSpPr/>
+        <p:nvPr/>
+      </p:nvGrpSpPr>
+      <p:grpSpPr>
+        <a:xfrm>
+          <a:off x="0" y="0"/>
+          <a:ext cx="0" cy="0"/>
+          <a:chOff x="0" y="0"/>
+          <a:chExt cx="0" cy="0"/>
+        </a:xfrm>
+      </p:grpSpPr>
+      <p:sp>
+        <p:nvSpPr>
+          <p:cNvPr id="2" name="Slide Image Placeholder 1"/>
+          <p:cNvSpPr>
+            <a:spLocks noGrp="1" noRot="1" noChangeAspect="1"/>
+          </p:cNvSpPr>
+          <p:nvPr>
+            <p:ph type="sldImg"/>
+          </p:nvPr>
+        </p:nvSpPr>
+        <p:spPr/>
+      </p:sp>
+      <p:sp>
+        <p:nvSpPr>
+          <p:cNvPr id="3" name="Notes Placeholder 2"/>
+          <p:cNvSpPr>
+            <a:spLocks noGrp="1"/>
+          </p:cNvSpPr>
+          <p:nvPr>
+            <p:ph type="body" idx="1"/>
+          </p:nvPr>
+        </p:nvSpPr>
+        <p:spPr/>
+        <p:txBody>
+          <a:bodyPr/>
+          <a:lstStyle/>
+          <a:p>
+            <a:pPr lvl="0" marL="0" indent="0">
+              <a:buNone/>
+            </a:pPr>
+            <a:r>
+              <a:rPr/>
+              <a:t>This</a:t>
+            </a:r>
+            <a:r>
+              <a:rPr/>
+              <a:t> </a:t>
+            </a:r>
+            <a:r>
+              <a:rPr/>
+              <a:t>impage</a:t>
+            </a:r>
+            <a:r>
+              <a:rPr/>
+              <a:t> </a:t>
+            </a:r>
+            <a:r>
+              <a:rPr/>
+              <a:t>replaces</a:t>
+            </a:r>
+            <a:r>
+              <a:rPr/>
+              <a:t> </a:t>
+            </a:r>
+            <a:r>
+              <a:rPr/>
+              <a:t>a</a:t>
+            </a:r>
+            <a:r>
+              <a:rPr/>
+              <a:t> </a:t>
+            </a:r>
+            <a:r>
+              <a:rPr/>
+              <a:t>bunch</a:t>
+            </a:r>
+            <a:r>
+              <a:rPr/>
+              <a:t> </a:t>
+            </a:r>
+            <a:r>
+              <a:rPr/>
+              <a:t>of</a:t>
+            </a:r>
+            <a:r>
+              <a:rPr/>
+              <a:t> </a:t>
+            </a:r>
+            <a:r>
+              <a:rPr/>
+              <a:t>data</a:t>
+            </a:r>
+            <a:r>
+              <a:rPr/>
+              <a:t> </a:t>
+            </a:r>
+            <a:r>
+              <a:rPr/>
+              <a:t>points</a:t>
+            </a:r>
+            <a:r>
+              <a:rPr/>
+              <a:t> </a:t>
+            </a:r>
+            <a:r>
+              <a:rPr/>
+              <a:t>with</a:t>
+            </a:r>
+            <a:r>
+              <a:rPr/>
+              <a:t> </a:t>
+            </a:r>
+            <a:r>
+              <a:rPr/>
+              <a:t>the</a:t>
+            </a:r>
+            <a:r>
+              <a:rPr/>
+              <a:t> </a:t>
+            </a:r>
+            <a:r>
+              <a:rPr/>
+              <a:t>count</a:t>
+            </a:r>
+            <a:r>
+              <a:rPr/>
+              <a:t> </a:t>
+            </a:r>
+            <a:r>
+              <a:rPr/>
+              <a:t>at</a:t>
+            </a:r>
+            <a:r>
+              <a:rPr/>
+              <a:t> </a:t>
+            </a:r>
+            <a:r>
+              <a:rPr/>
+              <a:t>each</a:t>
+            </a:r>
+            <a:r>
+              <a:rPr/>
+              <a:t> </a:t>
+            </a:r>
+            <a:r>
+              <a:rPr/>
+              <a:t>x-value.</a:t>
+            </a:r>
+          </a:p>
+        </p:txBody>
+      </p:sp>
+      <p:sp>
+        <p:nvSpPr>
+          <p:cNvPr id="4" name="Slide Number Placeholder 3"/>
+          <p:cNvSpPr>
+            <a:spLocks noGrp="1"/>
+          </p:cNvSpPr>
+          <p:nvPr>
+            <p:ph type="sldNum" sz="quarter" idx="10"/>
+          </p:nvPr>
+        </p:nvSpPr>
+        <p:spPr/>
+        <p:txBody>
+          <a:bodyPr/>
+          <a:lstStyle/>
+          <a:p>
+            <a:fld id="{18BDFEC3-8487-43E8-A154-7C12CBC1FFF2}" type="slidenum">
+              <a:rPr lang="en-US"/>
+              <a:t>11</a:t>
             </a:fld>
             <a:endParaRPr lang="en-US"/>
           </a:p>
@@ -4048,7 +5293,15 @@
             </a:pPr>
             <a:r>
               <a:rPr/>
-              <a:t>Data-viz-03,</a:t>
+              <a:t>Line</a:t>
+            </a:r>
+            <a:r>
+              <a:rPr/>
+              <a:t> </a:t>
+            </a:r>
+            <a:r>
+              <a:rPr/>
+              <a:t>graphs,</a:t>
             </a:r>
             <a:r>
               <a:rPr/>
@@ -4176,6 +5429,14 @@
             </a:pPr>
             <a:r>
               <a:rPr/>
+              <a:t>Fundamentals,</a:t>
+            </a:r>
+            <a:r>
+              <a:rPr/>
+              <a:t> </a:t>
+            </a:r>
+            <a:r>
+              <a:rPr/>
               <a:t>Lines</a:t>
             </a:r>
             <a:r>
@@ -4206,7 +5467,7 @@
           <p:nvPr/>
         </p:nvPicPr>
         <p:blipFill>
-          <a:blip r:embed="rId2"/>
+          <a:blip r:embed="rId3"/>
           <a:stretch>
             <a:fillRect/>
           </a:stretch>
@@ -4269,6 +5530,14 @@
             </a:pPr>
             <a:r>
               <a:rPr/>
+              <a:t>Fundamentals,</a:t>
+            </a:r>
+            <a:r>
+              <a:rPr/>
+              <a:t> </a:t>
+            </a:r>
+            <a:r>
+              <a:rPr/>
               <a:t>Lines</a:t>
             </a:r>
             <a:r>
@@ -4299,7 +5568,7 @@
           <p:nvPr/>
         </p:nvPicPr>
         <p:blipFill>
-          <a:blip r:embed="rId2"/>
+          <a:blip r:embed="rId3"/>
           <a:stretch>
             <a:fillRect/>
           </a:stretch>
@@ -4362,6 +5631,14 @@
             </a:pPr>
             <a:r>
               <a:rPr/>
+              <a:t>Fundamentals,</a:t>
+            </a:r>
+            <a:r>
+              <a:rPr/>
+              <a:t> </a:t>
+            </a:r>
+            <a:r>
+              <a:rPr/>
               <a:t>On</a:t>
             </a:r>
             <a:r>
@@ -4448,6 +5725,14 @@
             </a:pPr>
             <a:r>
               <a:rPr/>
+              <a:t>Fundamentals,</a:t>
+            </a:r>
+            <a:r>
+              <a:rPr/>
+              <a:t> </a:t>
+            </a:r>
+            <a:r>
+              <a:rPr/>
               <a:t>Wait</a:t>
             </a:r>
             <a:r>
@@ -4536,6 +5821,14 @@
             </a:pPr>
             <a:r>
               <a:rPr/>
+              <a:t>Fundamentals,</a:t>
+            </a:r>
+            <a:r>
+              <a:rPr/>
+              <a:t> </a:t>
+            </a:r>
+            <a:r>
+              <a:rPr/>
               <a:t>What</a:t>
             </a:r>
             <a:r>
@@ -4648,32 +5941,23 @@
             </a:pPr>
             <a:r>
               <a:rPr/>
-              <a:t>Boxplots</a:t>
-            </a:r>
-          </a:p>
-        </p:txBody>
-      </p:sp>
-      <p:sp>
-        <p:nvSpPr>
-          <p:cNvPr id="3" name="Content Placeholder 2"/>
-          <p:cNvSpPr>
-            <a:spLocks noGrp="1"/>
-          </p:cNvSpPr>
-          <p:nvPr>
-            <p:ph idx="1"/>
-          </p:nvPr>
-        </p:nvSpPr>
-        <p:spPr/>
-        <p:txBody>
-          <a:bodyPr/>
-          <a:lstStyle/>
-          <a:p>
-            <a:pPr lvl="0" marL="0" indent="0">
-              <a:buNone/>
-            </a:pPr>
-            <a:r>
-              <a:rPr/>
-              <a:t>((Draw example and ask students to do a similar example))</a:t>
+              <a:t>Fundamentals,</a:t>
+            </a:r>
+            <a:r>
+              <a:rPr/>
+              <a:t> </a:t>
+            </a:r>
+            <a:r>
+              <a:rPr/>
+              <a:t>Error</a:t>
+            </a:r>
+            <a:r>
+              <a:rPr/>
+              <a:t> </a:t>
+            </a:r>
+            <a:r>
+              <a:rPr/>
+              <a:t>bars</a:t>
             </a:r>
           </a:p>
         </p:txBody>
@@ -4720,57 +6004,27 @@
             </a:pPr>
             <a:r>
               <a:rPr/>
-              <a:t>Trend</a:t>
-            </a:r>
-            <a:r>
-              <a:rPr/>
-              <a:t> </a:t>
-            </a:r>
-            <a:r>
-              <a:rPr/>
-              <a:t>lines</a:t>
-            </a:r>
-            <a:r>
-              <a:rPr/>
-              <a:t> </a:t>
-            </a:r>
-            <a:r>
-              <a:rPr/>
-              <a:t>(linear)</a:t>
-            </a:r>
-          </a:p>
-        </p:txBody>
-      </p:sp>
-      <p:pic>
-        <p:nvPicPr>
-          <p:cNvPr descr="../images/r/linear-trend-age.png" id="0" name="Picture 1"/>
-          <p:cNvPicPr>
-            <a:picLocks noGrp="1" noChangeAspect="1"/>
-          </p:cNvPicPr>
-          <p:nvPr/>
-        </p:nvPicPr>
-        <p:blipFill>
-          <a:blip r:embed="rId2"/>
-          <a:stretch>
-            <a:fillRect/>
-          </a:stretch>
-        </p:blipFill>
-        <p:spPr bwMode="auto">
-          <a:xfrm>
-            <a:off x="2311400" y="1600200"/>
-            <a:ext cx="4521200" cy="4521200"/>
-          </a:xfrm>
-          <a:prstGeom prst="rect">
-            <a:avLst/>
-          </a:prstGeom>
-          <a:noFill/>
-          <a:ln w="9525">
-            <a:noFill/>
-            <a:headEnd/>
-            <a:tailEnd/>
-          </a:ln>
-        </p:spPr>
-      </p:pic>
+              <a:t>Fundamentals,</a:t>
+            </a:r>
+            <a:r>
+              <a:rPr/>
+              <a:t> </a:t>
+            </a:r>
+            <a:r>
+              <a:rPr/>
+              <a:t>high-low</a:t>
+            </a:r>
+            <a:r>
+              <a:rPr/>
+              <a:t> </a:t>
+            </a:r>
+            <a:r>
+              <a:rPr/>
+              <a:t>bars</a:t>
+            </a:r>
+          </a:p>
+        </p:txBody>
+      </p:sp>
     </p:spTree>
   </p:cSld>
 </p:sld>
@@ -4813,57 +6067,44 @@
             </a:pPr>
             <a:r>
               <a:rPr/>
-              <a:t>Trend</a:t>
-            </a:r>
-            <a:r>
-              <a:rPr/>
-              <a:t> </a:t>
-            </a:r>
-            <a:r>
-              <a:rPr/>
-              <a:t>lines</a:t>
-            </a:r>
-            <a:r>
-              <a:rPr/>
-              <a:t> </a:t>
-            </a:r>
-            <a:r>
-              <a:rPr/>
-              <a:t>(spline)</a:t>
-            </a:r>
-          </a:p>
-        </p:txBody>
-      </p:sp>
-      <p:pic>
-        <p:nvPicPr>
-          <p:cNvPr descr="../images/r/smooth-trend.png" id="0" name="Picture 1"/>
-          <p:cNvPicPr>
-            <a:picLocks noGrp="1" noChangeAspect="1"/>
-          </p:cNvPicPr>
-          <p:nvPr/>
-        </p:nvPicPr>
-        <p:blipFill>
-          <a:blip r:embed="rId2"/>
-          <a:stretch>
-            <a:fillRect/>
-          </a:stretch>
-        </p:blipFill>
-        <p:spPr bwMode="auto">
-          <a:xfrm>
-            <a:off x="2311400" y="1600200"/>
-            <a:ext cx="4521200" cy="4521200"/>
-          </a:xfrm>
-          <a:prstGeom prst="rect">
-            <a:avLst/>
-          </a:prstGeom>
-          <a:noFill/>
-          <a:ln w="9525">
-            <a:noFill/>
-            <a:headEnd/>
-            <a:tailEnd/>
-          </a:ln>
-        </p:spPr>
-      </p:pic>
+              <a:t>Fundamentals,</a:t>
+            </a:r>
+            <a:r>
+              <a:rPr/>
+              <a:t> </a:t>
+            </a:r>
+            <a:r>
+              <a:rPr/>
+              <a:t>Boxplots</a:t>
+            </a:r>
+          </a:p>
+        </p:txBody>
+      </p:sp>
+      <p:sp>
+        <p:nvSpPr>
+          <p:cNvPr id="3" name="Content Placeholder 2"/>
+          <p:cNvSpPr>
+            <a:spLocks noGrp="1"/>
+          </p:cNvSpPr>
+          <p:nvPr>
+            <p:ph idx="1"/>
+          </p:nvPr>
+        </p:nvSpPr>
+        <p:spPr/>
+        <p:txBody>
+          <a:bodyPr/>
+          <a:lstStyle/>
+          <a:p>
+            <a:pPr lvl="0" marL="0" indent="0">
+              <a:buNone/>
+            </a:pPr>
+            <a:r>
+              <a:rPr/>
+              <a:t>((Draw example and ask students to do a similar example))</a:t>
+            </a:r>
+          </a:p>
+        </p:txBody>
+      </p:sp>
     </p:spTree>
   </p:cSld>
 </p:sld>
@@ -4906,6 +6147,14 @@
             </a:pPr>
             <a:r>
               <a:rPr/>
+              <a:t>Fundamentals,</a:t>
+            </a:r>
+            <a:r>
+              <a:rPr/>
+              <a:t> </a:t>
+            </a:r>
+            <a:r>
+              <a:rPr/>
               <a:t>Trend</a:t>
             </a:r>
             <a:r>
@@ -4922,38 +6171,14 @@
             </a:r>
             <a:r>
               <a:rPr/>
-              <a:t>(spline),</a:t>
-            </a:r>
-            <a:r>
-              <a:rPr/>
-              <a:t> </a:t>
-            </a:r>
-            <a:r>
-              <a:rPr/>
-              <a:t>not</a:t>
-            </a:r>
-            <a:r>
-              <a:rPr/>
-              <a:t> </a:t>
-            </a:r>
-            <a:r>
-              <a:rPr/>
-              <a:t>so</a:t>
-            </a:r>
-            <a:r>
-              <a:rPr/>
-              <a:t> </a:t>
-            </a:r>
-            <a:r>
-              <a:rPr/>
-              <a:t>smooth</a:t>
+              <a:t>(linear)</a:t>
             </a:r>
           </a:p>
         </p:txBody>
       </p:sp>
       <p:pic>
         <p:nvPicPr>
-          <p:cNvPr descr="../images/r/smooth-trend-3.png" id="0" name="Picture 1"/>
+          <p:cNvPr descr="../images/r/linear-trend-age.png" id="0" name="Picture 1"/>
           <p:cNvPicPr>
             <a:picLocks noGrp="1" noChangeAspect="1"/>
           </p:cNvPicPr>
@@ -5023,57 +6248,65 @@
             </a:pPr>
             <a:r>
               <a:rPr/>
-              <a:t>On</a:t>
-            </a:r>
-            <a:r>
-              <a:rPr/>
-              <a:t> </a:t>
-            </a:r>
-            <a:r>
-              <a:rPr/>
-              <a:t>your</a:t>
-            </a:r>
-            <a:r>
-              <a:rPr/>
-              <a:t> </a:t>
-            </a:r>
-            <a:r>
-              <a:rPr/>
-              <a:t>own</a:t>
-            </a:r>
-          </a:p>
-        </p:txBody>
-      </p:sp>
-      <p:sp>
-        <p:nvSpPr>
-          <p:cNvPr id="3" name="Content Placeholder 2"/>
-          <p:cNvSpPr>
-            <a:spLocks noGrp="1"/>
-          </p:cNvSpPr>
-          <p:nvPr>
-            <p:ph idx="1"/>
-          </p:nvPr>
-        </p:nvSpPr>
-        <p:spPr/>
-        <p:txBody>
-          <a:bodyPr/>
-          <a:lstStyle/>
-          <a:p>
-            <a:pPr lvl="1"/>
-            <a:r>
-              <a:rPr/>
-              <a:t>Fit a linear trend line looking at Living.Area versus Price.</a:t>
-            </a:r>
-          </a:p>
-          <a:p>
-            <a:pPr lvl="1"/>
-            <a:r>
-              <a:rPr/>
-              <a:t>Fit a smooth curve</a:t>
-            </a:r>
-          </a:p>
-        </p:txBody>
-      </p:sp>
+              <a:t>Fundamentals,</a:t>
+            </a:r>
+            <a:r>
+              <a:rPr/>
+              <a:t> </a:t>
+            </a:r>
+            <a:r>
+              <a:rPr/>
+              <a:t>Trend</a:t>
+            </a:r>
+            <a:r>
+              <a:rPr/>
+              <a:t> </a:t>
+            </a:r>
+            <a:r>
+              <a:rPr/>
+              <a:t>lines</a:t>
+            </a:r>
+            <a:r>
+              <a:rPr/>
+              <a:t> </a:t>
+            </a:r>
+            <a:r>
+              <a:rPr/>
+              <a:t>(spline)</a:t>
+            </a:r>
+          </a:p>
+        </p:txBody>
+      </p:sp>
+      <p:pic>
+        <p:nvPicPr>
+          <p:cNvPr descr="../images/r/smooth-trend.png" id="0" name="Picture 1"/>
+          <p:cNvPicPr>
+            <a:picLocks noGrp="1" noChangeAspect="1"/>
+          </p:cNvPicPr>
+          <p:nvPr/>
+        </p:nvPicPr>
+        <p:blipFill>
+          <a:blip r:embed="rId2"/>
+          <a:stretch>
+            <a:fillRect/>
+          </a:stretch>
+        </p:blipFill>
+        <p:spPr bwMode="auto">
+          <a:xfrm>
+            <a:off x="2311400" y="1600200"/>
+            <a:ext cx="4521200" cy="4521200"/>
+          </a:xfrm>
+          <a:prstGeom prst="rect">
+            <a:avLst/>
+          </a:prstGeom>
+          <a:noFill/>
+          <a:ln w="9525">
+            <a:noFill/>
+            <a:headEnd/>
+            <a:tailEnd/>
+          </a:ln>
+        </p:spPr>
+      </p:pic>
     </p:spTree>
   </p:cSld>
 </p:sld>
@@ -5116,6 +6349,14 @@
             </a:pPr>
             <a:r>
               <a:rPr/>
+              <a:t>Fundamentals,</a:t>
+            </a:r>
+            <a:r>
+              <a:rPr/>
+              <a:t> </a:t>
+            </a:r>
+            <a:r>
+              <a:rPr/>
               <a:t>Aesthetics</a:t>
             </a:r>
             <a:r>
@@ -5223,33 +6464,243 @@
             </a:pPr>
             <a:r>
               <a:rPr/>
-              <a:t>Wait</a:t>
-            </a:r>
-            <a:r>
-              <a:rPr/>
-              <a:t> </a:t>
-            </a:r>
-            <a:r>
-              <a:rPr/>
-              <a:t>before</a:t>
-            </a:r>
-            <a:r>
-              <a:rPr/>
-              <a:t> </a:t>
-            </a:r>
-            <a:r>
-              <a:rPr/>
-              <a:t>showing</a:t>
-            </a:r>
-          </a:p>
-        </p:txBody>
-      </p:sp>
+              <a:t>Trend</a:t>
+            </a:r>
+            <a:r>
+              <a:rPr/>
+              <a:t> </a:t>
+            </a:r>
+            <a:r>
+              <a:rPr/>
+              <a:t>lines</a:t>
+            </a:r>
+            <a:r>
+              <a:rPr/>
+              <a:t> </a:t>
+            </a:r>
+            <a:r>
+              <a:rPr/>
+              <a:t>(spline),</a:t>
+            </a:r>
+            <a:r>
+              <a:rPr/>
+              <a:t> </a:t>
+            </a:r>
+            <a:r>
+              <a:rPr/>
+              <a:t>not</a:t>
+            </a:r>
+            <a:r>
+              <a:rPr/>
+              <a:t> </a:t>
+            </a:r>
+            <a:r>
+              <a:rPr/>
+              <a:t>so</a:t>
+            </a:r>
+            <a:r>
+              <a:rPr/>
+              <a:t> </a:t>
+            </a:r>
+            <a:r>
+              <a:rPr/>
+              <a:t>smooth</a:t>
+            </a:r>
+          </a:p>
+        </p:txBody>
+      </p:sp>
+      <p:pic>
+        <p:nvPicPr>
+          <p:cNvPr descr="../images/r/smooth-trend-3.png" id="0" name="Picture 1"/>
+          <p:cNvPicPr>
+            <a:picLocks noGrp="1" noChangeAspect="1"/>
+          </p:cNvPicPr>
+          <p:nvPr/>
+        </p:nvPicPr>
+        <p:blipFill>
+          <a:blip r:embed="rId2"/>
+          <a:stretch>
+            <a:fillRect/>
+          </a:stretch>
+        </p:blipFill>
+        <p:spPr bwMode="auto">
+          <a:xfrm>
+            <a:off x="2311400" y="1600200"/>
+            <a:ext cx="4521200" cy="4521200"/>
+          </a:xfrm>
+          <a:prstGeom prst="rect">
+            <a:avLst/>
+          </a:prstGeom>
+          <a:noFill/>
+          <a:ln w="9525">
+            <a:noFill/>
+            <a:headEnd/>
+            <a:tailEnd/>
+          </a:ln>
+        </p:spPr>
+      </p:pic>
     </p:spTree>
   </p:cSld>
 </p:sld>
 </file>
 
 <file path=ppt/slides/slide21.xml><?xml version="1.0" encoding="utf-8"?>
+<p:sld xmlns:a="http://schemas.openxmlformats.org/drawingml/2006/main" xmlns:r="http://schemas.openxmlformats.org/officeDocument/2006/relationships" xmlns:p="http://schemas.openxmlformats.org/presentationml/2006/main">
+  <p:cSld>
+    <p:spTree>
+      <p:nvGrpSpPr>
+        <p:cNvPr id="1" name=""/>
+        <p:cNvGrpSpPr/>
+        <p:nvPr/>
+      </p:nvGrpSpPr>
+      <p:grpSpPr>
+        <a:xfrm>
+          <a:off x="0" y="0"/>
+          <a:ext cx="0" cy="0"/>
+          <a:chOff x="0" y="0"/>
+          <a:chExt cx="0" cy="0"/>
+        </a:xfrm>
+      </p:grpSpPr>
+      <p:sp>
+        <p:nvSpPr>
+          <p:cNvPr id="2" name="Title 1"/>
+          <p:cNvSpPr>
+            <a:spLocks noGrp="1"/>
+          </p:cNvSpPr>
+          <p:nvPr>
+            <p:ph type="title"/>
+          </p:nvPr>
+        </p:nvSpPr>
+        <p:spPr/>
+        <p:txBody>
+          <a:bodyPr/>
+          <a:lstStyle/>
+          <a:p>
+            <a:pPr lvl="0" marL="0" indent="0">
+              <a:buNone/>
+            </a:pPr>
+            <a:r>
+              <a:rPr/>
+              <a:t>On</a:t>
+            </a:r>
+            <a:r>
+              <a:rPr/>
+              <a:t> </a:t>
+            </a:r>
+            <a:r>
+              <a:rPr/>
+              <a:t>your</a:t>
+            </a:r>
+            <a:r>
+              <a:rPr/>
+              <a:t> </a:t>
+            </a:r>
+            <a:r>
+              <a:rPr/>
+              <a:t>own</a:t>
+            </a:r>
+          </a:p>
+        </p:txBody>
+      </p:sp>
+      <p:sp>
+        <p:nvSpPr>
+          <p:cNvPr id="3" name="Content Placeholder 2"/>
+          <p:cNvSpPr>
+            <a:spLocks noGrp="1"/>
+          </p:cNvSpPr>
+          <p:nvPr>
+            <p:ph idx="1"/>
+          </p:nvPr>
+        </p:nvSpPr>
+        <p:spPr/>
+        <p:txBody>
+          <a:bodyPr/>
+          <a:lstStyle/>
+          <a:p>
+            <a:pPr lvl="1"/>
+            <a:r>
+              <a:rPr/>
+              <a:t>Fit a linear trend line looking at Living.Area versus Price.</a:t>
+            </a:r>
+          </a:p>
+          <a:p>
+            <a:pPr lvl="1"/>
+            <a:r>
+              <a:rPr/>
+              <a:t>Fit a smooth curve</a:t>
+            </a:r>
+          </a:p>
+        </p:txBody>
+      </p:sp>
+    </p:spTree>
+  </p:cSld>
+</p:sld>
+</file>
+
+<file path=ppt/slides/slide22.xml><?xml version="1.0" encoding="utf-8"?>
+<p:sld xmlns:a="http://schemas.openxmlformats.org/drawingml/2006/main" xmlns:r="http://schemas.openxmlformats.org/officeDocument/2006/relationships" xmlns:p="http://schemas.openxmlformats.org/presentationml/2006/main">
+  <p:cSld>
+    <p:spTree>
+      <p:nvGrpSpPr>
+        <p:cNvPr id="1" name=""/>
+        <p:cNvGrpSpPr/>
+        <p:nvPr/>
+      </p:nvGrpSpPr>
+      <p:grpSpPr>
+        <a:xfrm>
+          <a:off x="0" y="0"/>
+          <a:ext cx="0" cy="0"/>
+          <a:chOff x="0" y="0"/>
+          <a:chExt cx="0" cy="0"/>
+        </a:xfrm>
+      </p:grpSpPr>
+      <p:sp>
+        <p:nvSpPr>
+          <p:cNvPr id="2" name="Title 1"/>
+          <p:cNvSpPr>
+            <a:spLocks noGrp="1"/>
+          </p:cNvSpPr>
+          <p:nvPr>
+            <p:ph type="title"/>
+          </p:nvPr>
+        </p:nvSpPr>
+        <p:spPr/>
+        <p:txBody>
+          <a:bodyPr/>
+          <a:lstStyle/>
+          <a:p>
+            <a:pPr lvl="0" marL="0" indent="0">
+              <a:buNone/>
+            </a:pPr>
+            <a:r>
+              <a:rPr/>
+              <a:t>Wait</a:t>
+            </a:r>
+            <a:r>
+              <a:rPr/>
+              <a:t> </a:t>
+            </a:r>
+            <a:r>
+              <a:rPr/>
+              <a:t>before</a:t>
+            </a:r>
+            <a:r>
+              <a:rPr/>
+              <a:t> </a:t>
+            </a:r>
+            <a:r>
+              <a:rPr/>
+              <a:t>showing</a:t>
+            </a:r>
+          </a:p>
+        </p:txBody>
+      </p:sp>
+    </p:spTree>
+  </p:cSld>
+</p:sld>
+</file>
+
+<file path=ppt/slides/slide23.xml><?xml version="1.0" encoding="utf-8"?>
 <p:sld xmlns:a="http://schemas.openxmlformats.org/drawingml/2006/main" xmlns:r="http://schemas.openxmlformats.org/officeDocument/2006/relationships" xmlns:p="http://schemas.openxmlformats.org/presentationml/2006/main">
   <p:cSld>
     <p:spTree>
@@ -5366,7 +6817,7 @@
 </p:sld>
 </file>
 
-<file path=ppt/slides/slide22.xml><?xml version="1.0" encoding="utf-8"?>
+<file path=ppt/slides/slide24.xml><?xml version="1.0" encoding="utf-8"?>
 <p:sld xmlns:a="http://schemas.openxmlformats.org/drawingml/2006/main" xmlns:r="http://schemas.openxmlformats.org/officeDocument/2006/relationships" xmlns:p="http://schemas.openxmlformats.org/presentationml/2006/main">
   <p:cSld>
     <p:spTree>
@@ -5483,7 +6934,7 @@
 </p:sld>
 </file>
 
-<file path=ppt/slides/slide23.xml><?xml version="1.0" encoding="utf-8"?>
+<file path=ppt/slides/slide25.xml><?xml version="1.0" encoding="utf-8"?>
 <p:sld xmlns:a="http://schemas.openxmlformats.org/drawingml/2006/main" xmlns:r="http://schemas.openxmlformats.org/officeDocument/2006/relationships" xmlns:p="http://schemas.openxmlformats.org/presentationml/2006/main">
   <p:cSld>
     <p:spTree>
@@ -5571,7 +7022,7 @@
 </p:sld>
 </file>
 
-<file path=ppt/slides/slide24.xml><?xml version="1.0" encoding="utf-8"?>
+<file path=ppt/slides/slide26.xml><?xml version="1.0" encoding="utf-8"?>
 <p:sld xmlns:a="http://schemas.openxmlformats.org/drawingml/2006/main" xmlns:r="http://schemas.openxmlformats.org/officeDocument/2006/relationships" xmlns:p="http://schemas.openxmlformats.org/presentationml/2006/main">
   <p:cSld>
     <p:spTree>
@@ -5642,6 +7093,69 @@
             <a:r>
               <a:rPr/>
               <a:t>((Add three or four slides here. Maybe talk about opacity.))</a:t>
+            </a:r>
+          </a:p>
+        </p:txBody>
+      </p:sp>
+    </p:spTree>
+  </p:cSld>
+</p:sld>
+</file>
+
+<file path=ppt/slides/slide27.xml><?xml version="1.0" encoding="utf-8"?>
+<p:sld xmlns:a="http://schemas.openxmlformats.org/drawingml/2006/main" xmlns:r="http://schemas.openxmlformats.org/officeDocument/2006/relationships" xmlns:p="http://schemas.openxmlformats.org/presentationml/2006/main">
+  <p:cSld>
+    <p:spTree>
+      <p:nvGrpSpPr>
+        <p:cNvPr id="1" name=""/>
+        <p:cNvGrpSpPr/>
+        <p:nvPr/>
+      </p:nvGrpSpPr>
+      <p:grpSpPr>
+        <a:xfrm>
+          <a:off x="0" y="0"/>
+          <a:ext cx="0" cy="0"/>
+          <a:chOff x="0" y="0"/>
+          <a:chExt cx="0" cy="0"/>
+        </a:xfrm>
+      </p:grpSpPr>
+      <p:sp>
+        <p:nvSpPr>
+          <p:cNvPr id="2" name="Title 1"/>
+          <p:cNvSpPr>
+            <a:spLocks noGrp="1"/>
+          </p:cNvSpPr>
+          <p:nvPr>
+            <p:ph type="title"/>
+          </p:nvPr>
+        </p:nvSpPr>
+        <p:spPr/>
+        <p:txBody>
+          <a:bodyPr/>
+          <a:lstStyle/>
+          <a:p>
+            <a:pPr lvl="0" marL="0" indent="0">
+              <a:buNone/>
+            </a:pPr>
+            <a:r>
+              <a:rPr/>
+              <a:t>Families</a:t>
+            </a:r>
+            <a:r>
+              <a:rPr/>
+              <a:t> </a:t>
+            </a:r>
+            <a:r>
+              <a:rPr/>
+              <a:t>of</a:t>
+            </a:r>
+            <a:r>
+              <a:rPr/>
+              <a:t> </a:t>
+            </a:r>
+            <a:r>
+              <a:rPr/>
+              <a:t>lines</a:t>
             </a:r>
           </a:p>
         </p:txBody>
@@ -5688,6 +7202,14 @@
             </a:pPr>
             <a:r>
               <a:rPr/>
+              <a:t>Fundamentals,</a:t>
+            </a:r>
+            <a:r>
+              <a:rPr/>
+              <a:t> </a:t>
+            </a:r>
+            <a:r>
+              <a:rPr/>
               <a:t>Show</a:t>
             </a:r>
             <a:r>
@@ -5761,7 +7283,7 @@
             </a:pPr>
             <a:r>
               <a:rPr/>
-              <a:t>((Show a curved line, a straight line, a line segment, a series of line segments, and a polygon.))</a:t>
+              <a:t>((Show a curved line, a straight line, a line segment, a series of line segments, and a polygon. Show the code to create these.))</a:t>
             </a:r>
           </a:p>
         </p:txBody>
@@ -5808,6 +7330,14 @@
             </a:pPr>
             <a:r>
               <a:rPr/>
+              <a:t>Fundamentals,</a:t>
+            </a:r>
+            <a:r>
+              <a:rPr/>
+              <a:t> </a:t>
+            </a:r>
+            <a:r>
+              <a:rPr/>
               <a:t>Size</a:t>
             </a:r>
           </a:p>
@@ -5822,7 +7352,7 @@
           <p:nvPr/>
         </p:nvPicPr>
         <p:blipFill>
-          <a:blip r:embed="rId2"/>
+          <a:blip r:embed="rId3"/>
           <a:stretch>
             <a:fillRect/>
           </a:stretch>
@@ -5885,6 +7415,14 @@
             </a:pPr>
             <a:r>
               <a:rPr/>
+              <a:t>Fundamentals,</a:t>
+            </a:r>
+            <a:r>
+              <a:rPr/>
+              <a:t> </a:t>
+            </a:r>
+            <a:r>
+              <a:rPr/>
               <a:t>Shape</a:t>
             </a:r>
           </a:p>
@@ -5899,7 +7437,7 @@
           <p:nvPr/>
         </p:nvPicPr>
         <p:blipFill>
-          <a:blip r:embed="rId2"/>
+          <a:blip r:embed="rId3"/>
           <a:stretch>
             <a:fillRect/>
           </a:stretch>
@@ -5962,6 +7500,14 @@
             </a:pPr>
             <a:r>
               <a:rPr/>
+              <a:t>Fundamentals,</a:t>
+            </a:r>
+            <a:r>
+              <a:rPr/>
+              <a:t> </a:t>
+            </a:r>
+            <a:r>
+              <a:rPr/>
               <a:t>On</a:t>
             </a:r>
             <a:r>
@@ -6062,6 +7608,14 @@
             </a:pPr>
             <a:r>
               <a:rPr/>
+              <a:t>Fundamentals,</a:t>
+            </a:r>
+            <a:r>
+              <a:rPr/>
+              <a:t> </a:t>
+            </a:r>
+            <a:r>
+              <a:rPr/>
               <a:t>Wait</a:t>
             </a:r>
             <a:r>
@@ -6170,6 +7724,14 @@
             <a:pPr lvl="0" marL="0" indent="0">
               <a:buNone/>
             </a:pPr>
+            <a:r>
+              <a:rPr/>
+              <a:t>Fundamentals,</a:t>
+            </a:r>
+            <a:r>
+              <a:rPr/>
+              <a:t> </a:t>
+            </a:r>
             <a:r>
               <a:rPr/>
               <a:t>What</a:t>
@@ -6289,6 +7851,14 @@
             </a:pPr>
             <a:r>
               <a:rPr/>
+              <a:t>Fundamentals,</a:t>
+            </a:r>
+            <a:r>
+              <a:rPr/>
+              <a:t> </a:t>
+            </a:r>
+            <a:r>
+              <a:rPr/>
               <a:t>Lines</a:t>
             </a:r>
             <a:r>
@@ -6327,7 +7897,7 @@
           <p:nvPr/>
         </p:nvPicPr>
         <p:blipFill>
-          <a:blip r:embed="rId2"/>
+          <a:blip r:embed="rId3"/>
           <a:stretch>
             <a:fillRect/>
           </a:stretch>

</xml_diff>

<commit_message>
Clean up images in data-viz-03
</commit_message>
<xml_diff>
--- a/data-viz-03/component/fundamentals.pptx
+++ b/data-viz-03/component/fundamentals.pptx
@@ -5,7 +5,7 @@
     <p:sldMasterId id="2147483648" r:id="rId1"/>
   </p:sldMasterIdLst>
   <p:notesMasterIdLst>
-    <p:NotesMasterId r:id="rId32"/>
+    <p:NotesMasterId r:id="rId34"/>
   </p:notesMasterIdLst>
   <p:sldIdLst>
     <p:sldId id="256" r:id="rId2"/>
@@ -38,6 +38,8 @@
     <p:sldId id="283" r:id="rId29"/>
     <p:sldId id="284" r:id="rId30"/>
     <p:sldId id="285" r:id="rId31"/>
+    <p:sldId id="286" r:id="rId32"/>
+    <p:sldId id="287" r:id="rId33"/>
   </p:sldIdLst>
   <p:sldSz cx="9144000" cy="6858000" type="screen4x3"/>
   <p:notesSz cx="6858000" cy="9144000"/>
@@ -2458,7 +2460,7 @@
             </a:r>
             <a:r>
               <a:rPr/>
-              <a:t>image</a:t>
+              <a:t>impage</a:t>
             </a:r>
             <a:r>
               <a:rPr/>
@@ -2522,23 +2524,15 @@
             </a:r>
             <a:r>
               <a:rPr/>
-              <a:t>an</a:t>
-            </a:r>
-            <a:r>
-              <a:rPr/>
-              <a:t> </a:t>
-            </a:r>
-            <a:r>
-              <a:rPr/>
-              <a:t>average</a:t>
-            </a:r>
-            <a:r>
-              <a:rPr/>
-              <a:t> </a:t>
-            </a:r>
-            <a:r>
-              <a:rPr/>
-              <a:t>computed</a:t>
+              <a:t>the</a:t>
+            </a:r>
+            <a:r>
+              <a:rPr/>
+              <a:t> </a:t>
+            </a:r>
+            <a:r>
+              <a:rPr/>
+              <a:t>count</a:t>
             </a:r>
             <a:r>
               <a:rPr/>
@@ -2562,7 +2556,7 @@
             </a:r>
             <a:r>
               <a:rPr/>
-              <a:t>X-value.</a:t>
+              <a:t>x-value.</a:t>
             </a:r>
           </a:p>
         </p:txBody>
@@ -2584,193 +2578,7 @@
           <a:p>
             <a:fld id="{18BDFEC3-8487-43E8-A154-7C12CBC1FFF2}" type="slidenum">
               <a:rPr lang="en-US"/>
-              <a:t>12</a:t>
-            </a:fld>
-            <a:endParaRPr lang="en-US"/>
-          </a:p>
-        </p:txBody>
-      </p:sp>
-    </p:spTree>
-  </p:cSld>
-</p:notes>
-</file>
-
-<file path=ppt/notesSlides/notesSlide7.xml><?xml version="1.0" encoding="utf-8"?>
-<p:notes xmlns:a="http://schemas.openxmlformats.org/drawingml/2006/main" xmlns:r="http://schemas.openxmlformats.org/officeDocument/2006/relationships" xmlns:p="http://schemas.openxmlformats.org/presentationml/2006/main">
-  <p:cSld>
-    <p:spTree>
-      <p:nvGrpSpPr>
-        <p:cNvPr id="1" name=""/>
-        <p:cNvGrpSpPr/>
-        <p:nvPr/>
-      </p:nvGrpSpPr>
-      <p:grpSpPr>
-        <a:xfrm>
-          <a:off x="0" y="0"/>
-          <a:ext cx="0" cy="0"/>
-          <a:chOff x="0" y="0"/>
-          <a:chExt cx="0" cy="0"/>
-        </a:xfrm>
-      </p:grpSpPr>
-      <p:sp>
-        <p:nvSpPr>
-          <p:cNvPr id="2" name="Slide Image Placeholder 1"/>
-          <p:cNvSpPr>
-            <a:spLocks noGrp="1" noRot="1" noChangeAspect="1"/>
-          </p:cNvSpPr>
-          <p:nvPr>
-            <p:ph type="sldImg"/>
-          </p:nvPr>
-        </p:nvSpPr>
-        <p:spPr/>
-      </p:sp>
-      <p:sp>
-        <p:nvSpPr>
-          <p:cNvPr id="3" name="Notes Placeholder 2"/>
-          <p:cNvSpPr>
-            <a:spLocks noGrp="1"/>
-          </p:cNvSpPr>
-          <p:nvPr>
-            <p:ph type="body" idx="1"/>
-          </p:nvPr>
-        </p:nvSpPr>
-        <p:spPr/>
-        <p:txBody>
-          <a:bodyPr/>
-          <a:lstStyle/>
-          <a:p>
-            <a:pPr lvl="0" marL="0" indent="0">
-              <a:buNone/>
-            </a:pPr>
-            <a:r>
-              <a:rPr/>
-              <a:t>This</a:t>
-            </a:r>
-            <a:r>
-              <a:rPr/>
-              <a:t> </a:t>
-            </a:r>
-            <a:r>
-              <a:rPr/>
-              <a:t>impage</a:t>
-            </a:r>
-            <a:r>
-              <a:rPr/>
-              <a:t> </a:t>
-            </a:r>
-            <a:r>
-              <a:rPr/>
-              <a:t>replaces</a:t>
-            </a:r>
-            <a:r>
-              <a:rPr/>
-              <a:t> </a:t>
-            </a:r>
-            <a:r>
-              <a:rPr/>
-              <a:t>a</a:t>
-            </a:r>
-            <a:r>
-              <a:rPr/>
-              <a:t> </a:t>
-            </a:r>
-            <a:r>
-              <a:rPr/>
-              <a:t>bunch</a:t>
-            </a:r>
-            <a:r>
-              <a:rPr/>
-              <a:t> </a:t>
-            </a:r>
-            <a:r>
-              <a:rPr/>
-              <a:t>of</a:t>
-            </a:r>
-            <a:r>
-              <a:rPr/>
-              <a:t> </a:t>
-            </a:r>
-            <a:r>
-              <a:rPr/>
-              <a:t>data</a:t>
-            </a:r>
-            <a:r>
-              <a:rPr/>
-              <a:t> </a:t>
-            </a:r>
-            <a:r>
-              <a:rPr/>
-              <a:t>points</a:t>
-            </a:r>
-            <a:r>
-              <a:rPr/>
-              <a:t> </a:t>
-            </a:r>
-            <a:r>
-              <a:rPr/>
-              <a:t>with</a:t>
-            </a:r>
-            <a:r>
-              <a:rPr/>
-              <a:t> </a:t>
-            </a:r>
-            <a:r>
-              <a:rPr/>
-              <a:t>the</a:t>
-            </a:r>
-            <a:r>
-              <a:rPr/>
-              <a:t> </a:t>
-            </a:r>
-            <a:r>
-              <a:rPr/>
-              <a:t>count</a:t>
-            </a:r>
-            <a:r>
-              <a:rPr/>
-              <a:t> </a:t>
-            </a:r>
-            <a:r>
-              <a:rPr/>
-              <a:t>at</a:t>
-            </a:r>
-            <a:r>
-              <a:rPr/>
-              <a:t> </a:t>
-            </a:r>
-            <a:r>
-              <a:rPr/>
-              <a:t>each</a:t>
-            </a:r>
-            <a:r>
-              <a:rPr/>
-              <a:t> </a:t>
-            </a:r>
-            <a:r>
-              <a:rPr/>
-              <a:t>x-value.</a:t>
-            </a:r>
-          </a:p>
-        </p:txBody>
-      </p:sp>
-      <p:sp>
-        <p:nvSpPr>
-          <p:cNvPr id="4" name="Slide Number Placeholder 3"/>
-          <p:cNvSpPr>
-            <a:spLocks noGrp="1"/>
-          </p:cNvSpPr>
-          <p:nvPr>
-            <p:ph type="sldNum" sz="quarter" idx="10"/>
-          </p:nvPr>
-        </p:nvSpPr>
-        <p:spPr/>
-        <p:txBody>
-          <a:bodyPr/>
-          <a:lstStyle/>
-          <a:p>
-            <a:fld id="{18BDFEC3-8487-43E8-A154-7C12CBC1FFF2}" type="slidenum">
-              <a:rPr lang="en-US"/>
-              <a:t>14</a:t>
+              <a:t>16</a:t>
             </a:fld>
             <a:endParaRPr lang="en-US"/>
           </a:p>
@@ -6068,6 +5876,152 @@
           </a:p>
         </p:txBody>
       </p:sp>
+    </p:spTree>
+  </p:cSld>
+</p:sld>
+</file>
+
+<file path=ppt/slides/slide12.xml><?xml version="1.0" encoding="utf-8"?>
+<p:sld xmlns:a="http://schemas.openxmlformats.org/drawingml/2006/main" xmlns:r="http://schemas.openxmlformats.org/officeDocument/2006/relationships" xmlns:p="http://schemas.openxmlformats.org/presentationml/2006/main">
+  <p:cSld>
+    <p:spTree>
+      <p:nvGrpSpPr>
+        <p:cNvPr id="1" name=""/>
+        <p:cNvGrpSpPr/>
+        <p:nvPr/>
+      </p:nvGrpSpPr>
+      <p:grpSpPr>
+        <a:xfrm>
+          <a:off x="0" y="0"/>
+          <a:ext cx="0" cy="0"/>
+          <a:chOff x="0" y="0"/>
+          <a:chExt cx="0" cy="0"/>
+        </a:xfrm>
+      </p:grpSpPr>
+      <p:sp>
+        <p:nvSpPr>
+          <p:cNvPr id="2" name="Title 1"/>
+          <p:cNvSpPr>
+            <a:spLocks noGrp="1"/>
+          </p:cNvSpPr>
+          <p:nvPr>
+            <p:ph type="title"/>
+          </p:nvPr>
+        </p:nvSpPr>
+        <p:spPr/>
+        <p:txBody>
+          <a:bodyPr/>
+          <a:lstStyle/>
+          <a:p>
+            <a:pPr lvl="0" marL="0" indent="0">
+              <a:buNone/>
+            </a:pPr>
+            <a:r>
+              <a:rPr/>
+              <a:t>R</a:t>
+            </a:r>
+            <a:r>
+              <a:rPr/>
+              <a:t> </a:t>
+            </a:r>
+            <a:r>
+              <a:rPr/>
+              <a:t>code</a:t>
+            </a:r>
+          </a:p>
+        </p:txBody>
+      </p:sp>
+      <p:sp>
+        <p:nvSpPr>
+          <p:cNvPr id="3" name="Content Placeholder 2"/>
+          <p:cNvSpPr>
+            <a:spLocks noGrp="1"/>
+          </p:cNvSpPr>
+          <p:nvPr>
+            <p:ph idx="1"/>
+          </p:nvPr>
+        </p:nvSpPr>
+        <p:spPr/>
+        <p:txBody>
+          <a:bodyPr/>
+          <a:lstStyle/>
+          <a:p>
+            <a:pPr lvl="1"/>
+            <a:r>
+              <a:rPr/>
+              <a:t>Here’s the code in R</a:t>
+            </a:r>
+          </a:p>
+          <a:p>
+            <a:pPr lvl="0" marL="1270000" indent="0">
+              <a:buNone/>
+            </a:pPr>
+            <a:r>
+              <a:rPr sz="1800">
+                <a:latin typeface="Courier"/>
+              </a:rPr>
+              <a:t>ggplot(saratoga_houses, aes(Bedrooms, Price)) +
+  geom_point() +
+  stat_summary(fun.y=mean, geom="line")</a:t>
+            </a:r>
+          </a:p>
+        </p:txBody>
+      </p:sp>
+    </p:spTree>
+  </p:cSld>
+</p:sld>
+</file>
+
+<file path=ppt/slides/slide13.xml><?xml version="1.0" encoding="utf-8"?>
+<p:sld xmlns:a="http://schemas.openxmlformats.org/drawingml/2006/main" xmlns:r="http://schemas.openxmlformats.org/officeDocument/2006/relationships" xmlns:p="http://schemas.openxmlformats.org/presentationml/2006/main">
+  <p:cSld>
+    <p:spTree>
+      <p:nvGrpSpPr>
+        <p:cNvPr id="1" name=""/>
+        <p:cNvGrpSpPr/>
+        <p:nvPr/>
+      </p:nvGrpSpPr>
+      <p:grpSpPr>
+        <a:xfrm>
+          <a:off x="0" y="0"/>
+          <a:ext cx="0" cy="0"/>
+          <a:chOff x="0" y="0"/>
+          <a:chExt cx="0" cy="0"/>
+        </a:xfrm>
+      </p:grpSpPr>
+      <p:sp>
+        <p:nvSpPr>
+          <p:cNvPr id="2" name="Title 1"/>
+          <p:cNvSpPr>
+            <a:spLocks noGrp="1"/>
+          </p:cNvSpPr>
+          <p:nvPr>
+            <p:ph type="title"/>
+          </p:nvPr>
+        </p:nvSpPr>
+        <p:spPr/>
+        <p:txBody>
+          <a:bodyPr/>
+          <a:lstStyle/>
+          <a:p>
+            <a:pPr lvl="0" marL="0" indent="0">
+              <a:buNone/>
+            </a:pPr>
+            <a:r>
+              <a:rPr/>
+              <a:t>R</a:t>
+            </a:r>
+            <a:r>
+              <a:rPr/>
+              <a:t> </a:t>
+            </a:r>
+            <a:r>
+              <a:rPr/>
+              <a:t>output</a:t>
+            </a:r>
+          </a:p>
+        </p:txBody>
+      </p:sp>
       <p:pic>
         <p:nvPicPr>
           <p:cNvPr descr="../images/r/average-with-data.png" id="0" name="Picture 1"/>
@@ -6103,7 +6057,7 @@
 </p:sld>
 </file>
 
-<file path=ppt/slides/slide12.xml><?xml version="1.0" encoding="utf-8"?>
+<file path=ppt/slides/slide14.xml><?xml version="1.0" encoding="utf-8"?>
 <p:sld xmlns:a="http://schemas.openxmlformats.org/drawingml/2006/main" xmlns:r="http://schemas.openxmlformats.org/officeDocument/2006/relationships" xmlns:p="http://schemas.openxmlformats.org/presentationml/2006/main">
   <p:cSld>
     <p:spTree>
@@ -6140,71 +6094,259 @@
             </a:pPr>
             <a:r>
               <a:rPr/>
-              <a:t>Fundamentals,</a:t>
-            </a:r>
-            <a:r>
-              <a:rPr/>
-              <a:t> </a:t>
-            </a:r>
-            <a:r>
-              <a:rPr/>
-              <a:t>Lines</a:t>
-            </a:r>
-            <a:r>
-              <a:rPr/>
-              <a:t> </a:t>
-            </a:r>
-            <a:r>
-              <a:rPr/>
-              <a:t>as</a:t>
-            </a:r>
-            <a:r>
-              <a:rPr/>
-              <a:t> </a:t>
-            </a:r>
-            <a:r>
-              <a:rPr/>
-              <a:t>averages</a:t>
-            </a:r>
-          </a:p>
-        </p:txBody>
-      </p:sp>
-      <p:pic>
-        <p:nvPicPr>
-          <p:cNvPr descr="../images/r/average-without-data.png" id="0" name="Picture 1"/>
-          <p:cNvPicPr>
-            <a:picLocks noGrp="1" noChangeAspect="1"/>
-          </p:cNvPicPr>
-          <p:nvPr/>
-        </p:nvPicPr>
-        <p:blipFill>
-          <a:blip r:embed="rId3"/>
-          <a:stretch>
-            <a:fillRect/>
-          </a:stretch>
-        </p:blipFill>
-        <p:spPr bwMode="auto">
-          <a:xfrm>
-            <a:off x="2311400" y="1600200"/>
-            <a:ext cx="4521200" cy="4521200"/>
-          </a:xfrm>
-          <a:prstGeom prst="rect">
-            <a:avLst/>
-          </a:prstGeom>
-          <a:noFill/>
-          <a:ln w="9525">
-            <a:noFill/>
-            <a:headEnd/>
-            <a:tailEnd/>
-          </a:ln>
-        </p:spPr>
-      </p:pic>
+              <a:t>Python</a:t>
+            </a:r>
+            <a:r>
+              <a:rPr/>
+              <a:t> </a:t>
+            </a:r>
+            <a:r>
+              <a:rPr/>
+              <a:t>code</a:t>
+            </a:r>
+          </a:p>
+        </p:txBody>
+      </p:sp>
+      <p:sp>
+        <p:nvSpPr>
+          <p:cNvPr id="3" name="Content Placeholder 2"/>
+          <p:cNvSpPr>
+            <a:spLocks noGrp="1"/>
+          </p:cNvSpPr>
+          <p:nvPr>
+            <p:ph idx="1"/>
+          </p:nvPr>
+        </p:nvSpPr>
+        <p:spPr/>
+        <p:txBody>
+          <a:bodyPr/>
+          <a:lstStyle/>
+          <a:p>
+            <a:pPr lvl="1"/>
+            <a:r>
+              <a:rPr/>
+              <a:t>Here’s the Python code</a:t>
+            </a:r>
+          </a:p>
+          <a:p>
+            <a:pPr lvl="0" marL="1270000" indent="0">
+              <a:buNone/>
+            </a:pPr>
+            <a:r>
+              <a:rPr sz="1800">
+                <a:latin typeface="Courier"/>
+              </a:rPr>
+              <a:t>pts </a:t>
+            </a:r>
+            <a:r>
+              <a:rPr sz="1800">
+                <a:solidFill>
+                  <a:srgbClr val="666666"/>
+                </a:solidFill>
+                <a:latin typeface="Courier"/>
+              </a:rPr>
+              <a:t>=</a:t>
+            </a:r>
+            <a:r>
+              <a:rPr sz="1800">
+                <a:latin typeface="Courier"/>
+              </a:rPr>
+              <a:t> alt.Chart(df).mark_point().encode(</a:t>
+            </a:r>
+            <a:br/>
+            <a:r>
+              <a:rPr sz="1800">
+                <a:latin typeface="Courier"/>
+              </a:rPr>
+              <a:t>    x</a:t>
+            </a:r>
+            <a:r>
+              <a:rPr sz="1800">
+                <a:solidFill>
+                  <a:srgbClr val="666666"/>
+                </a:solidFill>
+                <a:latin typeface="Courier"/>
+              </a:rPr>
+              <a:t>=</a:t>
+            </a:r>
+            <a:r>
+              <a:rPr sz="1800">
+                <a:solidFill>
+                  <a:srgbClr val="4070A0"/>
+                </a:solidFill>
+                <a:latin typeface="Courier"/>
+              </a:rPr>
+              <a:t>'Bedrooms'</a:t>
+            </a:r>
+            <a:r>
+              <a:rPr sz="1800">
+                <a:latin typeface="Courier"/>
+              </a:rPr>
+              <a:t>,</a:t>
+            </a:r>
+            <a:br/>
+            <a:r>
+              <a:rPr sz="1800">
+                <a:latin typeface="Courier"/>
+              </a:rPr>
+              <a:t>    y</a:t>
+            </a:r>
+            <a:r>
+              <a:rPr sz="1800">
+                <a:solidFill>
+                  <a:srgbClr val="666666"/>
+                </a:solidFill>
+                <a:latin typeface="Courier"/>
+              </a:rPr>
+              <a:t>=</a:t>
+            </a:r>
+            <a:r>
+              <a:rPr sz="1800">
+                <a:solidFill>
+                  <a:srgbClr val="4070A0"/>
+                </a:solidFill>
+                <a:latin typeface="Courier"/>
+              </a:rPr>
+              <a:t>'Price'</a:t>
+            </a:r>
+            <a:br/>
+            <a:r>
+              <a:rPr sz="1800">
+                <a:latin typeface="Courier"/>
+              </a:rPr>
+              <a:t>)</a:t>
+            </a:r>
+            <a:br/>
+            <a:r>
+              <a:rPr sz="1800">
+                <a:latin typeface="Courier"/>
+              </a:rPr>
+              <a:t>avg </a:t>
+            </a:r>
+            <a:r>
+              <a:rPr sz="1800">
+                <a:solidFill>
+                  <a:srgbClr val="666666"/>
+                </a:solidFill>
+                <a:latin typeface="Courier"/>
+              </a:rPr>
+              <a:t>=</a:t>
+            </a:r>
+            <a:r>
+              <a:rPr sz="1800">
+                <a:latin typeface="Courier"/>
+              </a:rPr>
+              <a:t> alt.Chart(df).mark_line().encode(</a:t>
+            </a:r>
+            <a:br/>
+            <a:r>
+              <a:rPr sz="1800">
+                <a:latin typeface="Courier"/>
+              </a:rPr>
+              <a:t>    x</a:t>
+            </a:r>
+            <a:r>
+              <a:rPr sz="1800">
+                <a:solidFill>
+                  <a:srgbClr val="666666"/>
+                </a:solidFill>
+                <a:latin typeface="Courier"/>
+              </a:rPr>
+              <a:t>=</a:t>
+            </a:r>
+            <a:r>
+              <a:rPr sz="1800">
+                <a:solidFill>
+                  <a:srgbClr val="4070A0"/>
+                </a:solidFill>
+                <a:latin typeface="Courier"/>
+              </a:rPr>
+              <a:t>'Bedrooms'</a:t>
+            </a:r>
+            <a:r>
+              <a:rPr sz="1800">
+                <a:latin typeface="Courier"/>
+              </a:rPr>
+              <a:t>,</a:t>
+            </a:r>
+            <a:br/>
+            <a:r>
+              <a:rPr sz="1800">
+                <a:latin typeface="Courier"/>
+              </a:rPr>
+              <a:t>    y</a:t>
+            </a:r>
+            <a:r>
+              <a:rPr sz="1800">
+                <a:solidFill>
+                  <a:srgbClr val="666666"/>
+                </a:solidFill>
+                <a:latin typeface="Courier"/>
+              </a:rPr>
+              <a:t>=</a:t>
+            </a:r>
+            <a:r>
+              <a:rPr sz="1800">
+                <a:solidFill>
+                  <a:srgbClr val="4070A0"/>
+                </a:solidFill>
+                <a:latin typeface="Courier"/>
+              </a:rPr>
+              <a:t>'mean(Price)'</a:t>
+            </a:r>
+            <a:br/>
+            <a:r>
+              <a:rPr sz="1800">
+                <a:latin typeface="Courier"/>
+              </a:rPr>
+              <a:t>)</a:t>
+            </a:r>
+            <a:br/>
+            <a:r>
+              <a:rPr sz="1800">
+                <a:latin typeface="Courier"/>
+              </a:rPr>
+              <a:t>ch </a:t>
+            </a:r>
+            <a:r>
+              <a:rPr sz="1800">
+                <a:solidFill>
+                  <a:srgbClr val="666666"/>
+                </a:solidFill>
+                <a:latin typeface="Courier"/>
+              </a:rPr>
+              <a:t>=</a:t>
+            </a:r>
+            <a:r>
+              <a:rPr sz="1800">
+                <a:latin typeface="Courier"/>
+              </a:rPr>
+              <a:t> pts </a:t>
+            </a:r>
+            <a:r>
+              <a:rPr sz="1800">
+                <a:solidFill>
+                  <a:srgbClr val="666666"/>
+                </a:solidFill>
+                <a:latin typeface="Courier"/>
+              </a:rPr>
+              <a:t>+</a:t>
+            </a:r>
+            <a:r>
+              <a:rPr sz="1800">
+                <a:latin typeface="Courier"/>
+              </a:rPr>
+              <a:t> avg</a:t>
+            </a:r>
+          </a:p>
+        </p:txBody>
+      </p:sp>
     </p:spTree>
   </p:cSld>
 </p:sld>
 </file>
 
-<file path=ppt/slides/slide13.xml><?xml version="1.0" encoding="utf-8"?>
+<file path=ppt/slides/slide15.xml><?xml version="1.0" encoding="utf-8"?>
 <p:sld xmlns:a="http://schemas.openxmlformats.org/drawingml/2006/main" xmlns:r="http://schemas.openxmlformats.org/officeDocument/2006/relationships" xmlns:p="http://schemas.openxmlformats.org/presentationml/2006/main">
   <p:cSld>
     <p:spTree>
@@ -6242,6 +6384,14 @@
             <a:r>
               <a:rPr/>
               <a:t>Python</a:t>
+            </a:r>
+            <a:r>
+              <a:rPr/>
+              <a:t> </a:t>
+            </a:r>
+            <a:r>
+              <a:rPr/>
+              <a:t>graph</a:t>
             </a:r>
           </a:p>
         </p:txBody>
@@ -6351,7 +6501,7 @@
 </p:sld>
 </file>
 
-<file path=ppt/slides/slide14.xml><?xml version="1.0" encoding="utf-8"?>
+<file path=ppt/slides/slide16.xml><?xml version="1.0" encoding="utf-8"?>
 <p:sld xmlns:a="http://schemas.openxmlformats.org/drawingml/2006/main" xmlns:r="http://schemas.openxmlformats.org/officeDocument/2006/relationships" xmlns:p="http://schemas.openxmlformats.org/presentationml/2006/main">
   <p:cSld>
     <p:spTree>
@@ -6452,196 +6602,6 @@
 </p:sld>
 </file>
 
-<file path=ppt/slides/slide15.xml><?xml version="1.0" encoding="utf-8"?>
-<p:sld xmlns:a="http://schemas.openxmlformats.org/drawingml/2006/main" xmlns:r="http://schemas.openxmlformats.org/officeDocument/2006/relationships" xmlns:p="http://schemas.openxmlformats.org/presentationml/2006/main">
-  <p:cSld>
-    <p:spTree>
-      <p:nvGrpSpPr>
-        <p:cNvPr id="1" name=""/>
-        <p:cNvGrpSpPr/>
-        <p:nvPr/>
-      </p:nvGrpSpPr>
-      <p:grpSpPr>
-        <a:xfrm>
-          <a:off x="0" y="0"/>
-          <a:ext cx="0" cy="0"/>
-          <a:chOff x="0" y="0"/>
-          <a:chExt cx="0" cy="0"/>
-        </a:xfrm>
-      </p:grpSpPr>
-      <p:sp>
-        <p:nvSpPr>
-          <p:cNvPr id="2" name="Title 1"/>
-          <p:cNvSpPr>
-            <a:spLocks noGrp="1"/>
-          </p:cNvSpPr>
-          <p:nvPr>
-            <p:ph type="title"/>
-          </p:nvPr>
-        </p:nvSpPr>
-        <p:spPr/>
-        <p:txBody>
-          <a:bodyPr/>
-          <a:lstStyle/>
-          <a:p>
-            <a:pPr lvl="0" marL="0" indent="0">
-              <a:buNone/>
-            </a:pPr>
-            <a:r>
-              <a:rPr/>
-              <a:t>Fundamentals,</a:t>
-            </a:r>
-            <a:r>
-              <a:rPr/>
-              <a:t> </a:t>
-            </a:r>
-            <a:r>
-              <a:rPr/>
-              <a:t>On</a:t>
-            </a:r>
-            <a:r>
-              <a:rPr/>
-              <a:t> </a:t>
-            </a:r>
-            <a:r>
-              <a:rPr/>
-              <a:t>your</a:t>
-            </a:r>
-            <a:r>
-              <a:rPr/>
-              <a:t> </a:t>
-            </a:r>
-            <a:r>
-              <a:rPr/>
-              <a:t>own</a:t>
-            </a:r>
-          </a:p>
-        </p:txBody>
-      </p:sp>
-      <p:sp>
-        <p:nvSpPr>
-          <p:cNvPr id="3" name="Content Placeholder 2"/>
-          <p:cNvSpPr>
-            <a:spLocks noGrp="1"/>
-          </p:cNvSpPr>
-          <p:nvPr>
-            <p:ph idx="1"/>
-          </p:nvPr>
-        </p:nvSpPr>
-        <p:spPr/>
-        <p:txBody>
-          <a:bodyPr/>
-          <a:lstStyle/>
-          <a:p>
-            <a:pPr lvl="1"/>
-            <a:r>
-              <a:rPr/>
-              <a:t>Draw a line graph showing the relationship between the number of bathrooms and price.</a:t>
-            </a:r>
-          </a:p>
-        </p:txBody>
-      </p:sp>
-    </p:spTree>
-  </p:cSld>
-</p:sld>
-</file>
-
-<file path=ppt/slides/slide16.xml><?xml version="1.0" encoding="utf-8"?>
-<p:sld xmlns:a="http://schemas.openxmlformats.org/drawingml/2006/main" xmlns:r="http://schemas.openxmlformats.org/officeDocument/2006/relationships" xmlns:p="http://schemas.openxmlformats.org/presentationml/2006/main">
-  <p:cSld>
-    <p:spTree>
-      <p:nvGrpSpPr>
-        <p:cNvPr id="1" name=""/>
-        <p:cNvGrpSpPr/>
-        <p:nvPr/>
-      </p:nvGrpSpPr>
-      <p:grpSpPr>
-        <a:xfrm>
-          <a:off x="0" y="0"/>
-          <a:ext cx="0" cy="0"/>
-          <a:chOff x="0" y="0"/>
-          <a:chExt cx="0" cy="0"/>
-        </a:xfrm>
-      </p:grpSpPr>
-      <p:sp>
-        <p:nvSpPr>
-          <p:cNvPr id="2" name="Title 1"/>
-          <p:cNvSpPr>
-            <a:spLocks noGrp="1"/>
-          </p:cNvSpPr>
-          <p:nvPr>
-            <p:ph type="title"/>
-          </p:nvPr>
-        </p:nvSpPr>
-        <p:spPr/>
-        <p:txBody>
-          <a:bodyPr/>
-          <a:lstStyle/>
-          <a:p>
-            <a:pPr lvl="0" marL="0" indent="0">
-              <a:buNone/>
-            </a:pPr>
-            <a:r>
-              <a:rPr/>
-              <a:t>Fundamentals,</a:t>
-            </a:r>
-            <a:r>
-              <a:rPr/>
-              <a:t> </a:t>
-            </a:r>
-            <a:r>
-              <a:rPr/>
-              <a:t>Wait</a:t>
-            </a:r>
-            <a:r>
-              <a:rPr/>
-              <a:t> </a:t>
-            </a:r>
-            <a:r>
-              <a:rPr/>
-              <a:t>before</a:t>
-            </a:r>
-            <a:r>
-              <a:rPr/>
-              <a:t> </a:t>
-            </a:r>
-            <a:r>
-              <a:rPr/>
-              <a:t>showing</a:t>
-            </a:r>
-          </a:p>
-        </p:txBody>
-      </p:sp>
-      <p:sp>
-        <p:nvSpPr>
-          <p:cNvPr id="3" name="Content Placeholder 2"/>
-          <p:cNvSpPr>
-            <a:spLocks noGrp="1"/>
-          </p:cNvSpPr>
-          <p:nvPr>
-            <p:ph idx="1"/>
-          </p:nvPr>
-        </p:nvSpPr>
-        <p:spPr/>
-        <p:txBody>
-          <a:bodyPr/>
-          <a:lstStyle/>
-          <a:p>
-            <a:pPr lvl="0" marL="0" indent="0">
-              <a:buNone/>
-            </a:pPr>
-            <a:r>
-              <a:rPr/>
-              <a:t>((Add code here))</a:t>
-            </a:r>
-          </a:p>
-        </p:txBody>
-      </p:sp>
-    </p:spTree>
-  </p:cSld>
-</p:sld>
-</file>
-
 <file path=ppt/slides/slide17.xml><?xml version="1.0" encoding="utf-8"?>
 <p:sld xmlns:a="http://schemas.openxmlformats.org/drawingml/2006/main" xmlns:r="http://schemas.openxmlformats.org/officeDocument/2006/relationships" xmlns:p="http://schemas.openxmlformats.org/presentationml/2006/main">
   <p:cSld>
@@ -6687,7 +6647,7 @@
             </a:r>
             <a:r>
               <a:rPr/>
-              <a:t>What</a:t>
+              <a:t>On</a:t>
             </a:r>
             <a:r>
               <a:rPr/>
@@ -6703,31 +6663,7 @@
             </a:r>
             <a:r>
               <a:rPr/>
-              <a:t>visualization</a:t>
-            </a:r>
-            <a:r>
-              <a:rPr/>
-              <a:t> </a:t>
-            </a:r>
-            <a:r>
-              <a:rPr/>
-              <a:t>might</a:t>
-            </a:r>
-            <a:r>
-              <a:rPr/>
-              <a:t> </a:t>
-            </a:r>
-            <a:r>
-              <a:rPr/>
-              <a:t>look</a:t>
-            </a:r>
-            <a:r>
-              <a:rPr/>
-              <a:t> </a:t>
-            </a:r>
-            <a:r>
-              <a:rPr/>
-              <a:t>like</a:t>
+              <a:t>own</a:t>
             </a:r>
           </a:p>
         </p:txBody>
@@ -6747,12 +6683,10 @@
           <a:bodyPr/>
           <a:lstStyle/>
           <a:p>
-            <a:pPr lvl="0" marL="0" indent="0">
-              <a:buNone/>
-            </a:pPr>
-            <a:r>
-              <a:rPr/>
-              <a:t>((Add visualization here))</a:t>
+            <a:pPr lvl="1"/>
+            <a:r>
+              <a:rPr/>
+              <a:t>Draw a line graph showing the relationship between the number of bathrooms and price.</a:t>
             </a:r>
           </a:p>
         </p:txBody>
@@ -6807,15 +6741,48 @@
             </a:r>
             <a:r>
               <a:rPr/>
-              <a:t>Error</a:t>
-            </a:r>
-            <a:r>
-              <a:rPr/>
-              <a:t> </a:t>
-            </a:r>
-            <a:r>
-              <a:rPr/>
-              <a:t>bars</a:t>
+              <a:t>Wait</a:t>
+            </a:r>
+            <a:r>
+              <a:rPr/>
+              <a:t> </a:t>
+            </a:r>
+            <a:r>
+              <a:rPr/>
+              <a:t>before</a:t>
+            </a:r>
+            <a:r>
+              <a:rPr/>
+              <a:t> </a:t>
+            </a:r>
+            <a:r>
+              <a:rPr/>
+              <a:t>showing</a:t>
+            </a:r>
+          </a:p>
+        </p:txBody>
+      </p:sp>
+      <p:sp>
+        <p:nvSpPr>
+          <p:cNvPr id="3" name="Content Placeholder 2"/>
+          <p:cNvSpPr>
+            <a:spLocks noGrp="1"/>
+          </p:cNvSpPr>
+          <p:nvPr>
+            <p:ph idx="1"/>
+          </p:nvPr>
+        </p:nvSpPr>
+        <p:spPr/>
+        <p:txBody>
+          <a:bodyPr/>
+          <a:lstStyle/>
+          <a:p>
+            <a:pPr lvl="0" marL="0" indent="0">
+              <a:buNone/>
+            </a:pPr>
+            <a:r>
+              <a:rPr/>
+              <a:t>((Add code here))</a:t>
             </a:r>
           </a:p>
         </p:txBody>
@@ -6870,15 +6837,72 @@
             </a:r>
             <a:r>
               <a:rPr/>
-              <a:t>high-low</a:t>
-            </a:r>
-            <a:r>
-              <a:rPr/>
-              <a:t> </a:t>
-            </a:r>
-            <a:r>
-              <a:rPr/>
-              <a:t>bars</a:t>
+              <a:t>What</a:t>
+            </a:r>
+            <a:r>
+              <a:rPr/>
+              <a:t> </a:t>
+            </a:r>
+            <a:r>
+              <a:rPr/>
+              <a:t>your</a:t>
+            </a:r>
+            <a:r>
+              <a:rPr/>
+              <a:t> </a:t>
+            </a:r>
+            <a:r>
+              <a:rPr/>
+              <a:t>visualization</a:t>
+            </a:r>
+            <a:r>
+              <a:rPr/>
+              <a:t> </a:t>
+            </a:r>
+            <a:r>
+              <a:rPr/>
+              <a:t>might</a:t>
+            </a:r>
+            <a:r>
+              <a:rPr/>
+              <a:t> </a:t>
+            </a:r>
+            <a:r>
+              <a:rPr/>
+              <a:t>look</a:t>
+            </a:r>
+            <a:r>
+              <a:rPr/>
+              <a:t> </a:t>
+            </a:r>
+            <a:r>
+              <a:rPr/>
+              <a:t>like</a:t>
+            </a:r>
+          </a:p>
+        </p:txBody>
+      </p:sp>
+      <p:sp>
+        <p:nvSpPr>
+          <p:cNvPr id="3" name="Content Placeholder 2"/>
+          <p:cNvSpPr>
+            <a:spLocks noGrp="1"/>
+          </p:cNvSpPr>
+          <p:nvPr>
+            <p:ph idx="1"/>
+          </p:nvPr>
+        </p:nvSpPr>
+        <p:spPr/>
+        <p:txBody>
+          <a:bodyPr/>
+          <a:lstStyle/>
+          <a:p>
+            <a:pPr lvl="0" marL="0" indent="0">
+              <a:buNone/>
+            </a:pPr>
+            <a:r>
+              <a:rPr/>
+              <a:t>((Add visualization here))</a:t>
             </a:r>
           </a:p>
         </p:txBody>
@@ -7096,32 +7120,15 @@
             </a:r>
             <a:r>
               <a:rPr/>
-              <a:t>Boxplots</a:t>
-            </a:r>
-          </a:p>
-        </p:txBody>
-      </p:sp>
-      <p:sp>
-        <p:nvSpPr>
-          <p:cNvPr id="3" name="Content Placeholder 2"/>
-          <p:cNvSpPr>
-            <a:spLocks noGrp="1"/>
-          </p:cNvSpPr>
-          <p:nvPr>
-            <p:ph idx="1"/>
-          </p:nvPr>
-        </p:nvSpPr>
-        <p:spPr/>
-        <p:txBody>
-          <a:bodyPr/>
-          <a:lstStyle/>
-          <a:p>
-            <a:pPr lvl="0" marL="0" indent="0">
-              <a:buNone/>
-            </a:pPr>
-            <a:r>
-              <a:rPr/>
-              <a:t>((Draw example and ask students to do a similar example))</a:t>
+              <a:t>Error</a:t>
+            </a:r>
+            <a:r>
+              <a:rPr/>
+              <a:t> </a:t>
+            </a:r>
+            <a:r>
+              <a:rPr/>
+              <a:t>bars</a:t>
             </a:r>
           </a:p>
         </p:txBody>
@@ -7176,57 +7183,19 @@
             </a:r>
             <a:r>
               <a:rPr/>
-              <a:t>Trend</a:t>
-            </a:r>
-            <a:r>
-              <a:rPr/>
-              <a:t> </a:t>
-            </a:r>
-            <a:r>
-              <a:rPr/>
-              <a:t>lines</a:t>
-            </a:r>
-            <a:r>
-              <a:rPr/>
-              <a:t> </a:t>
-            </a:r>
-            <a:r>
-              <a:rPr/>
-              <a:t>(linear)</a:t>
-            </a:r>
-          </a:p>
-        </p:txBody>
-      </p:sp>
-      <p:pic>
-        <p:nvPicPr>
-          <p:cNvPr descr="../images/r/linear-trend-age.png" id="0" name="Picture 1"/>
-          <p:cNvPicPr>
-            <a:picLocks noGrp="1" noChangeAspect="1"/>
-          </p:cNvPicPr>
-          <p:nvPr/>
-        </p:nvPicPr>
-        <p:blipFill>
-          <a:blip r:embed="rId2"/>
-          <a:stretch>
-            <a:fillRect/>
-          </a:stretch>
-        </p:blipFill>
-        <p:spPr bwMode="auto">
-          <a:xfrm>
-            <a:off x="2311400" y="1600200"/>
-            <a:ext cx="4521200" cy="4521200"/>
-          </a:xfrm>
-          <a:prstGeom prst="rect">
-            <a:avLst/>
-          </a:prstGeom>
-          <a:noFill/>
-          <a:ln w="9525">
-            <a:noFill/>
-            <a:headEnd/>
-            <a:tailEnd/>
-          </a:ln>
-        </p:spPr>
-      </p:pic>
+              <a:t>high-low</a:t>
+            </a:r>
+            <a:r>
+              <a:rPr/>
+              <a:t> </a:t>
+            </a:r>
+            <a:r>
+              <a:rPr/>
+              <a:t>bars</a:t>
+            </a:r>
+          </a:p>
+        </p:txBody>
+      </p:sp>
     </p:spTree>
   </p:cSld>
 </p:sld>
@@ -7277,57 +7246,36 @@
             </a:r>
             <a:r>
               <a:rPr/>
-              <a:t>Trend</a:t>
-            </a:r>
-            <a:r>
-              <a:rPr/>
-              <a:t> </a:t>
-            </a:r>
-            <a:r>
-              <a:rPr/>
-              <a:t>lines</a:t>
-            </a:r>
-            <a:r>
-              <a:rPr/>
-              <a:t> </a:t>
-            </a:r>
-            <a:r>
-              <a:rPr/>
-              <a:t>(spline)</a:t>
-            </a:r>
-          </a:p>
-        </p:txBody>
-      </p:sp>
-      <p:pic>
-        <p:nvPicPr>
-          <p:cNvPr descr="../images/r/smooth-trend.png" id="0" name="Picture 1"/>
-          <p:cNvPicPr>
-            <a:picLocks noGrp="1" noChangeAspect="1"/>
-          </p:cNvPicPr>
-          <p:nvPr/>
-        </p:nvPicPr>
-        <p:blipFill>
-          <a:blip r:embed="rId2"/>
-          <a:stretch>
-            <a:fillRect/>
-          </a:stretch>
-        </p:blipFill>
-        <p:spPr bwMode="auto">
-          <a:xfrm>
-            <a:off x="2311400" y="1600200"/>
-            <a:ext cx="4521200" cy="4521200"/>
-          </a:xfrm>
-          <a:prstGeom prst="rect">
-            <a:avLst/>
-          </a:prstGeom>
-          <a:noFill/>
-          <a:ln w="9525">
-            <a:noFill/>
-            <a:headEnd/>
-            <a:tailEnd/>
-          </a:ln>
-        </p:spPr>
-      </p:pic>
+              <a:t>Boxplots</a:t>
+            </a:r>
+          </a:p>
+        </p:txBody>
+      </p:sp>
+      <p:sp>
+        <p:nvSpPr>
+          <p:cNvPr id="3" name="Content Placeholder 2"/>
+          <p:cNvSpPr>
+            <a:spLocks noGrp="1"/>
+          </p:cNvSpPr>
+          <p:nvPr>
+            <p:ph idx="1"/>
+          </p:nvPr>
+        </p:nvSpPr>
+        <p:spPr/>
+        <p:txBody>
+          <a:bodyPr/>
+          <a:lstStyle/>
+          <a:p>
+            <a:pPr lvl="0" marL="0" indent="0">
+              <a:buNone/>
+            </a:pPr>
+            <a:r>
+              <a:rPr/>
+              <a:t>((Draw example and ask students to do a similar example))</a:t>
+            </a:r>
+          </a:p>
+        </p:txBody>
+      </p:sp>
     </p:spTree>
   </p:cSld>
 </p:sld>
@@ -7370,6 +7318,14 @@
             </a:pPr>
             <a:r>
               <a:rPr/>
+              <a:t>Fundamentals,</a:t>
+            </a:r>
+            <a:r>
+              <a:rPr/>
+              <a:t> </a:t>
+            </a:r>
+            <a:r>
+              <a:rPr/>
               <a:t>Trend</a:t>
             </a:r>
             <a:r>
@@ -7386,38 +7342,14 @@
             </a:r>
             <a:r>
               <a:rPr/>
-              <a:t>(spline),</a:t>
-            </a:r>
-            <a:r>
-              <a:rPr/>
-              <a:t> </a:t>
-            </a:r>
-            <a:r>
-              <a:rPr/>
-              <a:t>not</a:t>
-            </a:r>
-            <a:r>
-              <a:rPr/>
-              <a:t> </a:t>
-            </a:r>
-            <a:r>
-              <a:rPr/>
-              <a:t>so</a:t>
-            </a:r>
-            <a:r>
-              <a:rPr/>
-              <a:t> </a:t>
-            </a:r>
-            <a:r>
-              <a:rPr/>
-              <a:t>smooth</a:t>
+              <a:t>(linear)</a:t>
             </a:r>
           </a:p>
         </p:txBody>
       </p:sp>
       <p:pic>
         <p:nvPicPr>
-          <p:cNvPr descr="../images/r/smooth-trend-3.png" id="0" name="Picture 1"/>
+          <p:cNvPr descr="../images/r/linear-trend-age.png" id="0" name="Picture 1"/>
           <p:cNvPicPr>
             <a:picLocks noGrp="1" noChangeAspect="1"/>
           </p:cNvPicPr>
@@ -7487,57 +7419,65 @@
             </a:pPr>
             <a:r>
               <a:rPr/>
-              <a:t>On</a:t>
-            </a:r>
-            <a:r>
-              <a:rPr/>
-              <a:t> </a:t>
-            </a:r>
-            <a:r>
-              <a:rPr/>
-              <a:t>your</a:t>
-            </a:r>
-            <a:r>
-              <a:rPr/>
-              <a:t> </a:t>
-            </a:r>
-            <a:r>
-              <a:rPr/>
-              <a:t>own</a:t>
-            </a:r>
-          </a:p>
-        </p:txBody>
-      </p:sp>
-      <p:sp>
-        <p:nvSpPr>
-          <p:cNvPr id="3" name="Content Placeholder 2"/>
-          <p:cNvSpPr>
-            <a:spLocks noGrp="1"/>
-          </p:cNvSpPr>
-          <p:nvPr>
-            <p:ph idx="1"/>
-          </p:nvPr>
-        </p:nvSpPr>
-        <p:spPr/>
-        <p:txBody>
-          <a:bodyPr/>
-          <a:lstStyle/>
-          <a:p>
-            <a:pPr lvl="1"/>
-            <a:r>
-              <a:rPr/>
-              <a:t>Fit a linear trend line looking at Living.Area versus Price.</a:t>
-            </a:r>
-          </a:p>
-          <a:p>
-            <a:pPr lvl="1"/>
-            <a:r>
-              <a:rPr/>
-              <a:t>Fit a smooth curve</a:t>
-            </a:r>
-          </a:p>
-        </p:txBody>
-      </p:sp>
+              <a:t>Fundamentals,</a:t>
+            </a:r>
+            <a:r>
+              <a:rPr/>
+              <a:t> </a:t>
+            </a:r>
+            <a:r>
+              <a:rPr/>
+              <a:t>Trend</a:t>
+            </a:r>
+            <a:r>
+              <a:rPr/>
+              <a:t> </a:t>
+            </a:r>
+            <a:r>
+              <a:rPr/>
+              <a:t>lines</a:t>
+            </a:r>
+            <a:r>
+              <a:rPr/>
+              <a:t> </a:t>
+            </a:r>
+            <a:r>
+              <a:rPr/>
+              <a:t>(spline)</a:t>
+            </a:r>
+          </a:p>
+        </p:txBody>
+      </p:sp>
+      <p:pic>
+        <p:nvPicPr>
+          <p:cNvPr descr="../images/r/smooth-trend.png" id="0" name="Picture 1"/>
+          <p:cNvPicPr>
+            <a:picLocks noGrp="1" noChangeAspect="1"/>
+          </p:cNvPicPr>
+          <p:nvPr/>
+        </p:nvPicPr>
+        <p:blipFill>
+          <a:blip r:embed="rId2"/>
+          <a:stretch>
+            <a:fillRect/>
+          </a:stretch>
+        </p:blipFill>
+        <p:spPr bwMode="auto">
+          <a:xfrm>
+            <a:off x="2311400" y="1600200"/>
+            <a:ext cx="4521200" cy="4521200"/>
+          </a:xfrm>
+          <a:prstGeom prst="rect">
+            <a:avLst/>
+          </a:prstGeom>
+          <a:noFill/>
+          <a:ln w="9525">
+            <a:noFill/>
+            <a:headEnd/>
+            <a:tailEnd/>
+          </a:ln>
+        </p:spPr>
+      </p:pic>
     </p:spTree>
   </p:cSld>
 </p:sld>
@@ -7580,33 +7520,243 @@
             </a:pPr>
             <a:r>
               <a:rPr/>
-              <a:t>Wait</a:t>
-            </a:r>
-            <a:r>
-              <a:rPr/>
-              <a:t> </a:t>
-            </a:r>
-            <a:r>
-              <a:rPr/>
-              <a:t>before</a:t>
-            </a:r>
-            <a:r>
-              <a:rPr/>
-              <a:t> </a:t>
-            </a:r>
-            <a:r>
-              <a:rPr/>
-              <a:t>showing</a:t>
-            </a:r>
-          </a:p>
-        </p:txBody>
-      </p:sp>
+              <a:t>Trend</a:t>
+            </a:r>
+            <a:r>
+              <a:rPr/>
+              <a:t> </a:t>
+            </a:r>
+            <a:r>
+              <a:rPr/>
+              <a:t>lines</a:t>
+            </a:r>
+            <a:r>
+              <a:rPr/>
+              <a:t> </a:t>
+            </a:r>
+            <a:r>
+              <a:rPr/>
+              <a:t>(spline),</a:t>
+            </a:r>
+            <a:r>
+              <a:rPr/>
+              <a:t> </a:t>
+            </a:r>
+            <a:r>
+              <a:rPr/>
+              <a:t>not</a:t>
+            </a:r>
+            <a:r>
+              <a:rPr/>
+              <a:t> </a:t>
+            </a:r>
+            <a:r>
+              <a:rPr/>
+              <a:t>so</a:t>
+            </a:r>
+            <a:r>
+              <a:rPr/>
+              <a:t> </a:t>
+            </a:r>
+            <a:r>
+              <a:rPr/>
+              <a:t>smooth</a:t>
+            </a:r>
+          </a:p>
+        </p:txBody>
+      </p:sp>
+      <p:pic>
+        <p:nvPicPr>
+          <p:cNvPr descr="../images/r/smooth-trend-3.png" id="0" name="Picture 1"/>
+          <p:cNvPicPr>
+            <a:picLocks noGrp="1" noChangeAspect="1"/>
+          </p:cNvPicPr>
+          <p:nvPr/>
+        </p:nvPicPr>
+        <p:blipFill>
+          <a:blip r:embed="rId2"/>
+          <a:stretch>
+            <a:fillRect/>
+          </a:stretch>
+        </p:blipFill>
+        <p:spPr bwMode="auto">
+          <a:xfrm>
+            <a:off x="2311400" y="1600200"/>
+            <a:ext cx="4521200" cy="4521200"/>
+          </a:xfrm>
+          <a:prstGeom prst="rect">
+            <a:avLst/>
+          </a:prstGeom>
+          <a:noFill/>
+          <a:ln w="9525">
+            <a:noFill/>
+            <a:headEnd/>
+            <a:tailEnd/>
+          </a:ln>
+        </p:spPr>
+      </p:pic>
     </p:spTree>
   </p:cSld>
 </p:sld>
 </file>
 
 <file path=ppt/slides/slide26.xml><?xml version="1.0" encoding="utf-8"?>
+<p:sld xmlns:a="http://schemas.openxmlformats.org/drawingml/2006/main" xmlns:r="http://schemas.openxmlformats.org/officeDocument/2006/relationships" xmlns:p="http://schemas.openxmlformats.org/presentationml/2006/main">
+  <p:cSld>
+    <p:spTree>
+      <p:nvGrpSpPr>
+        <p:cNvPr id="1" name=""/>
+        <p:cNvGrpSpPr/>
+        <p:nvPr/>
+      </p:nvGrpSpPr>
+      <p:grpSpPr>
+        <a:xfrm>
+          <a:off x="0" y="0"/>
+          <a:ext cx="0" cy="0"/>
+          <a:chOff x="0" y="0"/>
+          <a:chExt cx="0" cy="0"/>
+        </a:xfrm>
+      </p:grpSpPr>
+      <p:sp>
+        <p:nvSpPr>
+          <p:cNvPr id="2" name="Title 1"/>
+          <p:cNvSpPr>
+            <a:spLocks noGrp="1"/>
+          </p:cNvSpPr>
+          <p:nvPr>
+            <p:ph type="title"/>
+          </p:nvPr>
+        </p:nvSpPr>
+        <p:spPr/>
+        <p:txBody>
+          <a:bodyPr/>
+          <a:lstStyle/>
+          <a:p>
+            <a:pPr lvl="0" marL="0" indent="0">
+              <a:buNone/>
+            </a:pPr>
+            <a:r>
+              <a:rPr/>
+              <a:t>On</a:t>
+            </a:r>
+            <a:r>
+              <a:rPr/>
+              <a:t> </a:t>
+            </a:r>
+            <a:r>
+              <a:rPr/>
+              <a:t>your</a:t>
+            </a:r>
+            <a:r>
+              <a:rPr/>
+              <a:t> </a:t>
+            </a:r>
+            <a:r>
+              <a:rPr/>
+              <a:t>own</a:t>
+            </a:r>
+          </a:p>
+        </p:txBody>
+      </p:sp>
+      <p:sp>
+        <p:nvSpPr>
+          <p:cNvPr id="3" name="Content Placeholder 2"/>
+          <p:cNvSpPr>
+            <a:spLocks noGrp="1"/>
+          </p:cNvSpPr>
+          <p:nvPr>
+            <p:ph idx="1"/>
+          </p:nvPr>
+        </p:nvSpPr>
+        <p:spPr/>
+        <p:txBody>
+          <a:bodyPr/>
+          <a:lstStyle/>
+          <a:p>
+            <a:pPr lvl="1"/>
+            <a:r>
+              <a:rPr/>
+              <a:t>Fit a linear trend line looking at Living.Area versus Price.</a:t>
+            </a:r>
+          </a:p>
+          <a:p>
+            <a:pPr lvl="1"/>
+            <a:r>
+              <a:rPr/>
+              <a:t>Fit a smooth curve</a:t>
+            </a:r>
+          </a:p>
+        </p:txBody>
+      </p:sp>
+    </p:spTree>
+  </p:cSld>
+</p:sld>
+</file>
+
+<file path=ppt/slides/slide27.xml><?xml version="1.0" encoding="utf-8"?>
+<p:sld xmlns:a="http://schemas.openxmlformats.org/drawingml/2006/main" xmlns:r="http://schemas.openxmlformats.org/officeDocument/2006/relationships" xmlns:p="http://schemas.openxmlformats.org/presentationml/2006/main">
+  <p:cSld>
+    <p:spTree>
+      <p:nvGrpSpPr>
+        <p:cNvPr id="1" name=""/>
+        <p:cNvGrpSpPr/>
+        <p:nvPr/>
+      </p:nvGrpSpPr>
+      <p:grpSpPr>
+        <a:xfrm>
+          <a:off x="0" y="0"/>
+          <a:ext cx="0" cy="0"/>
+          <a:chOff x="0" y="0"/>
+          <a:chExt cx="0" cy="0"/>
+        </a:xfrm>
+      </p:grpSpPr>
+      <p:sp>
+        <p:nvSpPr>
+          <p:cNvPr id="2" name="Title 1"/>
+          <p:cNvSpPr>
+            <a:spLocks noGrp="1"/>
+          </p:cNvSpPr>
+          <p:nvPr>
+            <p:ph type="title"/>
+          </p:nvPr>
+        </p:nvSpPr>
+        <p:spPr/>
+        <p:txBody>
+          <a:bodyPr/>
+          <a:lstStyle/>
+          <a:p>
+            <a:pPr lvl="0" marL="0" indent="0">
+              <a:buNone/>
+            </a:pPr>
+            <a:r>
+              <a:rPr/>
+              <a:t>Wait</a:t>
+            </a:r>
+            <a:r>
+              <a:rPr/>
+              <a:t> </a:t>
+            </a:r>
+            <a:r>
+              <a:rPr/>
+              <a:t>before</a:t>
+            </a:r>
+            <a:r>
+              <a:rPr/>
+              <a:t> </a:t>
+            </a:r>
+            <a:r>
+              <a:rPr/>
+              <a:t>showing</a:t>
+            </a:r>
+          </a:p>
+        </p:txBody>
+      </p:sp>
+    </p:spTree>
+  </p:cSld>
+</p:sld>
+</file>
+
+<file path=ppt/slides/slide28.xml><?xml version="1.0" encoding="utf-8"?>
 <p:sld xmlns:a="http://schemas.openxmlformats.org/drawingml/2006/main" xmlns:r="http://schemas.openxmlformats.org/officeDocument/2006/relationships" xmlns:p="http://schemas.openxmlformats.org/presentationml/2006/main">
   <p:cSld>
     <p:spTree>
@@ -7723,7 +7873,7 @@
 </p:sld>
 </file>
 
-<file path=ppt/slides/slide27.xml><?xml version="1.0" encoding="utf-8"?>
+<file path=ppt/slides/slide29.xml><?xml version="1.0" encoding="utf-8"?>
 <p:sld xmlns:a="http://schemas.openxmlformats.org/drawingml/2006/main" xmlns:r="http://schemas.openxmlformats.org/officeDocument/2006/relationships" xmlns:p="http://schemas.openxmlformats.org/presentationml/2006/main">
   <p:cSld>
     <p:spTree>
@@ -7840,174 +7990,6 @@
 </p:sld>
 </file>
 
-<file path=ppt/slides/slide28.xml><?xml version="1.0" encoding="utf-8"?>
-<p:sld xmlns:a="http://schemas.openxmlformats.org/drawingml/2006/main" xmlns:r="http://schemas.openxmlformats.org/officeDocument/2006/relationships" xmlns:p="http://schemas.openxmlformats.org/presentationml/2006/main">
-  <p:cSld>
-    <p:spTree>
-      <p:nvGrpSpPr>
-        <p:cNvPr id="1" name=""/>
-        <p:cNvGrpSpPr/>
-        <p:nvPr/>
-      </p:nvGrpSpPr>
-      <p:grpSpPr>
-        <a:xfrm>
-          <a:off x="0" y="0"/>
-          <a:ext cx="0" cy="0"/>
-          <a:chOff x="0" y="0"/>
-          <a:chExt cx="0" cy="0"/>
-        </a:xfrm>
-      </p:grpSpPr>
-      <p:sp>
-        <p:nvSpPr>
-          <p:cNvPr id="2" name="Title 1"/>
-          <p:cNvSpPr>
-            <a:spLocks noGrp="1"/>
-          </p:cNvSpPr>
-          <p:nvPr>
-            <p:ph type="title"/>
-          </p:nvPr>
-        </p:nvSpPr>
-        <p:spPr/>
-        <p:txBody>
-          <a:bodyPr/>
-          <a:lstStyle/>
-          <a:p>
-            <a:pPr lvl="0" marL="0" indent="0">
-              <a:buNone/>
-            </a:pPr>
-            <a:r>
-              <a:rPr/>
-              <a:t>Trend</a:t>
-            </a:r>
-            <a:r>
-              <a:rPr/>
-              <a:t> </a:t>
-            </a:r>
-            <a:r>
-              <a:rPr/>
-              <a:t>lines</a:t>
-            </a:r>
-            <a:r>
-              <a:rPr/>
-              <a:t> </a:t>
-            </a:r>
-            <a:r>
-              <a:rPr/>
-              <a:t>(logistic)</a:t>
-            </a:r>
-          </a:p>
-        </p:txBody>
-      </p:sp>
-      <p:sp>
-        <p:nvSpPr>
-          <p:cNvPr id="3" name="Content Placeholder 2"/>
-          <p:cNvSpPr>
-            <a:spLocks noGrp="1"/>
-          </p:cNvSpPr>
-          <p:nvPr>
-            <p:ph idx="1"/>
-          </p:nvPr>
-        </p:nvSpPr>
-        <p:spPr/>
-        <p:txBody>
-          <a:bodyPr/>
-          <a:lstStyle/>
-          <a:p>
-            <a:pPr lvl="0" marL="0" indent="0">
-              <a:buNone/>
-            </a:pPr>
-            <a:r>
-              <a:rPr/>
-              <a:t>((Need a different data set here. Titanic???))</a:t>
-            </a:r>
-          </a:p>
-        </p:txBody>
-      </p:sp>
-    </p:spTree>
-  </p:cSld>
-</p:sld>
-</file>
-
-<file path=ppt/slides/slide29.xml><?xml version="1.0" encoding="utf-8"?>
-<p:sld xmlns:a="http://schemas.openxmlformats.org/drawingml/2006/main" xmlns:r="http://schemas.openxmlformats.org/officeDocument/2006/relationships" xmlns:p="http://schemas.openxmlformats.org/presentationml/2006/main">
-  <p:cSld>
-    <p:spTree>
-      <p:nvGrpSpPr>
-        <p:cNvPr id="1" name=""/>
-        <p:cNvGrpSpPr/>
-        <p:nvPr/>
-      </p:nvGrpSpPr>
-      <p:grpSpPr>
-        <a:xfrm>
-          <a:off x="0" y="0"/>
-          <a:ext cx="0" cy="0"/>
-          <a:chOff x="0" y="0"/>
-          <a:chExt cx="0" cy="0"/>
-        </a:xfrm>
-      </p:grpSpPr>
-      <p:sp>
-        <p:nvSpPr>
-          <p:cNvPr id="2" name="Title 1"/>
-          <p:cNvSpPr>
-            <a:spLocks noGrp="1"/>
-          </p:cNvSpPr>
-          <p:nvPr>
-            <p:ph type="title"/>
-          </p:nvPr>
-        </p:nvSpPr>
-        <p:spPr/>
-        <p:txBody>
-          <a:bodyPr/>
-          <a:lstStyle/>
-          <a:p>
-            <a:pPr lvl="0" marL="0" indent="0">
-              <a:buNone/>
-            </a:pPr>
-            <a:r>
-              <a:rPr/>
-              <a:t>Helpful</a:t>
-            </a:r>
-            <a:r>
-              <a:rPr/>
-              <a:t> </a:t>
-            </a:r>
-            <a:r>
-              <a:rPr/>
-              <a:t>tips</a:t>
-            </a:r>
-          </a:p>
-        </p:txBody>
-      </p:sp>
-      <p:sp>
-        <p:nvSpPr>
-          <p:cNvPr id="3" name="Content Placeholder 2"/>
-          <p:cNvSpPr>
-            <a:spLocks noGrp="1"/>
-          </p:cNvSpPr>
-          <p:nvPr>
-            <p:ph idx="1"/>
-          </p:nvPr>
-        </p:nvSpPr>
-        <p:spPr/>
-        <p:txBody>
-          <a:bodyPr/>
-          <a:lstStyle/>
-          <a:p>
-            <a:pPr lvl="0" marL="0" indent="0">
-              <a:buNone/>
-            </a:pPr>
-            <a:r>
-              <a:rPr/>
-              <a:t>((Add three or four slides here. Maybe talk about opacity.))</a:t>
-            </a:r>
-          </a:p>
-        </p:txBody>
-      </p:sp>
-    </p:spTree>
-  </p:cSld>
-</p:sld>
-</file>
-
 <file path=ppt/slides/slide3.xml><?xml version="1.0" encoding="utf-8"?>
 <p:sld xmlns:a="http://schemas.openxmlformats.org/drawingml/2006/main" xmlns:r="http://schemas.openxmlformats.org/officeDocument/2006/relationships" xmlns:p="http://schemas.openxmlformats.org/presentationml/2006/main">
   <p:cSld>
@@ -8124,6 +8106,174 @@
 </file>
 
 <file path=ppt/slides/slide30.xml><?xml version="1.0" encoding="utf-8"?>
+<p:sld xmlns:a="http://schemas.openxmlformats.org/drawingml/2006/main" xmlns:r="http://schemas.openxmlformats.org/officeDocument/2006/relationships" xmlns:p="http://schemas.openxmlformats.org/presentationml/2006/main">
+  <p:cSld>
+    <p:spTree>
+      <p:nvGrpSpPr>
+        <p:cNvPr id="1" name=""/>
+        <p:cNvGrpSpPr/>
+        <p:nvPr/>
+      </p:nvGrpSpPr>
+      <p:grpSpPr>
+        <a:xfrm>
+          <a:off x="0" y="0"/>
+          <a:ext cx="0" cy="0"/>
+          <a:chOff x="0" y="0"/>
+          <a:chExt cx="0" cy="0"/>
+        </a:xfrm>
+      </p:grpSpPr>
+      <p:sp>
+        <p:nvSpPr>
+          <p:cNvPr id="2" name="Title 1"/>
+          <p:cNvSpPr>
+            <a:spLocks noGrp="1"/>
+          </p:cNvSpPr>
+          <p:nvPr>
+            <p:ph type="title"/>
+          </p:nvPr>
+        </p:nvSpPr>
+        <p:spPr/>
+        <p:txBody>
+          <a:bodyPr/>
+          <a:lstStyle/>
+          <a:p>
+            <a:pPr lvl="0" marL="0" indent="0">
+              <a:buNone/>
+            </a:pPr>
+            <a:r>
+              <a:rPr/>
+              <a:t>Trend</a:t>
+            </a:r>
+            <a:r>
+              <a:rPr/>
+              <a:t> </a:t>
+            </a:r>
+            <a:r>
+              <a:rPr/>
+              <a:t>lines</a:t>
+            </a:r>
+            <a:r>
+              <a:rPr/>
+              <a:t> </a:t>
+            </a:r>
+            <a:r>
+              <a:rPr/>
+              <a:t>(logistic)</a:t>
+            </a:r>
+          </a:p>
+        </p:txBody>
+      </p:sp>
+      <p:sp>
+        <p:nvSpPr>
+          <p:cNvPr id="3" name="Content Placeholder 2"/>
+          <p:cNvSpPr>
+            <a:spLocks noGrp="1"/>
+          </p:cNvSpPr>
+          <p:nvPr>
+            <p:ph idx="1"/>
+          </p:nvPr>
+        </p:nvSpPr>
+        <p:spPr/>
+        <p:txBody>
+          <a:bodyPr/>
+          <a:lstStyle/>
+          <a:p>
+            <a:pPr lvl="0" marL="0" indent="0">
+              <a:buNone/>
+            </a:pPr>
+            <a:r>
+              <a:rPr/>
+              <a:t>((Need a different data set here. Titanic???))</a:t>
+            </a:r>
+          </a:p>
+        </p:txBody>
+      </p:sp>
+    </p:spTree>
+  </p:cSld>
+</p:sld>
+</file>
+
+<file path=ppt/slides/slide31.xml><?xml version="1.0" encoding="utf-8"?>
+<p:sld xmlns:a="http://schemas.openxmlformats.org/drawingml/2006/main" xmlns:r="http://schemas.openxmlformats.org/officeDocument/2006/relationships" xmlns:p="http://schemas.openxmlformats.org/presentationml/2006/main">
+  <p:cSld>
+    <p:spTree>
+      <p:nvGrpSpPr>
+        <p:cNvPr id="1" name=""/>
+        <p:cNvGrpSpPr/>
+        <p:nvPr/>
+      </p:nvGrpSpPr>
+      <p:grpSpPr>
+        <a:xfrm>
+          <a:off x="0" y="0"/>
+          <a:ext cx="0" cy="0"/>
+          <a:chOff x="0" y="0"/>
+          <a:chExt cx="0" cy="0"/>
+        </a:xfrm>
+      </p:grpSpPr>
+      <p:sp>
+        <p:nvSpPr>
+          <p:cNvPr id="2" name="Title 1"/>
+          <p:cNvSpPr>
+            <a:spLocks noGrp="1"/>
+          </p:cNvSpPr>
+          <p:nvPr>
+            <p:ph type="title"/>
+          </p:nvPr>
+        </p:nvSpPr>
+        <p:spPr/>
+        <p:txBody>
+          <a:bodyPr/>
+          <a:lstStyle/>
+          <a:p>
+            <a:pPr lvl="0" marL="0" indent="0">
+              <a:buNone/>
+            </a:pPr>
+            <a:r>
+              <a:rPr/>
+              <a:t>Helpful</a:t>
+            </a:r>
+            <a:r>
+              <a:rPr/>
+              <a:t> </a:t>
+            </a:r>
+            <a:r>
+              <a:rPr/>
+              <a:t>tips</a:t>
+            </a:r>
+          </a:p>
+        </p:txBody>
+      </p:sp>
+      <p:sp>
+        <p:nvSpPr>
+          <p:cNvPr id="3" name="Content Placeholder 2"/>
+          <p:cNvSpPr>
+            <a:spLocks noGrp="1"/>
+          </p:cNvSpPr>
+          <p:nvPr>
+            <p:ph idx="1"/>
+          </p:nvPr>
+        </p:nvSpPr>
+        <p:spPr/>
+        <p:txBody>
+          <a:bodyPr/>
+          <a:lstStyle/>
+          <a:p>
+            <a:pPr lvl="0" marL="0" indent="0">
+              <a:buNone/>
+            </a:pPr>
+            <a:r>
+              <a:rPr/>
+              <a:t>((Add three or four slides here. Maybe talk about opacity.))</a:t>
+            </a:r>
+          </a:p>
+        </p:txBody>
+      </p:sp>
+    </p:spTree>
+  </p:cSld>
+</p:sld>
+</file>
+
+<file path=ppt/slides/slide32.xml><?xml version="1.0" encoding="utf-8"?>
 <p:sld xmlns:a="http://schemas.openxmlformats.org/drawingml/2006/main" xmlns:r="http://schemas.openxmlformats.org/officeDocument/2006/relationships" xmlns:p="http://schemas.openxmlformats.org/presentationml/2006/main">
   <p:cSld>
     <p:spTree>

</xml_diff>

<commit_message>
Added axis range discussion to line graph fundamentals.
</commit_message>
<xml_diff>
--- a/data-viz-03/component/fundamentals.pptx
+++ b/data-viz-03/component/fundamentals.pptx
@@ -2404,6 +2404,732 @@
 </file>
 
 <file path=ppt/notesSlides/notesSlide6.xml><?xml version="1.0" encoding="utf-8"?>
+<p:notes xmlns:a="http://schemas.openxmlformats.org/drawingml/2006/main" xmlns:r="http://schemas.openxmlformats.org/officeDocument/2006/relationships" xmlns:p="http://schemas.openxmlformats.org/presentationml/2006/main">
+  <p:cSld>
+    <p:spTree>
+      <p:nvGrpSpPr>
+        <p:cNvPr id="1" name=""/>
+        <p:cNvGrpSpPr/>
+        <p:nvPr/>
+      </p:nvGrpSpPr>
+      <p:grpSpPr>
+        <a:xfrm>
+          <a:off x="0" y="0"/>
+          <a:ext cx="0" cy="0"/>
+          <a:chOff x="0" y="0"/>
+          <a:chExt cx="0" cy="0"/>
+        </a:xfrm>
+      </p:grpSpPr>
+      <p:sp>
+        <p:nvSpPr>
+          <p:cNvPr id="2" name="Slide Image Placeholder 1"/>
+          <p:cNvSpPr>
+            <a:spLocks noGrp="1" noRot="1" noChangeAspect="1"/>
+          </p:cNvSpPr>
+          <p:nvPr>
+            <p:ph type="sldImg"/>
+          </p:nvPr>
+        </p:nvSpPr>
+        <p:spPr/>
+      </p:sp>
+      <p:sp>
+        <p:nvSpPr>
+          <p:cNvPr id="3" name="Notes Placeholder 2"/>
+          <p:cNvSpPr>
+            <a:spLocks noGrp="1"/>
+          </p:cNvSpPr>
+          <p:nvPr>
+            <p:ph type="body" idx="1"/>
+          </p:nvPr>
+        </p:nvSpPr>
+        <p:spPr/>
+        <p:txBody>
+          <a:bodyPr/>
+          <a:lstStyle/>
+          <a:p>
+            <a:pPr lvl="0" marL="0" indent="0">
+              <a:buNone/>
+            </a:pPr>
+            <a:r>
+              <a:rPr/>
+              <a:t>Here’s</a:t>
+            </a:r>
+            <a:r>
+              <a:rPr/>
+              <a:t> </a:t>
+            </a:r>
+            <a:r>
+              <a:rPr/>
+              <a:t>the</a:t>
+            </a:r>
+            <a:r>
+              <a:rPr/>
+              <a:t> </a:t>
+            </a:r>
+            <a:r>
+              <a:rPr/>
+              <a:t>housing</a:t>
+            </a:r>
+            <a:r>
+              <a:rPr/>
+              <a:t> </a:t>
+            </a:r>
+            <a:r>
+              <a:rPr/>
+              <a:t>data</a:t>
+            </a:r>
+            <a:r>
+              <a:rPr/>
+              <a:t> </a:t>
+            </a:r>
+            <a:r>
+              <a:rPr/>
+              <a:t>set</a:t>
+            </a:r>
+            <a:r>
+              <a:rPr/>
+              <a:t> </a:t>
+            </a:r>
+            <a:r>
+              <a:rPr/>
+              <a:t>that</a:t>
+            </a:r>
+            <a:r>
+              <a:rPr/>
+              <a:t> </a:t>
+            </a:r>
+            <a:r>
+              <a:rPr/>
+              <a:t>we</a:t>
+            </a:r>
+            <a:r>
+              <a:rPr/>
+              <a:t> </a:t>
+            </a:r>
+            <a:r>
+              <a:rPr/>
+              <a:t>looked</a:t>
+            </a:r>
+            <a:r>
+              <a:rPr/>
+              <a:t> </a:t>
+            </a:r>
+            <a:r>
+              <a:rPr/>
+              <a:t>at</a:t>
+            </a:r>
+            <a:r>
+              <a:rPr/>
+              <a:t> </a:t>
+            </a:r>
+            <a:r>
+              <a:rPr/>
+              <a:t>earlier.</a:t>
+            </a:r>
+            <a:r>
+              <a:rPr/>
+              <a:t> </a:t>
+            </a:r>
+            <a:r>
+              <a:rPr/>
+              <a:t>This</a:t>
+            </a:r>
+            <a:r>
+              <a:rPr/>
+              <a:t> </a:t>
+            </a:r>
+            <a:r>
+              <a:rPr/>
+              <a:t>scatterplot</a:t>
+            </a:r>
+            <a:r>
+              <a:rPr/>
+              <a:t> </a:t>
+            </a:r>
+            <a:r>
+              <a:rPr/>
+              <a:t>shows</a:t>
+            </a:r>
+            <a:r>
+              <a:rPr/>
+              <a:t> </a:t>
+            </a:r>
+            <a:r>
+              <a:rPr/>
+              <a:t>the</a:t>
+            </a:r>
+            <a:r>
+              <a:rPr/>
+              <a:t> </a:t>
+            </a:r>
+            <a:r>
+              <a:rPr/>
+              <a:t>relationship</a:t>
+            </a:r>
+            <a:r>
+              <a:rPr/>
+              <a:t> </a:t>
+            </a:r>
+            <a:r>
+              <a:rPr/>
+              <a:t>between</a:t>
+            </a:r>
+            <a:r>
+              <a:rPr/>
+              <a:t> </a:t>
+            </a:r>
+            <a:r>
+              <a:rPr/>
+              <a:t>number</a:t>
+            </a:r>
+            <a:r>
+              <a:rPr/>
+              <a:t> </a:t>
+            </a:r>
+            <a:r>
+              <a:rPr/>
+              <a:t>of</a:t>
+            </a:r>
+            <a:r>
+              <a:rPr/>
+              <a:t> </a:t>
+            </a:r>
+            <a:r>
+              <a:rPr/>
+              <a:t>bedrooms</a:t>
+            </a:r>
+            <a:r>
+              <a:rPr/>
+              <a:t> </a:t>
+            </a:r>
+            <a:r>
+              <a:rPr/>
+              <a:t>and</a:t>
+            </a:r>
+            <a:r>
+              <a:rPr/>
+              <a:t> </a:t>
+            </a:r>
+            <a:r>
+              <a:rPr/>
+              <a:t>price.</a:t>
+            </a:r>
+          </a:p>
+        </p:txBody>
+      </p:sp>
+      <p:sp>
+        <p:nvSpPr>
+          <p:cNvPr id="4" name="Slide Number Placeholder 3"/>
+          <p:cNvSpPr>
+            <a:spLocks noGrp="1"/>
+          </p:cNvSpPr>
+          <p:nvPr>
+            <p:ph type="sldNum" sz="quarter" idx="10"/>
+          </p:nvPr>
+        </p:nvSpPr>
+        <p:spPr/>
+        <p:txBody>
+          <a:bodyPr/>
+          <a:lstStyle/>
+          <a:p>
+            <a:fld id="{18BDFEC3-8487-43E8-A154-7C12CBC1FFF2}" type="slidenum">
+              <a:rPr lang="en-US"/>
+              <a:t>11</a:t>
+            </a:fld>
+            <a:endParaRPr lang="en-US"/>
+          </a:p>
+        </p:txBody>
+      </p:sp>
+    </p:spTree>
+  </p:cSld>
+</p:notes>
+</file>
+
+<file path=ppt/notesSlides/notesSlide7.xml><?xml version="1.0" encoding="utf-8"?>
+<p:notes xmlns:a="http://schemas.openxmlformats.org/drawingml/2006/main" xmlns:r="http://schemas.openxmlformats.org/officeDocument/2006/relationships" xmlns:p="http://schemas.openxmlformats.org/presentationml/2006/main">
+  <p:cSld>
+    <p:spTree>
+      <p:nvGrpSpPr>
+        <p:cNvPr id="1" name=""/>
+        <p:cNvGrpSpPr/>
+        <p:nvPr/>
+      </p:nvGrpSpPr>
+      <p:grpSpPr>
+        <a:xfrm>
+          <a:off x="0" y="0"/>
+          <a:ext cx="0" cy="0"/>
+          <a:chOff x="0" y="0"/>
+          <a:chExt cx="0" cy="0"/>
+        </a:xfrm>
+      </p:grpSpPr>
+      <p:sp>
+        <p:nvSpPr>
+          <p:cNvPr id="2" name="Slide Image Placeholder 1"/>
+          <p:cNvSpPr>
+            <a:spLocks noGrp="1" noRot="1" noChangeAspect="1"/>
+          </p:cNvSpPr>
+          <p:nvPr>
+            <p:ph type="sldImg"/>
+          </p:nvPr>
+        </p:nvSpPr>
+        <p:spPr/>
+      </p:sp>
+      <p:sp>
+        <p:nvSpPr>
+          <p:cNvPr id="3" name="Notes Placeholder 2"/>
+          <p:cNvSpPr>
+            <a:spLocks noGrp="1"/>
+          </p:cNvSpPr>
+          <p:nvPr>
+            <p:ph type="body" idx="1"/>
+          </p:nvPr>
+        </p:nvSpPr>
+        <p:spPr/>
+        <p:txBody>
+          <a:bodyPr/>
+          <a:lstStyle/>
+          <a:p>
+            <a:pPr lvl="0" marL="0" indent="0">
+              <a:buNone/>
+            </a:pPr>
+            <a:r>
+              <a:rPr/>
+              <a:t>Here</a:t>
+            </a:r>
+            <a:r>
+              <a:rPr/>
+              <a:t> </a:t>
+            </a:r>
+            <a:r>
+              <a:rPr/>
+              <a:t>is</a:t>
+            </a:r>
+            <a:r>
+              <a:rPr/>
+              <a:t> </a:t>
+            </a:r>
+            <a:r>
+              <a:rPr/>
+              <a:t>the</a:t>
+            </a:r>
+            <a:r>
+              <a:rPr/>
+              <a:t> </a:t>
+            </a:r>
+            <a:r>
+              <a:rPr/>
+              <a:t>R</a:t>
+            </a:r>
+            <a:r>
+              <a:rPr/>
+              <a:t> </a:t>
+            </a:r>
+            <a:r>
+              <a:rPr/>
+              <a:t>code.</a:t>
+            </a:r>
+            <a:r>
+              <a:rPr/>
+              <a:t> </a:t>
+            </a:r>
+            <a:r>
+              <a:rPr/>
+              <a:t>You</a:t>
+            </a:r>
+            <a:r>
+              <a:rPr/>
+              <a:t> </a:t>
+            </a:r>
+            <a:r>
+              <a:rPr/>
+              <a:t>need</a:t>
+            </a:r>
+            <a:r>
+              <a:rPr/>
+              <a:t> </a:t>
+            </a:r>
+            <a:r>
+              <a:rPr/>
+              <a:t>the</a:t>
+            </a:r>
+            <a:r>
+              <a:rPr/>
+              <a:t> </a:t>
+            </a:r>
+            <a:r>
+              <a:rPr/>
+              <a:t>stat_summary</a:t>
+            </a:r>
+            <a:r>
+              <a:rPr/>
+              <a:t> </a:t>
+            </a:r>
+            <a:r>
+              <a:rPr/>
+              <a:t>function</a:t>
+            </a:r>
+            <a:r>
+              <a:rPr/>
+              <a:t> </a:t>
+            </a:r>
+            <a:r>
+              <a:rPr/>
+              <a:t>to</a:t>
+            </a:r>
+            <a:r>
+              <a:rPr/>
+              <a:t> </a:t>
+            </a:r>
+            <a:r>
+              <a:rPr/>
+              <a:t>create</a:t>
+            </a:r>
+            <a:r>
+              <a:rPr/>
+              <a:t> </a:t>
+            </a:r>
+            <a:r>
+              <a:rPr/>
+              <a:t>averages</a:t>
+            </a:r>
+            <a:r>
+              <a:rPr/>
+              <a:t> </a:t>
+            </a:r>
+            <a:r>
+              <a:rPr/>
+              <a:t>for</a:t>
+            </a:r>
+            <a:r>
+              <a:rPr/>
+              <a:t> </a:t>
+            </a:r>
+            <a:r>
+              <a:rPr/>
+              <a:t>y</a:t>
+            </a:r>
+            <a:r>
+              <a:rPr/>
+              <a:t> </a:t>
+            </a:r>
+            <a:r>
+              <a:rPr/>
+              <a:t>at</a:t>
+            </a:r>
+            <a:r>
+              <a:rPr/>
+              <a:t> </a:t>
+            </a:r>
+            <a:r>
+              <a:rPr/>
+              <a:t>each</a:t>
+            </a:r>
+            <a:r>
+              <a:rPr/>
+              <a:t> </a:t>
+            </a:r>
+            <a:r>
+              <a:rPr/>
+              <a:t>discrete</a:t>
+            </a:r>
+            <a:r>
+              <a:rPr/>
+              <a:t> </a:t>
+            </a:r>
+            <a:r>
+              <a:rPr/>
+              <a:t>value</a:t>
+            </a:r>
+            <a:r>
+              <a:rPr/>
+              <a:t> </a:t>
+            </a:r>
+            <a:r>
+              <a:rPr/>
+              <a:t>of</a:t>
+            </a:r>
+            <a:r>
+              <a:rPr/>
+              <a:t> </a:t>
+            </a:r>
+            <a:r>
+              <a:rPr/>
+              <a:t>X.</a:t>
+            </a:r>
+          </a:p>
+        </p:txBody>
+      </p:sp>
+      <p:sp>
+        <p:nvSpPr>
+          <p:cNvPr id="4" name="Slide Number Placeholder 3"/>
+          <p:cNvSpPr>
+            <a:spLocks noGrp="1"/>
+          </p:cNvSpPr>
+          <p:nvPr>
+            <p:ph type="sldNum" sz="quarter" idx="10"/>
+          </p:nvPr>
+        </p:nvSpPr>
+        <p:spPr/>
+        <p:txBody>
+          <a:bodyPr/>
+          <a:lstStyle/>
+          <a:p>
+            <a:fld id="{18BDFEC3-8487-43E8-A154-7C12CBC1FFF2}" type="slidenum">
+              <a:rPr lang="en-US"/>
+              <a:t>12</a:t>
+            </a:fld>
+            <a:endParaRPr lang="en-US"/>
+          </a:p>
+        </p:txBody>
+      </p:sp>
+    </p:spTree>
+  </p:cSld>
+</p:notes>
+</file>
+
+<file path=ppt/notesSlides/notesSlide8.xml><?xml version="1.0" encoding="utf-8"?>
+<p:notes xmlns:a="http://schemas.openxmlformats.org/drawingml/2006/main" xmlns:r="http://schemas.openxmlformats.org/officeDocument/2006/relationships" xmlns:p="http://schemas.openxmlformats.org/presentationml/2006/main">
+  <p:cSld>
+    <p:spTree>
+      <p:nvGrpSpPr>
+        <p:cNvPr id="1" name=""/>
+        <p:cNvGrpSpPr/>
+        <p:nvPr/>
+      </p:nvGrpSpPr>
+      <p:grpSpPr>
+        <a:xfrm>
+          <a:off x="0" y="0"/>
+          <a:ext cx="0" cy="0"/>
+          <a:chOff x="0" y="0"/>
+          <a:chExt cx="0" cy="0"/>
+        </a:xfrm>
+      </p:grpSpPr>
+      <p:sp>
+        <p:nvSpPr>
+          <p:cNvPr id="2" name="Slide Image Placeholder 1"/>
+          <p:cNvSpPr>
+            <a:spLocks noGrp="1" noRot="1" noChangeAspect="1"/>
+          </p:cNvSpPr>
+          <p:nvPr>
+            <p:ph type="sldImg"/>
+          </p:nvPr>
+        </p:nvSpPr>
+        <p:spPr/>
+      </p:sp>
+      <p:sp>
+        <p:nvSpPr>
+          <p:cNvPr id="3" name="Notes Placeholder 2"/>
+          <p:cNvSpPr>
+            <a:spLocks noGrp="1"/>
+          </p:cNvSpPr>
+          <p:nvPr>
+            <p:ph type="body" idx="1"/>
+          </p:nvPr>
+        </p:nvSpPr>
+        <p:spPr/>
+        <p:txBody>
+          <a:bodyPr/>
+          <a:lstStyle/>
+          <a:p>
+            <a:pPr lvl="0" marL="0" indent="0">
+              <a:buNone/>
+            </a:pPr>
+            <a:r>
+              <a:rPr/>
+              <a:t>There</a:t>
+            </a:r>
+            <a:r>
+              <a:rPr/>
+              <a:t> </a:t>
+            </a:r>
+            <a:r>
+              <a:rPr/>
+              <a:t>is</a:t>
+            </a:r>
+            <a:r>
+              <a:rPr/>
+              <a:t> </a:t>
+            </a:r>
+            <a:r>
+              <a:rPr/>
+              <a:t>a</a:t>
+            </a:r>
+            <a:r>
+              <a:rPr/>
+              <a:t> </a:t>
+            </a:r>
+            <a:r>
+              <a:rPr/>
+              <a:t>clear</a:t>
+            </a:r>
+            <a:r>
+              <a:rPr/>
+              <a:t> </a:t>
+            </a:r>
+            <a:r>
+              <a:rPr/>
+              <a:t>and</a:t>
+            </a:r>
+            <a:r>
+              <a:rPr/>
+              <a:t> </a:t>
+            </a:r>
+            <a:r>
+              <a:rPr/>
+              <a:t>consistnet</a:t>
+            </a:r>
+            <a:r>
+              <a:rPr/>
+              <a:t> </a:t>
+            </a:r>
+            <a:r>
+              <a:rPr/>
+              <a:t>trend</a:t>
+            </a:r>
+            <a:r>
+              <a:rPr/>
+              <a:t> </a:t>
+            </a:r>
+            <a:r>
+              <a:rPr/>
+              <a:t>in</a:t>
+            </a:r>
+            <a:r>
+              <a:rPr/>
+              <a:t> </a:t>
+            </a:r>
+            <a:r>
+              <a:rPr/>
+              <a:t>the</a:t>
+            </a:r>
+            <a:r>
+              <a:rPr/>
+              <a:t> </a:t>
+            </a:r>
+            <a:r>
+              <a:rPr/>
+              <a:t>average</a:t>
+            </a:r>
+            <a:r>
+              <a:rPr/>
+              <a:t> </a:t>
+            </a:r>
+            <a:r>
+              <a:rPr/>
+              <a:t>price.</a:t>
+            </a:r>
+            <a:r>
+              <a:rPr/>
+              <a:t> </a:t>
+            </a:r>
+            <a:r>
+              <a:rPr/>
+              <a:t>As</a:t>
+            </a:r>
+            <a:r>
+              <a:rPr/>
+              <a:t> </a:t>
+            </a:r>
+            <a:r>
+              <a:rPr/>
+              <a:t>the</a:t>
+            </a:r>
+            <a:r>
+              <a:rPr/>
+              <a:t> </a:t>
+            </a:r>
+            <a:r>
+              <a:rPr/>
+              <a:t>number</a:t>
+            </a:r>
+            <a:r>
+              <a:rPr/>
+              <a:t> </a:t>
+            </a:r>
+            <a:r>
+              <a:rPr/>
+              <a:t>of</a:t>
+            </a:r>
+            <a:r>
+              <a:rPr/>
+              <a:t> </a:t>
+            </a:r>
+            <a:r>
+              <a:rPr/>
+              <a:t>bedrooms</a:t>
+            </a:r>
+            <a:r>
+              <a:rPr/>
+              <a:t> </a:t>
+            </a:r>
+            <a:r>
+              <a:rPr/>
+              <a:t>increase,</a:t>
+            </a:r>
+            <a:r>
+              <a:rPr/>
+              <a:t> </a:t>
+            </a:r>
+            <a:r>
+              <a:rPr/>
+              <a:t>the</a:t>
+            </a:r>
+            <a:r>
+              <a:rPr/>
+              <a:t> </a:t>
+            </a:r>
+            <a:r>
+              <a:rPr/>
+              <a:t>average</a:t>
+            </a:r>
+            <a:r>
+              <a:rPr/>
+              <a:t> </a:t>
+            </a:r>
+            <a:r>
+              <a:rPr/>
+              <a:t>price</a:t>
+            </a:r>
+            <a:r>
+              <a:rPr/>
+              <a:t> </a:t>
+            </a:r>
+            <a:r>
+              <a:rPr/>
+              <a:t>increases.</a:t>
+            </a:r>
+          </a:p>
+        </p:txBody>
+      </p:sp>
+      <p:sp>
+        <p:nvSpPr>
+          <p:cNvPr id="4" name="Slide Number Placeholder 3"/>
+          <p:cNvSpPr>
+            <a:spLocks noGrp="1"/>
+          </p:cNvSpPr>
+          <p:nvPr>
+            <p:ph type="sldNum" sz="quarter" idx="10"/>
+          </p:nvPr>
+        </p:nvSpPr>
+        <p:spPr/>
+        <p:txBody>
+          <a:bodyPr/>
+          <a:lstStyle/>
+          <a:p>
+            <a:fld id="{18BDFEC3-8487-43E8-A154-7C12CBC1FFF2}" type="slidenum">
+              <a:rPr lang="en-US"/>
+              <a:t>13</a:t>
+            </a:fld>
+            <a:endParaRPr lang="en-US"/>
+          </a:p>
+        </p:txBody>
+      </p:sp>
+    </p:spTree>
+  </p:cSld>
+</p:notes>
+</file>
+
+<file path=ppt/notesSlides/notesSlide9.xml><?xml version="1.0" encoding="utf-8"?>
 <p:notes xmlns:a="http://schemas.openxmlformats.org/drawingml/2006/main" xmlns:r="http://schemas.openxmlformats.org/officeDocument/2006/relationships" xmlns:p="http://schemas.openxmlformats.org/presentationml/2006/main">
   <p:cSld>
     <p:spTree>
@@ -5746,31 +6472,169 @@
             </a:r>
             <a:r>
               <a:rPr/>
-              <a:t>Lines</a:t>
-            </a:r>
-            <a:r>
-              <a:rPr/>
-              <a:t> </a:t>
-            </a:r>
-            <a:r>
-              <a:rPr/>
-              <a:t>as</a:t>
-            </a:r>
-            <a:r>
-              <a:rPr/>
-              <a:t> </a:t>
-            </a:r>
-            <a:r>
-              <a:rPr/>
-              <a:t>summary</a:t>
-            </a:r>
-            <a:r>
-              <a:rPr/>
-              <a:t> </a:t>
-            </a:r>
-            <a:r>
-              <a:rPr/>
-              <a:t>statistics</a:t>
+              <a:t>Adding</a:t>
+            </a:r>
+            <a:r>
+              <a:rPr/>
+              <a:t> </a:t>
+            </a:r>
+            <a:r>
+              <a:rPr/>
+              <a:t>lines</a:t>
+            </a:r>
+            <a:r>
+              <a:rPr/>
+              <a:t> </a:t>
+            </a:r>
+            <a:r>
+              <a:rPr/>
+              <a:t>to</a:t>
+            </a:r>
+            <a:r>
+              <a:rPr/>
+              <a:t> </a:t>
+            </a:r>
+            <a:r>
+              <a:rPr/>
+              <a:t>a</a:t>
+            </a:r>
+            <a:r>
+              <a:rPr/>
+              <a:t> </a:t>
+            </a:r>
+            <a:r>
+              <a:rPr/>
+              <a:t>scatterplot</a:t>
+            </a:r>
+          </a:p>
+        </p:txBody>
+      </p:sp>
+      <p:sp>
+        <p:nvSpPr>
+          <p:cNvPr id="3" name="Content Placeholder 2"/>
+          <p:cNvSpPr>
+            <a:spLocks noGrp="1"/>
+          </p:cNvSpPr>
+          <p:nvPr>
+            <p:ph idx="1"/>
+          </p:nvPr>
+        </p:nvSpPr>
+        <p:spPr/>
+        <p:txBody>
+          <a:bodyPr/>
+          <a:lstStyle/>
+          <a:p>
+            <a:pPr lvl="1"/>
+            <a:r>
+              <a:rPr/>
+              <a:t>Lines can emphasize patterns in a scatterplot</a:t>
+            </a:r>
+          </a:p>
+          <a:p>
+            <a:pPr lvl="2"/>
+            <a:r>
+              <a:rPr/>
+              <a:t>Connect means</a:t>
+            </a:r>
+          </a:p>
+          <a:p>
+            <a:pPr lvl="2"/>
+            <a:r>
+              <a:rPr/>
+              <a:t>Linear regression</a:t>
+            </a:r>
+          </a:p>
+          <a:p>
+            <a:pPr lvl="2"/>
+            <a:r>
+              <a:rPr/>
+              <a:t>Moving average</a:t>
+            </a:r>
+          </a:p>
+          <a:p>
+            <a:pPr lvl="2"/>
+            <a:r>
+              <a:rPr/>
+              <a:t>Smoothing splines</a:t>
+            </a:r>
+          </a:p>
+        </p:txBody>
+      </p:sp>
+    </p:spTree>
+  </p:cSld>
+</p:sld>
+</file>
+
+<file path=ppt/slides/slide11.xml><?xml version="1.0" encoding="utf-8"?>
+<p:sld xmlns:a="http://schemas.openxmlformats.org/drawingml/2006/main" xmlns:r="http://schemas.openxmlformats.org/officeDocument/2006/relationships" xmlns:p="http://schemas.openxmlformats.org/presentationml/2006/main">
+  <p:cSld>
+    <p:spTree>
+      <p:nvGrpSpPr>
+        <p:cNvPr id="1" name=""/>
+        <p:cNvGrpSpPr/>
+        <p:nvPr/>
+      </p:nvGrpSpPr>
+      <p:grpSpPr>
+        <a:xfrm>
+          <a:off x="0" y="0"/>
+          <a:ext cx="0" cy="0"/>
+          <a:chOff x="0" y="0"/>
+          <a:chExt cx="0" cy="0"/>
+        </a:xfrm>
+      </p:grpSpPr>
+      <p:sp>
+        <p:nvSpPr>
+          <p:cNvPr id="2" name="Title 1"/>
+          <p:cNvSpPr>
+            <a:spLocks noGrp="1"/>
+          </p:cNvSpPr>
+          <p:nvPr>
+            <p:ph type="title"/>
+          </p:nvPr>
+        </p:nvSpPr>
+        <p:spPr/>
+        <p:txBody>
+          <a:bodyPr/>
+          <a:lstStyle/>
+          <a:p>
+            <a:pPr lvl="0" marL="0" indent="0">
+              <a:buNone/>
+            </a:pPr>
+            <a:r>
+              <a:rPr/>
+              <a:t>Fundamentals,</a:t>
+            </a:r>
+            <a:r>
+              <a:rPr/>
+              <a:t> </a:t>
+            </a:r>
+            <a:r>
+              <a:rPr/>
+              <a:t>Review</a:t>
+            </a:r>
+            <a:r>
+              <a:rPr/>
+              <a:t> </a:t>
+            </a:r>
+            <a:r>
+              <a:rPr/>
+              <a:t>an</a:t>
+            </a:r>
+            <a:r>
+              <a:rPr/>
+              <a:t> </a:t>
+            </a:r>
+            <a:r>
+              <a:rPr/>
+              <a:t>earlier</a:t>
+            </a:r>
+            <a:r>
+              <a:rPr/>
+              <a:t> </a:t>
+            </a:r>
+            <a:r>
+              <a:rPr/>
+              <a:t>scatterplot</a:t>
             </a:r>
           </a:p>
         </p:txBody>
@@ -5810,77 +6674,6 @@
 </p:sld>
 </file>
 
-<file path=ppt/slides/slide11.xml><?xml version="1.0" encoding="utf-8"?>
-<p:sld xmlns:a="http://schemas.openxmlformats.org/drawingml/2006/main" xmlns:r="http://schemas.openxmlformats.org/officeDocument/2006/relationships" xmlns:p="http://schemas.openxmlformats.org/presentationml/2006/main">
-  <p:cSld>
-    <p:spTree>
-      <p:nvGrpSpPr>
-        <p:cNvPr id="1" name=""/>
-        <p:cNvGrpSpPr/>
-        <p:nvPr/>
-      </p:nvGrpSpPr>
-      <p:grpSpPr>
-        <a:xfrm>
-          <a:off x="0" y="0"/>
-          <a:ext cx="0" cy="0"/>
-          <a:chOff x="0" y="0"/>
-          <a:chExt cx="0" cy="0"/>
-        </a:xfrm>
-      </p:grpSpPr>
-      <p:sp>
-        <p:nvSpPr>
-          <p:cNvPr id="2" name="Title 1"/>
-          <p:cNvSpPr>
-            <a:spLocks noGrp="1"/>
-          </p:cNvSpPr>
-          <p:nvPr>
-            <p:ph type="title"/>
-          </p:nvPr>
-        </p:nvSpPr>
-        <p:spPr/>
-        <p:txBody>
-          <a:bodyPr/>
-          <a:lstStyle/>
-          <a:p>
-            <a:pPr lvl="0" marL="0" indent="0">
-              <a:buNone/>
-            </a:pPr>
-            <a:r>
-              <a:rPr/>
-              <a:t>Fundamentals,</a:t>
-            </a:r>
-            <a:r>
-              <a:rPr/>
-              <a:t> </a:t>
-            </a:r>
-            <a:r>
-              <a:rPr/>
-              <a:t>Lines</a:t>
-            </a:r>
-            <a:r>
-              <a:rPr/>
-              <a:t> </a:t>
-            </a:r>
-            <a:r>
-              <a:rPr/>
-              <a:t>as</a:t>
-            </a:r>
-            <a:r>
-              <a:rPr/>
-              <a:t> </a:t>
-            </a:r>
-            <a:r>
-              <a:rPr/>
-              <a:t>averages</a:t>
-            </a:r>
-          </a:p>
-        </p:txBody>
-      </p:sp>
-    </p:spTree>
-  </p:cSld>
-</p:sld>
-</file>
-
 <file path=ppt/slides/slide12.xml><?xml version="1.0" encoding="utf-8"?>
 <p:sld xmlns:a="http://schemas.openxmlformats.org/drawingml/2006/main" xmlns:r="http://schemas.openxmlformats.org/officeDocument/2006/relationships" xmlns:p="http://schemas.openxmlformats.org/presentationml/2006/main">
   <p:cSld>
@@ -5918,15 +6711,47 @@
             </a:pPr>
             <a:r>
               <a:rPr/>
+              <a:t>Fundamentals,</a:t>
+            </a:r>
+            <a:r>
+              <a:rPr/>
+              <a:t> </a:t>
+            </a:r>
+            <a:r>
+              <a:rPr/>
+              <a:t>Lines</a:t>
+            </a:r>
+            <a:r>
+              <a:rPr/>
+              <a:t> </a:t>
+            </a:r>
+            <a:r>
+              <a:rPr/>
+              <a:t>at</a:t>
+            </a:r>
+            <a:r>
+              <a:rPr/>
+              <a:t> </a:t>
+            </a:r>
+            <a:r>
+              <a:rPr/>
+              <a:t>individual</a:t>
+            </a:r>
+            <a:r>
+              <a:rPr/>
+              <a:t> </a:t>
+            </a:r>
+            <a:r>
+              <a:rPr/>
+              <a:t>averages,</a:t>
+            </a:r>
+            <a:r>
+              <a:rPr/>
+              <a:t> </a:t>
+            </a:r>
+            <a:r>
+              <a:rPr/>
               <a:t>R</a:t>
-            </a:r>
-            <a:r>
-              <a:rPr/>
-              <a:t> </a:t>
-            </a:r>
-            <a:r>
-              <a:rPr/>
-              <a:t>code</a:t>
             </a:r>
           </a:p>
         </p:txBody>
@@ -6031,7 +6856,7 @@
           <p:nvPr/>
         </p:nvPicPr>
         <p:blipFill>
-          <a:blip r:embed="rId2"/>
+          <a:blip r:embed="rId3"/>
           <a:stretch>
             <a:fillRect/>
           </a:stretch>
@@ -6094,15 +6919,47 @@
             </a:pPr>
             <a:r>
               <a:rPr/>
+              <a:t>Fundamentals,</a:t>
+            </a:r>
+            <a:r>
+              <a:rPr/>
+              <a:t> </a:t>
+            </a:r>
+            <a:r>
+              <a:rPr/>
+              <a:t>Lines</a:t>
+            </a:r>
+            <a:r>
+              <a:rPr/>
+              <a:t> </a:t>
+            </a:r>
+            <a:r>
+              <a:rPr/>
+              <a:t>at</a:t>
+            </a:r>
+            <a:r>
+              <a:rPr/>
+              <a:t> </a:t>
+            </a:r>
+            <a:r>
+              <a:rPr/>
+              <a:t>individual</a:t>
+            </a:r>
+            <a:r>
+              <a:rPr/>
+              <a:t> </a:t>
+            </a:r>
+            <a:r>
+              <a:rPr/>
+              <a:t>averages,</a:t>
+            </a:r>
+            <a:r>
+              <a:rPr/>
+              <a:t> </a:t>
+            </a:r>
+            <a:r>
+              <a:rPr/>
               <a:t>Python</a:t>
-            </a:r>
-            <a:r>
-              <a:rPr/>
-              <a:t> </a:t>
-            </a:r>
-            <a:r>
-              <a:rPr/>
-              <a:t>code</a:t>
             </a:r>
           </a:p>
         </p:txBody>

</xml_diff>

<commit_message>
MOre dots and dashes in data-viz-03
</commit_message>
<xml_diff>
--- a/data-viz-03/component/fundamentals.pptx
+++ b/data-viz-03/component/fundamentals.pptx
@@ -1056,23 +1056,191 @@
             </a:pPr>
             <a:r>
               <a:rPr/>
-              <a:t>If</a:t>
-            </a:r>
-            <a:r>
-              <a:rPr/>
-              <a:t> </a:t>
-            </a:r>
-            <a:r>
-              <a:rPr/>
-              <a:t>you</a:t>
-            </a:r>
-            <a:r>
-              <a:rPr/>
-              <a:t> </a:t>
-            </a:r>
-            <a:r>
-              <a:rPr/>
-              <a:t>have</a:t>
+              <a:t>Take</a:t>
+            </a:r>
+            <a:r>
+              <a:rPr/>
+              <a:t> </a:t>
+            </a:r>
+            <a:r>
+              <a:rPr/>
+              <a:t>the</a:t>
+            </a:r>
+            <a:r>
+              <a:rPr/>
+              <a:t> </a:t>
+            </a:r>
+            <a:r>
+              <a:rPr/>
+              <a:t>CPI</a:t>
+            </a:r>
+            <a:r>
+              <a:rPr/>
+              <a:t> </a:t>
+            </a:r>
+            <a:r>
+              <a:rPr/>
+              <a:t>line</a:t>
+            </a:r>
+            <a:r>
+              <a:rPr/>
+              <a:t> </a:t>
+            </a:r>
+            <a:r>
+              <a:rPr/>
+              <a:t>graph</a:t>
+            </a:r>
+            <a:r>
+              <a:rPr/>
+              <a:t> </a:t>
+            </a:r>
+            <a:r>
+              <a:rPr/>
+              <a:t>and</a:t>
+            </a:r>
+            <a:r>
+              <a:rPr/>
+              <a:t> </a:t>
+            </a:r>
+            <a:r>
+              <a:rPr/>
+              <a:t>modify</a:t>
+            </a:r>
+            <a:r>
+              <a:rPr/>
+              <a:t> </a:t>
+            </a:r>
+            <a:r>
+              <a:rPr/>
+              <a:t>some</a:t>
+            </a:r>
+            <a:r>
+              <a:rPr/>
+              <a:t> </a:t>
+            </a:r>
+            <a:r>
+              <a:rPr/>
+              <a:t>of</a:t>
+            </a:r>
+            <a:r>
+              <a:rPr/>
+              <a:t> </a:t>
+            </a:r>
+            <a:r>
+              <a:rPr/>
+              <a:t>the</a:t>
+            </a:r>
+            <a:r>
+              <a:rPr/>
+              <a:t> </a:t>
+            </a:r>
+            <a:r>
+              <a:rPr/>
+              <a:t>default</a:t>
+            </a:r>
+            <a:r>
+              <a:rPr/>
+              <a:t> </a:t>
+            </a:r>
+            <a:r>
+              <a:rPr/>
+              <a:t>options.</a:t>
+            </a:r>
+            <a:r>
+              <a:rPr/>
+              <a:t> </a:t>
+            </a:r>
+            <a:r>
+              <a:rPr/>
+              <a:t>Make</a:t>
+            </a:r>
+            <a:r>
+              <a:rPr/>
+              <a:t> </a:t>
+            </a:r>
+            <a:r>
+              <a:rPr/>
+              <a:t>the</a:t>
+            </a:r>
+            <a:r>
+              <a:rPr/>
+              <a:t> </a:t>
+            </a:r>
+            <a:r>
+              <a:rPr/>
+              <a:t>line</a:t>
+            </a:r>
+            <a:r>
+              <a:rPr/>
+              <a:t> </a:t>
+            </a:r>
+            <a:r>
+              <a:rPr/>
+              <a:t>green</a:t>
+            </a:r>
+            <a:r>
+              <a:rPr/>
+              <a:t> </a:t>
+            </a:r>
+            <a:r>
+              <a:rPr/>
+              <a:t>and</a:t>
+            </a:r>
+            <a:r>
+              <a:rPr/>
+              <a:t> </a:t>
+            </a:r>
+            <a:r>
+              <a:rPr/>
+              <a:t>increase</a:t>
+            </a:r>
+            <a:r>
+              <a:rPr/>
+              <a:t> </a:t>
+            </a:r>
+            <a:r>
+              <a:rPr/>
+              <a:t>the</a:t>
+            </a:r>
+            <a:r>
+              <a:rPr/>
+              <a:t> </a:t>
+            </a:r>
+            <a:r>
+              <a:rPr/>
+              <a:t>thickness</a:t>
+            </a:r>
+            <a:r>
+              <a:rPr/>
+              <a:t> </a:t>
+            </a:r>
+            <a:r>
+              <a:rPr/>
+              <a:t>to</a:t>
+            </a:r>
+            <a:r>
+              <a:rPr/>
+              <a:t> </a:t>
+            </a:r>
+            <a:r>
+              <a:rPr/>
+              <a:t>three</a:t>
+            </a:r>
+            <a:r>
+              <a:rPr/>
+              <a:t> </a:t>
+            </a:r>
+            <a:r>
+              <a:rPr/>
+              <a:t>pixels.</a:t>
+            </a:r>
+            <a:r>
+              <a:rPr/>
+              <a:t> </a:t>
+            </a:r>
+            <a:r>
+              <a:rPr/>
+              <a:t>Use</a:t>
             </a:r>
             <a:r>
               <a:rPr/>
@@ -1088,7 +1256,23 @@
             </a:r>
             <a:r>
               <a:rPr/>
-              <a:t>lot</a:t>
+              <a:t>dashed</a:t>
+            </a:r>
+            <a:r>
+              <a:rPr/>
+              <a:t> </a:t>
+            </a:r>
+            <a:r>
+              <a:rPr/>
+              <a:t>line</a:t>
+            </a:r>
+            <a:r>
+              <a:rPr/>
+              <a:t> </a:t>
+            </a:r>
+            <a:r>
+              <a:rPr/>
+              <a:t>instead</a:t>
             </a:r>
             <a:r>
               <a:rPr/>
@@ -1104,14 +1288,6 @@
             </a:r>
             <a:r>
               <a:rPr/>
-              <a:t>data,</a:t>
-            </a:r>
-            <a:r>
-              <a:rPr/>
-              <a:t> </a:t>
-            </a:r>
-            <a:r>
-              <a:rPr/>
               <a:t>a</a:t>
             </a:r>
             <a:r>
@@ -1120,547 +1296,15 @@
             </a:r>
             <a:r>
               <a:rPr/>
-              <a:t>line</a:t>
-            </a:r>
-            <a:r>
-              <a:rPr/>
-              <a:t> </a:t>
-            </a:r>
-            <a:r>
-              <a:rPr/>
-              <a:t>can</a:t>
-            </a:r>
-            <a:r>
-              <a:rPr/>
-              <a:t> </a:t>
-            </a:r>
-            <a:r>
-              <a:rPr/>
-              <a:t>sometimes</a:t>
-            </a:r>
-            <a:r>
-              <a:rPr/>
-              <a:t> </a:t>
-            </a:r>
-            <a:r>
-              <a:rPr/>
-              <a:t>emphasize</a:t>
-            </a:r>
-            <a:r>
-              <a:rPr/>
-              <a:t> </a:t>
-            </a:r>
-            <a:r>
-              <a:rPr/>
-              <a:t>patterns</a:t>
-            </a:r>
-            <a:r>
-              <a:rPr/>
-              <a:t> </a:t>
-            </a:r>
-            <a:r>
-              <a:rPr/>
-              <a:t>or</a:t>
-            </a:r>
-            <a:r>
-              <a:rPr/>
-              <a:t> </a:t>
-            </a:r>
-            <a:r>
-              <a:rPr/>
-              <a:t>trends</a:t>
-            </a:r>
-            <a:r>
-              <a:rPr/>
-              <a:t> </a:t>
-            </a:r>
-            <a:r>
-              <a:rPr/>
-              <a:t>that</a:t>
-            </a:r>
-            <a:r>
-              <a:rPr/>
-              <a:t> </a:t>
-            </a:r>
-            <a:r>
-              <a:rPr/>
-              <a:t>you</a:t>
-            </a:r>
-            <a:r>
-              <a:rPr/>
-              <a:t> </a:t>
-            </a:r>
-            <a:r>
-              <a:rPr/>
-              <a:t>might</a:t>
-            </a:r>
-            <a:r>
-              <a:rPr/>
-              <a:t> </a:t>
-            </a:r>
-            <a:r>
-              <a:rPr/>
-              <a:t>miss</a:t>
-            </a:r>
-            <a:r>
-              <a:rPr/>
-              <a:t> </a:t>
-            </a:r>
-            <a:r>
-              <a:rPr/>
-              <a:t>with</a:t>
-            </a:r>
-            <a:r>
-              <a:rPr/>
-              <a:t> </a:t>
-            </a:r>
-            <a:r>
-              <a:rPr/>
-              <a:t>just</a:t>
-            </a:r>
-            <a:r>
-              <a:rPr/>
-              <a:t> </a:t>
-            </a:r>
-            <a:r>
-              <a:rPr/>
-              <a:t>a</a:t>
-            </a:r>
-            <a:r>
-              <a:rPr/>
-              <a:t> </a:t>
-            </a:r>
-            <a:r>
-              <a:rPr/>
-              <a:t>scatterplot.</a:t>
-            </a:r>
-          </a:p>
-          <a:p>
-            <a:pPr lvl="0" marL="0" indent="0">
-              <a:buNone/>
-            </a:pPr>
-          </a:p>
-          <a:p>
-            <a:pPr lvl="0" marL="0" indent="0">
-              <a:buNone/>
-            </a:pPr>
-            <a:r>
-              <a:rPr/>
-              <a:t>You</a:t>
-            </a:r>
-            <a:r>
-              <a:rPr/>
-              <a:t> </a:t>
-            </a:r>
-            <a:r>
-              <a:rPr/>
-              <a:t>can</a:t>
-            </a:r>
-            <a:r>
-              <a:rPr/>
-              <a:t> </a:t>
-            </a:r>
-            <a:r>
-              <a:rPr/>
-              <a:t>do</a:t>
-            </a:r>
-            <a:r>
-              <a:rPr/>
-              <a:t> </a:t>
-            </a:r>
-            <a:r>
-              <a:rPr/>
-              <a:t>this</a:t>
-            </a:r>
-            <a:r>
-              <a:rPr/>
-              <a:t> </a:t>
-            </a:r>
-            <a:r>
-              <a:rPr/>
-              <a:t>by</a:t>
-            </a:r>
-            <a:r>
-              <a:rPr/>
-              <a:t> </a:t>
-            </a:r>
-            <a:r>
-              <a:rPr/>
-              <a:t>connecting</a:t>
-            </a:r>
-            <a:r>
-              <a:rPr/>
-              <a:t> </a:t>
-            </a:r>
-            <a:r>
-              <a:rPr/>
-              <a:t>lines</a:t>
-            </a:r>
-            <a:r>
-              <a:rPr/>
-              <a:t> </a:t>
-            </a:r>
-            <a:r>
-              <a:rPr/>
-              <a:t>between</a:t>
-            </a:r>
-            <a:r>
-              <a:rPr/>
-              <a:t> </a:t>
-            </a:r>
-            <a:r>
-              <a:rPr/>
-              <a:t>individual</a:t>
-            </a:r>
-            <a:r>
-              <a:rPr/>
-              <a:t> </a:t>
-            </a:r>
-            <a:r>
-              <a:rPr/>
-              <a:t>point</a:t>
-            </a:r>
-            <a:r>
-              <a:rPr/>
-              <a:t> </a:t>
-            </a:r>
-            <a:r>
-              <a:rPr/>
-              <a:t>means,</a:t>
-            </a:r>
-            <a:r>
-              <a:rPr/>
-              <a:t> </a:t>
-            </a:r>
-            <a:r>
-              <a:rPr/>
-              <a:t>a</a:t>
-            </a:r>
-            <a:r>
-              <a:rPr/>
-              <a:t> </a:t>
-            </a:r>
-            <a:r>
-              <a:rPr/>
-              <a:t>linear</a:t>
-            </a:r>
-            <a:r>
-              <a:rPr/>
-              <a:t> </a:t>
-            </a:r>
-            <a:r>
-              <a:rPr/>
-              <a:t>regression</a:t>
-            </a:r>
-            <a:r>
-              <a:rPr/>
-              <a:t> </a:t>
-            </a:r>
-            <a:r>
-              <a:rPr/>
-              <a:t>trend</a:t>
-            </a:r>
-            <a:r>
-              <a:rPr/>
-              <a:t> </a:t>
-            </a:r>
-            <a:r>
-              <a:rPr/>
-              <a:t>line,</a:t>
-            </a:r>
-            <a:r>
-              <a:rPr/>
-              <a:t> </a:t>
-            </a:r>
-            <a:r>
-              <a:rPr/>
-              <a:t>moving</a:t>
-            </a:r>
-            <a:r>
-              <a:rPr/>
-              <a:t> </a:t>
-            </a:r>
-            <a:r>
-              <a:rPr/>
-              <a:t>averages,</a:t>
-            </a:r>
-            <a:r>
-              <a:rPr/>
-              <a:t> </a:t>
-            </a:r>
-            <a:r>
-              <a:rPr/>
-              <a:t>or</a:t>
-            </a:r>
-            <a:r>
-              <a:rPr/>
-              <a:t> </a:t>
-            </a:r>
-            <a:r>
-              <a:rPr/>
-              <a:t>smoothing</a:t>
-            </a:r>
-            <a:r>
-              <a:rPr/>
-              <a:t> </a:t>
-            </a:r>
-            <a:r>
-              <a:rPr/>
-              <a:t>splines.</a:t>
-            </a:r>
-          </a:p>
-          <a:p>
-            <a:pPr lvl="0" marL="0" indent="0">
-              <a:buNone/>
-            </a:pPr>
-          </a:p>
-          <a:p>
-            <a:pPr lvl="0" marL="0" indent="0">
-              <a:buNone/>
-            </a:pPr>
-            <a:r>
-              <a:rPr/>
-              <a:t>We</a:t>
-            </a:r>
-            <a:r>
-              <a:rPr/>
-              <a:t> </a:t>
-            </a:r>
-            <a:r>
-              <a:rPr/>
-              <a:t>will</a:t>
-            </a:r>
-            <a:r>
-              <a:rPr/>
-              <a:t> </a:t>
-            </a:r>
-            <a:r>
-              <a:rPr/>
-              <a:t>only</a:t>
-            </a:r>
-            <a:r>
-              <a:rPr/>
-              <a:t> </a:t>
-            </a:r>
-            <a:r>
-              <a:rPr/>
-              <a:t>cover</a:t>
-            </a:r>
-            <a:r>
-              <a:rPr/>
-              <a:t> </a:t>
-            </a:r>
-            <a:r>
-              <a:rPr/>
-              <a:t>the</a:t>
-            </a:r>
-            <a:r>
-              <a:rPr/>
-              <a:t> </a:t>
-            </a:r>
-            <a:r>
-              <a:rPr/>
-              <a:t>first</a:t>
-            </a:r>
-            <a:r>
-              <a:rPr/>
-              <a:t> </a:t>
-            </a:r>
-            <a:r>
-              <a:rPr/>
-              <a:t>approach</a:t>
-            </a:r>
-            <a:r>
-              <a:rPr/>
-              <a:t> </a:t>
-            </a:r>
-            <a:r>
-              <a:rPr/>
-              <a:t>connecting</a:t>
-            </a:r>
-            <a:r>
-              <a:rPr/>
-              <a:t> </a:t>
-            </a:r>
-            <a:r>
-              <a:rPr/>
-              <a:t>means.</a:t>
-            </a:r>
-            <a:r>
-              <a:rPr/>
-              <a:t> </a:t>
-            </a:r>
-            <a:r>
-              <a:rPr/>
-              <a:t>The</a:t>
-            </a:r>
-            <a:r>
-              <a:rPr/>
-              <a:t> </a:t>
-            </a:r>
-            <a:r>
-              <a:rPr/>
-              <a:t>other</a:t>
-            </a:r>
-            <a:r>
-              <a:rPr/>
-              <a:t> </a:t>
-            </a:r>
-            <a:r>
-              <a:rPr/>
-              <a:t>approaches</a:t>
-            </a:r>
-            <a:r>
-              <a:rPr/>
-              <a:t> </a:t>
-            </a:r>
-            <a:r>
-              <a:rPr/>
-              <a:t>are</a:t>
-            </a:r>
-            <a:r>
-              <a:rPr/>
-              <a:t> </a:t>
-            </a:r>
-            <a:r>
-              <a:rPr/>
-              <a:t>quite</a:t>
-            </a:r>
-            <a:r>
-              <a:rPr/>
-              <a:t> </a:t>
-            </a:r>
-            <a:r>
-              <a:rPr/>
-              <a:t>good</a:t>
-            </a:r>
-            <a:r>
-              <a:rPr/>
-              <a:t> </a:t>
-            </a:r>
-            <a:r>
-              <a:rPr/>
-              <a:t>and</a:t>
-            </a:r>
-            <a:r>
-              <a:rPr/>
-              <a:t> </a:t>
-            </a:r>
-            <a:r>
-              <a:rPr/>
-              <a:t>definitely</a:t>
-            </a:r>
-            <a:r>
-              <a:rPr/>
-              <a:t> </a:t>
-            </a:r>
-            <a:r>
-              <a:rPr/>
-              <a:t>worth</a:t>
-            </a:r>
-            <a:r>
-              <a:rPr/>
-              <a:t> </a:t>
-            </a:r>
-            <a:r>
-              <a:rPr/>
-              <a:t>talking</a:t>
-            </a:r>
-            <a:r>
-              <a:rPr/>
-              <a:t> </a:t>
-            </a:r>
-            <a:r>
-              <a:rPr/>
-              <a:t>about.</a:t>
-            </a:r>
-            <a:r>
-              <a:rPr/>
-              <a:t> </a:t>
-            </a:r>
-            <a:r>
-              <a:rPr/>
-              <a:t>Unfortunately,</a:t>
-            </a:r>
-            <a:r>
-              <a:rPr/>
-              <a:t> </a:t>
-            </a:r>
-            <a:r>
-              <a:rPr/>
-              <a:t>these</a:t>
-            </a:r>
-            <a:r>
-              <a:rPr/>
-              <a:t> </a:t>
-            </a:r>
-            <a:r>
-              <a:rPr/>
-              <a:t>alternative</a:t>
-            </a:r>
-            <a:r>
-              <a:rPr/>
-              <a:t> </a:t>
-            </a:r>
-            <a:r>
-              <a:rPr/>
-              <a:t>approaches</a:t>
-            </a:r>
-            <a:r>
-              <a:rPr/>
-              <a:t> </a:t>
-            </a:r>
-            <a:r>
-              <a:rPr/>
-              <a:t>are</a:t>
-            </a:r>
-            <a:r>
-              <a:rPr/>
-              <a:t> </a:t>
-            </a:r>
-            <a:r>
-              <a:rPr/>
-              <a:t>implemented</a:t>
-            </a:r>
-            <a:r>
-              <a:rPr/>
-              <a:t> </a:t>
-            </a:r>
-            <a:r>
-              <a:rPr/>
-              <a:t>inconsistently</a:t>
-            </a:r>
-            <a:r>
-              <a:rPr/>
-              <a:t> </a:t>
-            </a:r>
-            <a:r>
-              <a:rPr/>
-              <a:t>across</a:t>
-            </a:r>
-            <a:r>
-              <a:rPr/>
-              <a:t> </a:t>
-            </a:r>
-            <a:r>
-              <a:rPr/>
-              <a:t>the</a:t>
-            </a:r>
-            <a:r>
-              <a:rPr/>
-              <a:t> </a:t>
-            </a:r>
-            <a:r>
-              <a:rPr/>
-              <a:t>different</a:t>
-            </a:r>
-            <a:r>
-              <a:rPr/>
-              <a:t> </a:t>
-            </a:r>
-            <a:r>
-              <a:rPr/>
-              <a:t>programs.</a:t>
+              <a:t>dotted</a:t>
+            </a:r>
+            <a:r>
+              <a:rPr/>
+              <a:t> </a:t>
+            </a:r>
+            <a:r>
+              <a:rPr/>
+              <a:t>line.</a:t>
             </a:r>
           </a:p>
         </p:txBody>
@@ -1682,7 +1326,7 @@
           <a:p>
             <a:fld id="{18BDFEC3-8487-43E8-A154-7C12CBC1FFF2}" type="slidenum">
               <a:rPr lang="en-US"/>
-              <a:t>19</a:t>
+              <a:t>12</a:t>
             </a:fld>
             <a:endParaRPr lang="en-US"/>
           </a:p>
@@ -1742,7 +1386,395 @@
             </a:pPr>
             <a:r>
               <a:rPr/>
-              <a:t>Here’s</a:t>
+              <a:t>If</a:t>
+            </a:r>
+            <a:r>
+              <a:rPr/>
+              <a:t> </a:t>
+            </a:r>
+            <a:r>
+              <a:rPr/>
+              <a:t>you</a:t>
+            </a:r>
+            <a:r>
+              <a:rPr/>
+              <a:t> </a:t>
+            </a:r>
+            <a:r>
+              <a:rPr/>
+              <a:t>have</a:t>
+            </a:r>
+            <a:r>
+              <a:rPr/>
+              <a:t> </a:t>
+            </a:r>
+            <a:r>
+              <a:rPr/>
+              <a:t>a</a:t>
+            </a:r>
+            <a:r>
+              <a:rPr/>
+              <a:t> </a:t>
+            </a:r>
+            <a:r>
+              <a:rPr/>
+              <a:t>lot</a:t>
+            </a:r>
+            <a:r>
+              <a:rPr/>
+              <a:t> </a:t>
+            </a:r>
+            <a:r>
+              <a:rPr/>
+              <a:t>of</a:t>
+            </a:r>
+            <a:r>
+              <a:rPr/>
+              <a:t> </a:t>
+            </a:r>
+            <a:r>
+              <a:rPr/>
+              <a:t>data,</a:t>
+            </a:r>
+            <a:r>
+              <a:rPr/>
+              <a:t> </a:t>
+            </a:r>
+            <a:r>
+              <a:rPr/>
+              <a:t>a</a:t>
+            </a:r>
+            <a:r>
+              <a:rPr/>
+              <a:t> </a:t>
+            </a:r>
+            <a:r>
+              <a:rPr/>
+              <a:t>line</a:t>
+            </a:r>
+            <a:r>
+              <a:rPr/>
+              <a:t> </a:t>
+            </a:r>
+            <a:r>
+              <a:rPr/>
+              <a:t>can</a:t>
+            </a:r>
+            <a:r>
+              <a:rPr/>
+              <a:t> </a:t>
+            </a:r>
+            <a:r>
+              <a:rPr/>
+              <a:t>sometimes</a:t>
+            </a:r>
+            <a:r>
+              <a:rPr/>
+              <a:t> </a:t>
+            </a:r>
+            <a:r>
+              <a:rPr/>
+              <a:t>emphasize</a:t>
+            </a:r>
+            <a:r>
+              <a:rPr/>
+              <a:t> </a:t>
+            </a:r>
+            <a:r>
+              <a:rPr/>
+              <a:t>patterns</a:t>
+            </a:r>
+            <a:r>
+              <a:rPr/>
+              <a:t> </a:t>
+            </a:r>
+            <a:r>
+              <a:rPr/>
+              <a:t>or</a:t>
+            </a:r>
+            <a:r>
+              <a:rPr/>
+              <a:t> </a:t>
+            </a:r>
+            <a:r>
+              <a:rPr/>
+              <a:t>trends</a:t>
+            </a:r>
+            <a:r>
+              <a:rPr/>
+              <a:t> </a:t>
+            </a:r>
+            <a:r>
+              <a:rPr/>
+              <a:t>that</a:t>
+            </a:r>
+            <a:r>
+              <a:rPr/>
+              <a:t> </a:t>
+            </a:r>
+            <a:r>
+              <a:rPr/>
+              <a:t>you</a:t>
+            </a:r>
+            <a:r>
+              <a:rPr/>
+              <a:t> </a:t>
+            </a:r>
+            <a:r>
+              <a:rPr/>
+              <a:t>might</a:t>
+            </a:r>
+            <a:r>
+              <a:rPr/>
+              <a:t> </a:t>
+            </a:r>
+            <a:r>
+              <a:rPr/>
+              <a:t>miss</a:t>
+            </a:r>
+            <a:r>
+              <a:rPr/>
+              <a:t> </a:t>
+            </a:r>
+            <a:r>
+              <a:rPr/>
+              <a:t>with</a:t>
+            </a:r>
+            <a:r>
+              <a:rPr/>
+              <a:t> </a:t>
+            </a:r>
+            <a:r>
+              <a:rPr/>
+              <a:t>just</a:t>
+            </a:r>
+            <a:r>
+              <a:rPr/>
+              <a:t> </a:t>
+            </a:r>
+            <a:r>
+              <a:rPr/>
+              <a:t>a</a:t>
+            </a:r>
+            <a:r>
+              <a:rPr/>
+              <a:t> </a:t>
+            </a:r>
+            <a:r>
+              <a:rPr/>
+              <a:t>scatterplot.</a:t>
+            </a:r>
+          </a:p>
+          <a:p>
+            <a:pPr lvl="0" marL="0" indent="0">
+              <a:buNone/>
+            </a:pPr>
+          </a:p>
+          <a:p>
+            <a:pPr lvl="0" marL="0" indent="0">
+              <a:buNone/>
+            </a:pPr>
+            <a:r>
+              <a:rPr/>
+              <a:t>You</a:t>
+            </a:r>
+            <a:r>
+              <a:rPr/>
+              <a:t> </a:t>
+            </a:r>
+            <a:r>
+              <a:rPr/>
+              <a:t>can</a:t>
+            </a:r>
+            <a:r>
+              <a:rPr/>
+              <a:t> </a:t>
+            </a:r>
+            <a:r>
+              <a:rPr/>
+              <a:t>do</a:t>
+            </a:r>
+            <a:r>
+              <a:rPr/>
+              <a:t> </a:t>
+            </a:r>
+            <a:r>
+              <a:rPr/>
+              <a:t>this</a:t>
+            </a:r>
+            <a:r>
+              <a:rPr/>
+              <a:t> </a:t>
+            </a:r>
+            <a:r>
+              <a:rPr/>
+              <a:t>by</a:t>
+            </a:r>
+            <a:r>
+              <a:rPr/>
+              <a:t> </a:t>
+            </a:r>
+            <a:r>
+              <a:rPr/>
+              <a:t>connecting</a:t>
+            </a:r>
+            <a:r>
+              <a:rPr/>
+              <a:t> </a:t>
+            </a:r>
+            <a:r>
+              <a:rPr/>
+              <a:t>lines</a:t>
+            </a:r>
+            <a:r>
+              <a:rPr/>
+              <a:t> </a:t>
+            </a:r>
+            <a:r>
+              <a:rPr/>
+              <a:t>between</a:t>
+            </a:r>
+            <a:r>
+              <a:rPr/>
+              <a:t> </a:t>
+            </a:r>
+            <a:r>
+              <a:rPr/>
+              <a:t>individual</a:t>
+            </a:r>
+            <a:r>
+              <a:rPr/>
+              <a:t> </a:t>
+            </a:r>
+            <a:r>
+              <a:rPr/>
+              <a:t>point</a:t>
+            </a:r>
+            <a:r>
+              <a:rPr/>
+              <a:t> </a:t>
+            </a:r>
+            <a:r>
+              <a:rPr/>
+              <a:t>means,</a:t>
+            </a:r>
+            <a:r>
+              <a:rPr/>
+              <a:t> </a:t>
+            </a:r>
+            <a:r>
+              <a:rPr/>
+              <a:t>a</a:t>
+            </a:r>
+            <a:r>
+              <a:rPr/>
+              <a:t> </a:t>
+            </a:r>
+            <a:r>
+              <a:rPr/>
+              <a:t>linear</a:t>
+            </a:r>
+            <a:r>
+              <a:rPr/>
+              <a:t> </a:t>
+            </a:r>
+            <a:r>
+              <a:rPr/>
+              <a:t>regression</a:t>
+            </a:r>
+            <a:r>
+              <a:rPr/>
+              <a:t> </a:t>
+            </a:r>
+            <a:r>
+              <a:rPr/>
+              <a:t>trend</a:t>
+            </a:r>
+            <a:r>
+              <a:rPr/>
+              <a:t> </a:t>
+            </a:r>
+            <a:r>
+              <a:rPr/>
+              <a:t>line,</a:t>
+            </a:r>
+            <a:r>
+              <a:rPr/>
+              <a:t> </a:t>
+            </a:r>
+            <a:r>
+              <a:rPr/>
+              <a:t>moving</a:t>
+            </a:r>
+            <a:r>
+              <a:rPr/>
+              <a:t> </a:t>
+            </a:r>
+            <a:r>
+              <a:rPr/>
+              <a:t>averages,</a:t>
+            </a:r>
+            <a:r>
+              <a:rPr/>
+              <a:t> </a:t>
+            </a:r>
+            <a:r>
+              <a:rPr/>
+              <a:t>or</a:t>
+            </a:r>
+            <a:r>
+              <a:rPr/>
+              <a:t> </a:t>
+            </a:r>
+            <a:r>
+              <a:rPr/>
+              <a:t>smoothing</a:t>
+            </a:r>
+            <a:r>
+              <a:rPr/>
+              <a:t> </a:t>
+            </a:r>
+            <a:r>
+              <a:rPr/>
+              <a:t>splines.</a:t>
+            </a:r>
+          </a:p>
+          <a:p>
+            <a:pPr lvl="0" marL="0" indent="0">
+              <a:buNone/>
+            </a:pPr>
+          </a:p>
+          <a:p>
+            <a:pPr lvl="0" marL="0" indent="0">
+              <a:buNone/>
+            </a:pPr>
+            <a:r>
+              <a:rPr/>
+              <a:t>We</a:t>
+            </a:r>
+            <a:r>
+              <a:rPr/>
+              <a:t> </a:t>
+            </a:r>
+            <a:r>
+              <a:rPr/>
+              <a:t>will</a:t>
+            </a:r>
+            <a:r>
+              <a:rPr/>
+              <a:t> </a:t>
+            </a:r>
+            <a:r>
+              <a:rPr/>
+              <a:t>only</a:t>
+            </a:r>
+            <a:r>
+              <a:rPr/>
+              <a:t> </a:t>
+            </a:r>
+            <a:r>
+              <a:rPr/>
+              <a:t>cover</a:t>
             </a:r>
             <a:r>
               <a:rPr/>
@@ -1758,87 +1790,183 @@
             </a:r>
             <a:r>
               <a:rPr/>
-              <a:t>housing</a:t>
-            </a:r>
-            <a:r>
-              <a:rPr/>
-              <a:t> </a:t>
-            </a:r>
-            <a:r>
-              <a:rPr/>
-              <a:t>data</a:t>
-            </a:r>
-            <a:r>
-              <a:rPr/>
-              <a:t> </a:t>
-            </a:r>
-            <a:r>
-              <a:rPr/>
-              <a:t>set</a:t>
-            </a:r>
-            <a:r>
-              <a:rPr/>
-              <a:t> </a:t>
-            </a:r>
-            <a:r>
-              <a:rPr/>
-              <a:t>that</a:t>
-            </a:r>
-            <a:r>
-              <a:rPr/>
-              <a:t> </a:t>
-            </a:r>
-            <a:r>
-              <a:rPr/>
-              <a:t>we</a:t>
-            </a:r>
-            <a:r>
-              <a:rPr/>
-              <a:t> </a:t>
-            </a:r>
-            <a:r>
-              <a:rPr/>
-              <a:t>looked</a:t>
-            </a:r>
-            <a:r>
-              <a:rPr/>
-              <a:t> </a:t>
-            </a:r>
-            <a:r>
-              <a:rPr/>
-              <a:t>at</a:t>
-            </a:r>
-            <a:r>
-              <a:rPr/>
-              <a:t> </a:t>
-            </a:r>
-            <a:r>
-              <a:rPr/>
-              <a:t>earlier.</a:t>
-            </a:r>
-            <a:r>
-              <a:rPr/>
-              <a:t> </a:t>
-            </a:r>
-            <a:r>
-              <a:rPr/>
-              <a:t>This</a:t>
-            </a:r>
-            <a:r>
-              <a:rPr/>
-              <a:t> </a:t>
-            </a:r>
-            <a:r>
-              <a:rPr/>
-              <a:t>scatterplot</a:t>
-            </a:r>
-            <a:r>
-              <a:rPr/>
-              <a:t> </a:t>
-            </a:r>
-            <a:r>
-              <a:rPr/>
-              <a:t>shows</a:t>
+              <a:t>first</a:t>
+            </a:r>
+            <a:r>
+              <a:rPr/>
+              <a:t> </a:t>
+            </a:r>
+            <a:r>
+              <a:rPr/>
+              <a:t>approach</a:t>
+            </a:r>
+            <a:r>
+              <a:rPr/>
+              <a:t> </a:t>
+            </a:r>
+            <a:r>
+              <a:rPr/>
+              <a:t>connecting</a:t>
+            </a:r>
+            <a:r>
+              <a:rPr/>
+              <a:t> </a:t>
+            </a:r>
+            <a:r>
+              <a:rPr/>
+              <a:t>means.</a:t>
+            </a:r>
+            <a:r>
+              <a:rPr/>
+              <a:t> </a:t>
+            </a:r>
+            <a:r>
+              <a:rPr/>
+              <a:t>The</a:t>
+            </a:r>
+            <a:r>
+              <a:rPr/>
+              <a:t> </a:t>
+            </a:r>
+            <a:r>
+              <a:rPr/>
+              <a:t>other</a:t>
+            </a:r>
+            <a:r>
+              <a:rPr/>
+              <a:t> </a:t>
+            </a:r>
+            <a:r>
+              <a:rPr/>
+              <a:t>approaches</a:t>
+            </a:r>
+            <a:r>
+              <a:rPr/>
+              <a:t> </a:t>
+            </a:r>
+            <a:r>
+              <a:rPr/>
+              <a:t>are</a:t>
+            </a:r>
+            <a:r>
+              <a:rPr/>
+              <a:t> </a:t>
+            </a:r>
+            <a:r>
+              <a:rPr/>
+              <a:t>quite</a:t>
+            </a:r>
+            <a:r>
+              <a:rPr/>
+              <a:t> </a:t>
+            </a:r>
+            <a:r>
+              <a:rPr/>
+              <a:t>good</a:t>
+            </a:r>
+            <a:r>
+              <a:rPr/>
+              <a:t> </a:t>
+            </a:r>
+            <a:r>
+              <a:rPr/>
+              <a:t>and</a:t>
+            </a:r>
+            <a:r>
+              <a:rPr/>
+              <a:t> </a:t>
+            </a:r>
+            <a:r>
+              <a:rPr/>
+              <a:t>definitely</a:t>
+            </a:r>
+            <a:r>
+              <a:rPr/>
+              <a:t> </a:t>
+            </a:r>
+            <a:r>
+              <a:rPr/>
+              <a:t>worth</a:t>
+            </a:r>
+            <a:r>
+              <a:rPr/>
+              <a:t> </a:t>
+            </a:r>
+            <a:r>
+              <a:rPr/>
+              <a:t>talking</a:t>
+            </a:r>
+            <a:r>
+              <a:rPr/>
+              <a:t> </a:t>
+            </a:r>
+            <a:r>
+              <a:rPr/>
+              <a:t>about.</a:t>
+            </a:r>
+            <a:r>
+              <a:rPr/>
+              <a:t> </a:t>
+            </a:r>
+            <a:r>
+              <a:rPr/>
+              <a:t>Unfortunately,</a:t>
+            </a:r>
+            <a:r>
+              <a:rPr/>
+              <a:t> </a:t>
+            </a:r>
+            <a:r>
+              <a:rPr/>
+              <a:t>these</a:t>
+            </a:r>
+            <a:r>
+              <a:rPr/>
+              <a:t> </a:t>
+            </a:r>
+            <a:r>
+              <a:rPr/>
+              <a:t>alternative</a:t>
+            </a:r>
+            <a:r>
+              <a:rPr/>
+              <a:t> </a:t>
+            </a:r>
+            <a:r>
+              <a:rPr/>
+              <a:t>approaches</a:t>
+            </a:r>
+            <a:r>
+              <a:rPr/>
+              <a:t> </a:t>
+            </a:r>
+            <a:r>
+              <a:rPr/>
+              <a:t>are</a:t>
+            </a:r>
+            <a:r>
+              <a:rPr/>
+              <a:t> </a:t>
+            </a:r>
+            <a:r>
+              <a:rPr/>
+              <a:t>implemented</a:t>
+            </a:r>
+            <a:r>
+              <a:rPr/>
+              <a:t> </a:t>
+            </a:r>
+            <a:r>
+              <a:rPr/>
+              <a:t>inconsistently</a:t>
+            </a:r>
+            <a:r>
+              <a:rPr/>
+              <a:t> </a:t>
+            </a:r>
+            <a:r>
+              <a:rPr/>
+              <a:t>across</a:t>
             </a:r>
             <a:r>
               <a:rPr/>
@@ -1854,55 +1982,15 @@
             </a:r>
             <a:r>
               <a:rPr/>
-              <a:t>relationship</a:t>
-            </a:r>
-            <a:r>
-              <a:rPr/>
-              <a:t> </a:t>
-            </a:r>
-            <a:r>
-              <a:rPr/>
-              <a:t>between</a:t>
-            </a:r>
-            <a:r>
-              <a:rPr/>
-              <a:t> </a:t>
-            </a:r>
-            <a:r>
-              <a:rPr/>
-              <a:t>number</a:t>
-            </a:r>
-            <a:r>
-              <a:rPr/>
-              <a:t> </a:t>
-            </a:r>
-            <a:r>
-              <a:rPr/>
-              <a:t>of</a:t>
-            </a:r>
-            <a:r>
-              <a:rPr/>
-              <a:t> </a:t>
-            </a:r>
-            <a:r>
-              <a:rPr/>
-              <a:t>bedrooms</a:t>
-            </a:r>
-            <a:r>
-              <a:rPr/>
-              <a:t> </a:t>
-            </a:r>
-            <a:r>
-              <a:rPr/>
-              <a:t>and</a:t>
-            </a:r>
-            <a:r>
-              <a:rPr/>
-              <a:t> </a:t>
-            </a:r>
-            <a:r>
-              <a:rPr/>
-              <a:t>price.</a:t>
+              <a:t>different</a:t>
+            </a:r>
+            <a:r>
+              <a:rPr/>
+              <a:t> </a:t>
+            </a:r>
+            <a:r>
+              <a:rPr/>
+              <a:t>programs.</a:t>
             </a:r>
           </a:p>
         </p:txBody>
@@ -1924,7 +2012,7 @@
           <a:p>
             <a:fld id="{18BDFEC3-8487-43E8-A154-7C12CBC1FFF2}" type="slidenum">
               <a:rPr lang="en-US"/>
-              <a:t>20</a:t>
+              <a:t>19</a:t>
             </a:fld>
             <a:endParaRPr lang="en-US"/>
           </a:p>
@@ -1984,15 +2072,7 @@
             </a:pPr>
             <a:r>
               <a:rPr/>
-              <a:t>Here</a:t>
-            </a:r>
-            <a:r>
-              <a:rPr/>
-              <a:t> </a:t>
-            </a:r>
-            <a:r>
-              <a:rPr/>
-              <a:t>is</a:t>
+              <a:t>Here’s</a:t>
             </a:r>
             <a:r>
               <a:rPr/>
@@ -2008,31 +2088,87 @@
             </a:r>
             <a:r>
               <a:rPr/>
-              <a:t>R</a:t>
-            </a:r>
-            <a:r>
-              <a:rPr/>
-              <a:t> </a:t>
-            </a:r>
-            <a:r>
-              <a:rPr/>
-              <a:t>code.</a:t>
-            </a:r>
-            <a:r>
-              <a:rPr/>
-              <a:t> </a:t>
-            </a:r>
-            <a:r>
-              <a:rPr/>
-              <a:t>You</a:t>
-            </a:r>
-            <a:r>
-              <a:rPr/>
-              <a:t> </a:t>
-            </a:r>
-            <a:r>
-              <a:rPr/>
-              <a:t>need</a:t>
+              <a:t>housing</a:t>
+            </a:r>
+            <a:r>
+              <a:rPr/>
+              <a:t> </a:t>
+            </a:r>
+            <a:r>
+              <a:rPr/>
+              <a:t>data</a:t>
+            </a:r>
+            <a:r>
+              <a:rPr/>
+              <a:t> </a:t>
+            </a:r>
+            <a:r>
+              <a:rPr/>
+              <a:t>set</a:t>
+            </a:r>
+            <a:r>
+              <a:rPr/>
+              <a:t> </a:t>
+            </a:r>
+            <a:r>
+              <a:rPr/>
+              <a:t>that</a:t>
+            </a:r>
+            <a:r>
+              <a:rPr/>
+              <a:t> </a:t>
+            </a:r>
+            <a:r>
+              <a:rPr/>
+              <a:t>we</a:t>
+            </a:r>
+            <a:r>
+              <a:rPr/>
+              <a:t> </a:t>
+            </a:r>
+            <a:r>
+              <a:rPr/>
+              <a:t>looked</a:t>
+            </a:r>
+            <a:r>
+              <a:rPr/>
+              <a:t> </a:t>
+            </a:r>
+            <a:r>
+              <a:rPr/>
+              <a:t>at</a:t>
+            </a:r>
+            <a:r>
+              <a:rPr/>
+              <a:t> </a:t>
+            </a:r>
+            <a:r>
+              <a:rPr/>
+              <a:t>earlier.</a:t>
+            </a:r>
+            <a:r>
+              <a:rPr/>
+              <a:t> </a:t>
+            </a:r>
+            <a:r>
+              <a:rPr/>
+              <a:t>This</a:t>
+            </a:r>
+            <a:r>
+              <a:rPr/>
+              <a:t> </a:t>
+            </a:r>
+            <a:r>
+              <a:rPr/>
+              <a:t>scatterplot</a:t>
+            </a:r>
+            <a:r>
+              <a:rPr/>
+              <a:t> </a:t>
+            </a:r>
+            <a:r>
+              <a:rPr/>
+              <a:t>shows</a:t>
             </a:r>
             <a:r>
               <a:rPr/>
@@ -2048,87 +2184,23 @@
             </a:r>
             <a:r>
               <a:rPr/>
-              <a:t>stat_summary</a:t>
-            </a:r>
-            <a:r>
-              <a:rPr/>
-              <a:t> </a:t>
-            </a:r>
-            <a:r>
-              <a:rPr/>
-              <a:t>function</a:t>
-            </a:r>
-            <a:r>
-              <a:rPr/>
-              <a:t> </a:t>
-            </a:r>
-            <a:r>
-              <a:rPr/>
-              <a:t>to</a:t>
-            </a:r>
-            <a:r>
-              <a:rPr/>
-              <a:t> </a:t>
-            </a:r>
-            <a:r>
-              <a:rPr/>
-              <a:t>create</a:t>
-            </a:r>
-            <a:r>
-              <a:rPr/>
-              <a:t> </a:t>
-            </a:r>
-            <a:r>
-              <a:rPr/>
-              <a:t>averages</a:t>
-            </a:r>
-            <a:r>
-              <a:rPr/>
-              <a:t> </a:t>
-            </a:r>
-            <a:r>
-              <a:rPr/>
-              <a:t>for</a:t>
-            </a:r>
-            <a:r>
-              <a:rPr/>
-              <a:t> </a:t>
-            </a:r>
-            <a:r>
-              <a:rPr/>
-              <a:t>y</a:t>
-            </a:r>
-            <a:r>
-              <a:rPr/>
-              <a:t> </a:t>
-            </a:r>
-            <a:r>
-              <a:rPr/>
-              <a:t>at</a:t>
-            </a:r>
-            <a:r>
-              <a:rPr/>
-              <a:t> </a:t>
-            </a:r>
-            <a:r>
-              <a:rPr/>
-              <a:t>each</a:t>
-            </a:r>
-            <a:r>
-              <a:rPr/>
-              <a:t> </a:t>
-            </a:r>
-            <a:r>
-              <a:rPr/>
-              <a:t>discrete</a:t>
-            </a:r>
-            <a:r>
-              <a:rPr/>
-              <a:t> </a:t>
-            </a:r>
-            <a:r>
-              <a:rPr/>
-              <a:t>value</a:t>
+              <a:t>relationship</a:t>
+            </a:r>
+            <a:r>
+              <a:rPr/>
+              <a:t> </a:t>
+            </a:r>
+            <a:r>
+              <a:rPr/>
+              <a:t>between</a:t>
+            </a:r>
+            <a:r>
+              <a:rPr/>
+              <a:t> </a:t>
+            </a:r>
+            <a:r>
+              <a:rPr/>
+              <a:t>number</a:t>
             </a:r>
             <a:r>
               <a:rPr/>
@@ -2144,7 +2216,23 @@
             </a:r>
             <a:r>
               <a:rPr/>
-              <a:t>X.</a:t>
+              <a:t>bedrooms</a:t>
+            </a:r>
+            <a:r>
+              <a:rPr/>
+              <a:t> </a:t>
+            </a:r>
+            <a:r>
+              <a:rPr/>
+              <a:t>and</a:t>
+            </a:r>
+            <a:r>
+              <a:rPr/>
+              <a:t> </a:t>
+            </a:r>
+            <a:r>
+              <a:rPr/>
+              <a:t>price.</a:t>
             </a:r>
           </a:p>
         </p:txBody>
@@ -2166,7 +2254,7 @@
           <a:p>
             <a:fld id="{18BDFEC3-8487-43E8-A154-7C12CBC1FFF2}" type="slidenum">
               <a:rPr lang="en-US"/>
-              <a:t>23</a:t>
+              <a:t>20</a:t>
             </a:fld>
             <a:endParaRPr lang="en-US"/>
           </a:p>
@@ -2226,7 +2314,7 @@
             </a:pPr>
             <a:r>
               <a:rPr/>
-              <a:t>There</a:t>
+              <a:t>Here</a:t>
             </a:r>
             <a:r>
               <a:rPr/>
@@ -2242,54 +2330,6 @@
             </a:r>
             <a:r>
               <a:rPr/>
-              <a:t>a</a:t>
-            </a:r>
-            <a:r>
-              <a:rPr/>
-              <a:t> </a:t>
-            </a:r>
-            <a:r>
-              <a:rPr/>
-              <a:t>clear</a:t>
-            </a:r>
-            <a:r>
-              <a:rPr/>
-              <a:t> </a:t>
-            </a:r>
-            <a:r>
-              <a:rPr/>
-              <a:t>and</a:t>
-            </a:r>
-            <a:r>
-              <a:rPr/>
-              <a:t> </a:t>
-            </a:r>
-            <a:r>
-              <a:rPr/>
-              <a:t>consistnet</a:t>
-            </a:r>
-            <a:r>
-              <a:rPr/>
-              <a:t> </a:t>
-            </a:r>
-            <a:r>
-              <a:rPr/>
-              <a:t>trend</a:t>
-            </a:r>
-            <a:r>
-              <a:rPr/>
-              <a:t> </a:t>
-            </a:r>
-            <a:r>
-              <a:rPr/>
-              <a:t>in</a:t>
-            </a:r>
-            <a:r>
-              <a:rPr/>
-              <a:t> </a:t>
-            </a:r>
-            <a:r>
-              <a:rPr/>
               <a:t>the</a:t>
             </a:r>
             <a:r>
@@ -2298,23 +2338,31 @@
             </a:r>
             <a:r>
               <a:rPr/>
-              <a:t>average</a:t>
-            </a:r>
-            <a:r>
-              <a:rPr/>
-              <a:t> </a:t>
-            </a:r>
-            <a:r>
-              <a:rPr/>
-              <a:t>price.</a:t>
-            </a:r>
-            <a:r>
-              <a:rPr/>
-              <a:t> </a:t>
-            </a:r>
-            <a:r>
-              <a:rPr/>
-              <a:t>As</a:t>
+              <a:t>R</a:t>
+            </a:r>
+            <a:r>
+              <a:rPr/>
+              <a:t> </a:t>
+            </a:r>
+            <a:r>
+              <a:rPr/>
+              <a:t>code.</a:t>
+            </a:r>
+            <a:r>
+              <a:rPr/>
+              <a:t> </a:t>
+            </a:r>
+            <a:r>
+              <a:rPr/>
+              <a:t>You</a:t>
+            </a:r>
+            <a:r>
+              <a:rPr/>
+              <a:t> </a:t>
+            </a:r>
+            <a:r>
+              <a:rPr/>
+              <a:t>need</a:t>
             </a:r>
             <a:r>
               <a:rPr/>
@@ -2330,7 +2378,87 @@
             </a:r>
             <a:r>
               <a:rPr/>
-              <a:t>number</a:t>
+              <a:t>stat_summary</a:t>
+            </a:r>
+            <a:r>
+              <a:rPr/>
+              <a:t> </a:t>
+            </a:r>
+            <a:r>
+              <a:rPr/>
+              <a:t>function</a:t>
+            </a:r>
+            <a:r>
+              <a:rPr/>
+              <a:t> </a:t>
+            </a:r>
+            <a:r>
+              <a:rPr/>
+              <a:t>to</a:t>
+            </a:r>
+            <a:r>
+              <a:rPr/>
+              <a:t> </a:t>
+            </a:r>
+            <a:r>
+              <a:rPr/>
+              <a:t>create</a:t>
+            </a:r>
+            <a:r>
+              <a:rPr/>
+              <a:t> </a:t>
+            </a:r>
+            <a:r>
+              <a:rPr/>
+              <a:t>averages</a:t>
+            </a:r>
+            <a:r>
+              <a:rPr/>
+              <a:t> </a:t>
+            </a:r>
+            <a:r>
+              <a:rPr/>
+              <a:t>for</a:t>
+            </a:r>
+            <a:r>
+              <a:rPr/>
+              <a:t> </a:t>
+            </a:r>
+            <a:r>
+              <a:rPr/>
+              <a:t>y</a:t>
+            </a:r>
+            <a:r>
+              <a:rPr/>
+              <a:t> </a:t>
+            </a:r>
+            <a:r>
+              <a:rPr/>
+              <a:t>at</a:t>
+            </a:r>
+            <a:r>
+              <a:rPr/>
+              <a:t> </a:t>
+            </a:r>
+            <a:r>
+              <a:rPr/>
+              <a:t>each</a:t>
+            </a:r>
+            <a:r>
+              <a:rPr/>
+              <a:t> </a:t>
+            </a:r>
+            <a:r>
+              <a:rPr/>
+              <a:t>discrete</a:t>
+            </a:r>
+            <a:r>
+              <a:rPr/>
+              <a:t> </a:t>
+            </a:r>
+            <a:r>
+              <a:rPr/>
+              <a:t>value</a:t>
             </a:r>
             <a:r>
               <a:rPr/>
@@ -2346,47 +2474,7 @@
             </a:r>
             <a:r>
               <a:rPr/>
-              <a:t>bedrooms</a:t>
-            </a:r>
-            <a:r>
-              <a:rPr/>
-              <a:t> </a:t>
-            </a:r>
-            <a:r>
-              <a:rPr/>
-              <a:t>increase,</a:t>
-            </a:r>
-            <a:r>
-              <a:rPr/>
-              <a:t> </a:t>
-            </a:r>
-            <a:r>
-              <a:rPr/>
-              <a:t>the</a:t>
-            </a:r>
-            <a:r>
-              <a:rPr/>
-              <a:t> </a:t>
-            </a:r>
-            <a:r>
-              <a:rPr/>
-              <a:t>average</a:t>
-            </a:r>
-            <a:r>
-              <a:rPr/>
-              <a:t> </a:t>
-            </a:r>
-            <a:r>
-              <a:rPr/>
-              <a:t>price</a:t>
-            </a:r>
-            <a:r>
-              <a:rPr/>
-              <a:t> </a:t>
-            </a:r>
-            <a:r>
-              <a:rPr/>
-              <a:t>increases.</a:t>
+              <a:t>X.</a:t>
             </a:r>
           </a:p>
         </p:txBody>
@@ -2408,7 +2496,7 @@
           <a:p>
             <a:fld id="{18BDFEC3-8487-43E8-A154-7C12CBC1FFF2}" type="slidenum">
               <a:rPr lang="en-US"/>
-              <a:t>24</a:t>
+              <a:t>23</a:t>
             </a:fld>
             <a:endParaRPr lang="en-US"/>
           </a:p>
@@ -2468,31 +2556,15 @@
             </a:pPr>
             <a:r>
               <a:rPr/>
-              <a:t>On</a:t>
-            </a:r>
-            <a:r>
-              <a:rPr/>
-              <a:t> </a:t>
-            </a:r>
-            <a:r>
-              <a:rPr/>
-              <a:t>your</a:t>
-            </a:r>
-            <a:r>
-              <a:rPr/>
-              <a:t> </a:t>
-            </a:r>
-            <a:r>
-              <a:rPr/>
-              <a:t>own,</a:t>
-            </a:r>
-            <a:r>
-              <a:rPr/>
-              <a:t> </a:t>
-            </a:r>
-            <a:r>
-              <a:rPr/>
-              <a:t>draw</a:t>
+              <a:t>There</a:t>
+            </a:r>
+            <a:r>
+              <a:rPr/>
+              <a:t> </a:t>
+            </a:r>
+            <a:r>
+              <a:rPr/>
+              <a:t>is</a:t>
             </a:r>
             <a:r>
               <a:rPr/>
@@ -2508,23 +2580,39 @@
             </a:r>
             <a:r>
               <a:rPr/>
-              <a:t>similar</a:t>
-            </a:r>
-            <a:r>
-              <a:rPr/>
-              <a:t> </a:t>
-            </a:r>
-            <a:r>
-              <a:rPr/>
-              <a:t>plot.</a:t>
-            </a:r>
-            <a:r>
-              <a:rPr/>
-              <a:t> </a:t>
-            </a:r>
-            <a:r>
-              <a:rPr/>
-              <a:t>Put</a:t>
+              <a:t>clear</a:t>
+            </a:r>
+            <a:r>
+              <a:rPr/>
+              <a:t> </a:t>
+            </a:r>
+            <a:r>
+              <a:rPr/>
+              <a:t>and</a:t>
+            </a:r>
+            <a:r>
+              <a:rPr/>
+              <a:t> </a:t>
+            </a:r>
+            <a:r>
+              <a:rPr/>
+              <a:t>consistnet</a:t>
+            </a:r>
+            <a:r>
+              <a:rPr/>
+              <a:t> </a:t>
+            </a:r>
+            <a:r>
+              <a:rPr/>
+              <a:t>trend</a:t>
+            </a:r>
+            <a:r>
+              <a:rPr/>
+              <a:t> </a:t>
+            </a:r>
+            <a:r>
+              <a:rPr/>
+              <a:t>in</a:t>
             </a:r>
             <a:r>
               <a:rPr/>
@@ -2540,6 +2628,38 @@
             </a:r>
             <a:r>
               <a:rPr/>
+              <a:t>average</a:t>
+            </a:r>
+            <a:r>
+              <a:rPr/>
+              <a:t> </a:t>
+            </a:r>
+            <a:r>
+              <a:rPr/>
+              <a:t>price.</a:t>
+            </a:r>
+            <a:r>
+              <a:rPr/>
+              <a:t> </a:t>
+            </a:r>
+            <a:r>
+              <a:rPr/>
+              <a:t>As</a:t>
+            </a:r>
+            <a:r>
+              <a:rPr/>
+              <a:t> </a:t>
+            </a:r>
+            <a:r>
+              <a:rPr/>
+              <a:t>the</a:t>
+            </a:r>
+            <a:r>
+              <a:rPr/>
+              <a:t> </a:t>
+            </a:r>
+            <a:r>
+              <a:rPr/>
               <a:t>number</a:t>
             </a:r>
             <a:r>
@@ -2556,15 +2676,15 @@
             </a:r>
             <a:r>
               <a:rPr/>
-              <a:t>bathrooms</a:t>
-            </a:r>
-            <a:r>
-              <a:rPr/>
-              <a:t> </a:t>
-            </a:r>
-            <a:r>
-              <a:rPr/>
-              <a:t>on</a:t>
+              <a:t>bedrooms</a:t>
+            </a:r>
+            <a:r>
+              <a:rPr/>
+              <a:t> </a:t>
+            </a:r>
+            <a:r>
+              <a:rPr/>
+              <a:t>increase,</a:t>
             </a:r>
             <a:r>
               <a:rPr/>
@@ -2580,143 +2700,23 @@
             </a:r>
             <a:r>
               <a:rPr/>
-              <a:t>X</a:t>
-            </a:r>
-            <a:r>
-              <a:rPr/>
-              <a:t> </a:t>
-            </a:r>
-            <a:r>
-              <a:rPr/>
-              <a:t>axis</a:t>
-            </a:r>
-            <a:r>
-              <a:rPr/>
-              <a:t> </a:t>
-            </a:r>
-            <a:r>
-              <a:rPr/>
-              <a:t>and</a:t>
-            </a:r>
-            <a:r>
-              <a:rPr/>
-              <a:t> </a:t>
-            </a:r>
-            <a:r>
-              <a:rPr/>
-              <a:t>the</a:t>
-            </a:r>
-            <a:r>
-              <a:rPr/>
-              <a:t> </a:t>
-            </a:r>
-            <a:r>
-              <a:rPr/>
-              <a:t>age</a:t>
-            </a:r>
-            <a:r>
-              <a:rPr/>
-              <a:t> </a:t>
-            </a:r>
-            <a:r>
-              <a:rPr/>
-              <a:t>of</a:t>
-            </a:r>
-            <a:r>
-              <a:rPr/>
-              <a:t> </a:t>
-            </a:r>
-            <a:r>
-              <a:rPr/>
-              <a:t>the</a:t>
-            </a:r>
-            <a:r>
-              <a:rPr/>
-              <a:t> </a:t>
-            </a:r>
-            <a:r>
-              <a:rPr/>
-              <a:t>house</a:t>
-            </a:r>
-            <a:r>
-              <a:rPr/>
-              <a:t> </a:t>
-            </a:r>
-            <a:r>
-              <a:rPr/>
-              <a:t>on</a:t>
-            </a:r>
-            <a:r>
-              <a:rPr/>
-              <a:t> </a:t>
-            </a:r>
-            <a:r>
-              <a:rPr/>
-              <a:t>the</a:t>
-            </a:r>
-            <a:r>
-              <a:rPr/>
-              <a:t> </a:t>
-            </a:r>
-            <a:r>
-              <a:rPr/>
-              <a:t>Y-axis.</a:t>
-            </a:r>
-            <a:r>
-              <a:rPr/>
-              <a:t> </a:t>
-            </a:r>
-            <a:r>
-              <a:rPr/>
-              <a:t>Add</a:t>
-            </a:r>
-            <a:r>
-              <a:rPr/>
-              <a:t> </a:t>
-            </a:r>
-            <a:r>
-              <a:rPr/>
-              <a:t>a</a:t>
-            </a:r>
-            <a:r>
-              <a:rPr/>
-              <a:t> </a:t>
-            </a:r>
-            <a:r>
-              <a:rPr/>
-              <a:t>line</a:t>
-            </a:r>
-            <a:r>
-              <a:rPr/>
-              <a:t> </a:t>
-            </a:r>
-            <a:r>
-              <a:rPr/>
-              <a:t>conencting</a:t>
-            </a:r>
-            <a:r>
-              <a:rPr/>
-              <a:t> </a:t>
-            </a:r>
-            <a:r>
-              <a:rPr/>
-              <a:t>the</a:t>
-            </a:r>
-            <a:r>
-              <a:rPr/>
-              <a:t> </a:t>
-            </a:r>
-            <a:r>
-              <a:rPr/>
-              <a:t>individual</a:t>
-            </a:r>
-            <a:r>
-              <a:rPr/>
-              <a:t> </a:t>
-            </a:r>
-            <a:r>
-              <a:rPr/>
-              <a:t>averages.</a:t>
+              <a:t>average</a:t>
+            </a:r>
+            <a:r>
+              <a:rPr/>
+              <a:t> </a:t>
+            </a:r>
+            <a:r>
+              <a:rPr/>
+              <a:t>price</a:t>
+            </a:r>
+            <a:r>
+              <a:rPr/>
+              <a:t> </a:t>
+            </a:r>
+            <a:r>
+              <a:rPr/>
+              <a:t>increases.</a:t>
             </a:r>
           </a:p>
         </p:txBody>
@@ -2738,7 +2738,7 @@
           <a:p>
             <a:fld id="{18BDFEC3-8487-43E8-A154-7C12CBC1FFF2}" type="slidenum">
               <a:rPr lang="en-US"/>
-              <a:t>27</a:t>
+              <a:t>24</a:t>
             </a:fld>
             <a:endParaRPr lang="en-US"/>
           </a:p>
@@ -2798,31 +2798,63 @@
             </a:pPr>
             <a:r>
               <a:rPr/>
-              <a:t>The</a:t>
-            </a:r>
-            <a:r>
-              <a:rPr/>
-              <a:t> </a:t>
-            </a:r>
-            <a:r>
-              <a:rPr/>
-              <a:t>geom_point</a:t>
-            </a:r>
-            <a:r>
-              <a:rPr/>
-              <a:t> </a:t>
-            </a:r>
-            <a:r>
-              <a:rPr/>
-              <a:t>function</a:t>
-            </a:r>
-            <a:r>
-              <a:rPr/>
-              <a:t> </a:t>
-            </a:r>
-            <a:r>
-              <a:rPr/>
-              <a:t>creates</a:t>
+              <a:t>On</a:t>
+            </a:r>
+            <a:r>
+              <a:rPr/>
+              <a:t> </a:t>
+            </a:r>
+            <a:r>
+              <a:rPr/>
+              <a:t>your</a:t>
+            </a:r>
+            <a:r>
+              <a:rPr/>
+              <a:t> </a:t>
+            </a:r>
+            <a:r>
+              <a:rPr/>
+              <a:t>own,</a:t>
+            </a:r>
+            <a:r>
+              <a:rPr/>
+              <a:t> </a:t>
+            </a:r>
+            <a:r>
+              <a:rPr/>
+              <a:t>draw</a:t>
+            </a:r>
+            <a:r>
+              <a:rPr/>
+              <a:t> </a:t>
+            </a:r>
+            <a:r>
+              <a:rPr/>
+              <a:t>a</a:t>
+            </a:r>
+            <a:r>
+              <a:rPr/>
+              <a:t> </a:t>
+            </a:r>
+            <a:r>
+              <a:rPr/>
+              <a:t>similar</a:t>
+            </a:r>
+            <a:r>
+              <a:rPr/>
+              <a:t> </a:t>
+            </a:r>
+            <a:r>
+              <a:rPr/>
+              <a:t>plot.</a:t>
+            </a:r>
+            <a:r>
+              <a:rPr/>
+              <a:t> </a:t>
+            </a:r>
+            <a:r>
+              <a:rPr/>
+              <a:t>Put</a:t>
             </a:r>
             <a:r>
               <a:rPr/>
@@ -2838,7 +2870,55 @@
             </a:r>
             <a:r>
               <a:rPr/>
-              <a:t>scatterplot</a:t>
+              <a:t>number</a:t>
+            </a:r>
+            <a:r>
+              <a:rPr/>
+              <a:t> </a:t>
+            </a:r>
+            <a:r>
+              <a:rPr/>
+              <a:t>of</a:t>
+            </a:r>
+            <a:r>
+              <a:rPr/>
+              <a:t> </a:t>
+            </a:r>
+            <a:r>
+              <a:rPr/>
+              <a:t>bathrooms</a:t>
+            </a:r>
+            <a:r>
+              <a:rPr/>
+              <a:t> </a:t>
+            </a:r>
+            <a:r>
+              <a:rPr/>
+              <a:t>on</a:t>
+            </a:r>
+            <a:r>
+              <a:rPr/>
+              <a:t> </a:t>
+            </a:r>
+            <a:r>
+              <a:rPr/>
+              <a:t>the</a:t>
+            </a:r>
+            <a:r>
+              <a:rPr/>
+              <a:t> </a:t>
+            </a:r>
+            <a:r>
+              <a:rPr/>
+              <a:t>X</a:t>
+            </a:r>
+            <a:r>
+              <a:rPr/>
+              <a:t> </a:t>
+            </a:r>
+            <a:r>
+              <a:rPr/>
+              <a:t>axis</a:t>
             </a:r>
             <a:r>
               <a:rPr/>
@@ -2862,23 +2942,15 @@
             </a:r>
             <a:r>
               <a:rPr/>
-              <a:t>stat_summary</a:t>
-            </a:r>
-            <a:r>
-              <a:rPr/>
-              <a:t> </a:t>
-            </a:r>
-            <a:r>
-              <a:rPr/>
-              <a:t>function</a:t>
-            </a:r>
-            <a:r>
-              <a:rPr/>
-              <a:t> </a:t>
-            </a:r>
-            <a:r>
-              <a:rPr/>
-              <a:t>adds</a:t>
+              <a:t>age</a:t>
+            </a:r>
+            <a:r>
+              <a:rPr/>
+              <a:t> </a:t>
+            </a:r>
+            <a:r>
+              <a:rPr/>
+              <a:t>of</a:t>
             </a:r>
             <a:r>
               <a:rPr/>
@@ -2894,7 +2966,87 @@
             </a:r>
             <a:r>
               <a:rPr/>
-              <a:t>line.</a:t>
+              <a:t>house</a:t>
+            </a:r>
+            <a:r>
+              <a:rPr/>
+              <a:t> </a:t>
+            </a:r>
+            <a:r>
+              <a:rPr/>
+              <a:t>on</a:t>
+            </a:r>
+            <a:r>
+              <a:rPr/>
+              <a:t> </a:t>
+            </a:r>
+            <a:r>
+              <a:rPr/>
+              <a:t>the</a:t>
+            </a:r>
+            <a:r>
+              <a:rPr/>
+              <a:t> </a:t>
+            </a:r>
+            <a:r>
+              <a:rPr/>
+              <a:t>Y-axis.</a:t>
+            </a:r>
+            <a:r>
+              <a:rPr/>
+              <a:t> </a:t>
+            </a:r>
+            <a:r>
+              <a:rPr/>
+              <a:t>Add</a:t>
+            </a:r>
+            <a:r>
+              <a:rPr/>
+              <a:t> </a:t>
+            </a:r>
+            <a:r>
+              <a:rPr/>
+              <a:t>a</a:t>
+            </a:r>
+            <a:r>
+              <a:rPr/>
+              <a:t> </a:t>
+            </a:r>
+            <a:r>
+              <a:rPr/>
+              <a:t>line</a:t>
+            </a:r>
+            <a:r>
+              <a:rPr/>
+              <a:t> </a:t>
+            </a:r>
+            <a:r>
+              <a:rPr/>
+              <a:t>conencting</a:t>
+            </a:r>
+            <a:r>
+              <a:rPr/>
+              <a:t> </a:t>
+            </a:r>
+            <a:r>
+              <a:rPr/>
+              <a:t>the</a:t>
+            </a:r>
+            <a:r>
+              <a:rPr/>
+              <a:t> </a:t>
+            </a:r>
+            <a:r>
+              <a:rPr/>
+              <a:t>individual</a:t>
+            </a:r>
+            <a:r>
+              <a:rPr/>
+              <a:t> </a:t>
+            </a:r>
+            <a:r>
+              <a:rPr/>
+              <a:t>averages.</a:t>
             </a:r>
           </a:p>
         </p:txBody>
@@ -2916,7 +3068,7 @@
           <a:p>
             <a:fld id="{18BDFEC3-8487-43E8-A154-7C12CBC1FFF2}" type="slidenum">
               <a:rPr lang="en-US"/>
-              <a:t>30</a:t>
+              <a:t>27</a:t>
             </a:fld>
             <a:endParaRPr lang="en-US"/>
           </a:p>
@@ -2976,6 +3128,184 @@
             </a:pPr>
             <a:r>
               <a:rPr/>
+              <a:t>The</a:t>
+            </a:r>
+            <a:r>
+              <a:rPr/>
+              <a:t> </a:t>
+            </a:r>
+            <a:r>
+              <a:rPr/>
+              <a:t>geom_point</a:t>
+            </a:r>
+            <a:r>
+              <a:rPr/>
+              <a:t> </a:t>
+            </a:r>
+            <a:r>
+              <a:rPr/>
+              <a:t>function</a:t>
+            </a:r>
+            <a:r>
+              <a:rPr/>
+              <a:t> </a:t>
+            </a:r>
+            <a:r>
+              <a:rPr/>
+              <a:t>creates</a:t>
+            </a:r>
+            <a:r>
+              <a:rPr/>
+              <a:t> </a:t>
+            </a:r>
+            <a:r>
+              <a:rPr/>
+              <a:t>the</a:t>
+            </a:r>
+            <a:r>
+              <a:rPr/>
+              <a:t> </a:t>
+            </a:r>
+            <a:r>
+              <a:rPr/>
+              <a:t>scatterplot</a:t>
+            </a:r>
+            <a:r>
+              <a:rPr/>
+              <a:t> </a:t>
+            </a:r>
+            <a:r>
+              <a:rPr/>
+              <a:t>and</a:t>
+            </a:r>
+            <a:r>
+              <a:rPr/>
+              <a:t> </a:t>
+            </a:r>
+            <a:r>
+              <a:rPr/>
+              <a:t>the</a:t>
+            </a:r>
+            <a:r>
+              <a:rPr/>
+              <a:t> </a:t>
+            </a:r>
+            <a:r>
+              <a:rPr/>
+              <a:t>stat_summary</a:t>
+            </a:r>
+            <a:r>
+              <a:rPr/>
+              <a:t> </a:t>
+            </a:r>
+            <a:r>
+              <a:rPr/>
+              <a:t>function</a:t>
+            </a:r>
+            <a:r>
+              <a:rPr/>
+              <a:t> </a:t>
+            </a:r>
+            <a:r>
+              <a:rPr/>
+              <a:t>adds</a:t>
+            </a:r>
+            <a:r>
+              <a:rPr/>
+              <a:t> </a:t>
+            </a:r>
+            <a:r>
+              <a:rPr/>
+              <a:t>the</a:t>
+            </a:r>
+            <a:r>
+              <a:rPr/>
+              <a:t> </a:t>
+            </a:r>
+            <a:r>
+              <a:rPr/>
+              <a:t>line.</a:t>
+            </a:r>
+          </a:p>
+        </p:txBody>
+      </p:sp>
+      <p:sp>
+        <p:nvSpPr>
+          <p:cNvPr id="4" name="Slide Number Placeholder 3"/>
+          <p:cNvSpPr>
+            <a:spLocks noGrp="1"/>
+          </p:cNvSpPr>
+          <p:nvPr>
+            <p:ph type="sldNum" sz="quarter" idx="10"/>
+          </p:nvPr>
+        </p:nvSpPr>
+        <p:spPr/>
+        <p:txBody>
+          <a:bodyPr/>
+          <a:lstStyle/>
+          <a:p>
+            <a:fld id="{18BDFEC3-8487-43E8-A154-7C12CBC1FFF2}" type="slidenum">
+              <a:rPr lang="en-US"/>
+              <a:t>30</a:t>
+            </a:fld>
+            <a:endParaRPr lang="en-US"/>
+          </a:p>
+        </p:txBody>
+      </p:sp>
+    </p:spTree>
+  </p:cSld>
+</p:notes>
+</file>
+
+<file path=ppt/notesSlides/notesSlide17.xml><?xml version="1.0" encoding="utf-8"?>
+<p:notes xmlns:a="http://schemas.openxmlformats.org/drawingml/2006/main" xmlns:r="http://schemas.openxmlformats.org/officeDocument/2006/relationships" xmlns:p="http://schemas.openxmlformats.org/presentationml/2006/main">
+  <p:cSld>
+    <p:spTree>
+      <p:nvGrpSpPr>
+        <p:cNvPr id="1" name=""/>
+        <p:cNvGrpSpPr/>
+        <p:nvPr/>
+      </p:nvGrpSpPr>
+      <p:grpSpPr>
+        <a:xfrm>
+          <a:off x="0" y="0"/>
+          <a:ext cx="0" cy="0"/>
+          <a:chOff x="0" y="0"/>
+          <a:chExt cx="0" cy="0"/>
+        </a:xfrm>
+      </p:grpSpPr>
+      <p:sp>
+        <p:nvSpPr>
+          <p:cNvPr id="2" name="Slide Image Placeholder 1"/>
+          <p:cNvSpPr>
+            <a:spLocks noGrp="1" noRot="1" noChangeAspect="1"/>
+          </p:cNvSpPr>
+          <p:nvPr>
+            <p:ph type="sldImg"/>
+          </p:nvPr>
+        </p:nvSpPr>
+        <p:spPr/>
+      </p:sp>
+      <p:sp>
+        <p:nvSpPr>
+          <p:cNvPr id="3" name="Notes Placeholder 2"/>
+          <p:cNvSpPr>
+            <a:spLocks noGrp="1"/>
+          </p:cNvSpPr>
+          <p:nvPr>
+            <p:ph type="body" idx="1"/>
+          </p:nvPr>
+        </p:nvSpPr>
+        <p:spPr/>
+        <p:txBody>
+          <a:bodyPr/>
+          <a:lstStyle/>
+          <a:p>
+            <a:pPr lvl="0" marL="0" indent="0">
+              <a:buNone/>
+            </a:pPr>
+            <a:r>
+              <a:rPr/>
               <a:t>There</a:t>
             </a:r>
             <a:r>
@@ -7372,23 +7702,111 @@
             </a:pPr>
             <a:r>
               <a:rPr/>
-              <a:t>In</a:t>
-            </a:r>
-            <a:r>
-              <a:rPr/>
-              <a:t> </a:t>
-            </a:r>
-            <a:r>
-              <a:rPr/>
-              <a:t>Python,</a:t>
-            </a:r>
-            <a:r>
-              <a:rPr/>
-              <a:t> </a:t>
-            </a:r>
-            <a:r>
-              <a:rPr/>
-              <a:t>set</a:t>
+              <a:t>There</a:t>
+            </a:r>
+            <a:r>
+              <a:rPr/>
+              <a:t> </a:t>
+            </a:r>
+            <a:r>
+              <a:rPr/>
+              <a:t>is</a:t>
+            </a:r>
+            <a:r>
+              <a:rPr/>
+              <a:t> </a:t>
+            </a:r>
+            <a:r>
+              <a:rPr/>
+              <a:t>a</a:t>
+            </a:r>
+            <a:r>
+              <a:rPr/>
+              <a:t> </a:t>
+            </a:r>
+            <a:r>
+              <a:rPr/>
+              <a:t>code</a:t>
+            </a:r>
+            <a:r>
+              <a:rPr/>
+              <a:t> </a:t>
+            </a:r>
+            <a:r>
+              <a:rPr/>
+              <a:t>for</a:t>
+            </a:r>
+            <a:r>
+              <a:rPr/>
+              <a:t> </a:t>
+            </a:r>
+            <a:r>
+              <a:rPr/>
+              <a:t>dotted</a:t>
+            </a:r>
+            <a:r>
+              <a:rPr/>
+              <a:t> </a:t>
+            </a:r>
+            <a:r>
+              <a:rPr/>
+              <a:t>and</a:t>
+            </a:r>
+            <a:r>
+              <a:rPr/>
+              <a:t> </a:t>
+            </a:r>
+            <a:r>
+              <a:rPr/>
+              <a:t>dashed</a:t>
+            </a:r>
+            <a:r>
+              <a:rPr/>
+              <a:t> </a:t>
+            </a:r>
+            <a:r>
+              <a:rPr/>
+              <a:t>line</a:t>
+            </a:r>
+            <a:r>
+              <a:rPr/>
+              <a:t> </a:t>
+            </a:r>
+            <a:r>
+              <a:rPr/>
+              <a:t>patterns</a:t>
+            </a:r>
+            <a:r>
+              <a:rPr/>
+              <a:t> </a:t>
+            </a:r>
+            <a:r>
+              <a:rPr/>
+              <a:t>that</a:t>
+            </a:r>
+            <a:r>
+              <a:rPr/>
+              <a:t> </a:t>
+            </a:r>
+            <a:r>
+              <a:rPr/>
+              <a:t>works</a:t>
+            </a:r>
+            <a:r>
+              <a:rPr/>
+              <a:t> </a:t>
+            </a:r>
+            <a:r>
+              <a:rPr/>
+              <a:t>pretty</a:t>
+            </a:r>
+            <a:r>
+              <a:rPr/>
+              <a:t> </a:t>
+            </a:r>
+            <a:r>
+              <a:rPr/>
+              <a:t>much</a:t>
             </a:r>
             <a:r>
               <a:rPr/>
@@ -7404,47 +7822,39 @@
             </a:r>
             <a:r>
               <a:rPr/>
-              <a:t>strokeDash</a:t>
-            </a:r>
-            <a:r>
-              <a:rPr/>
-              <a:t> </a:t>
-            </a:r>
-            <a:r>
-              <a:rPr/>
-              <a:t>argument</a:t>
-            </a:r>
-            <a:r>
-              <a:rPr/>
-              <a:t> </a:t>
-            </a:r>
-            <a:r>
-              <a:rPr/>
-              <a:t>to</a:t>
-            </a:r>
-            <a:r>
-              <a:rPr/>
-              <a:t> </a:t>
-            </a:r>
-            <a:r>
-              <a:rPr/>
-              <a:t>create</a:t>
-            </a:r>
-            <a:r>
-              <a:rPr/>
-              <a:t> </a:t>
-            </a:r>
-            <a:r>
-              <a:rPr/>
-              <a:t>various</a:t>
-            </a:r>
-            <a:r>
-              <a:rPr/>
-              <a:t> </a:t>
-            </a:r>
-            <a:r>
-              <a:rPr/>
-              <a:t>dotted</a:t>
+              <a:t>same</a:t>
+            </a:r>
+            <a:r>
+              <a:rPr/>
+              <a:t> </a:t>
+            </a:r>
+            <a:r>
+              <a:rPr/>
+              <a:t>way</a:t>
+            </a:r>
+            <a:r>
+              <a:rPr/>
+              <a:t> </a:t>
+            </a:r>
+            <a:r>
+              <a:rPr/>
+              <a:t>for</a:t>
+            </a:r>
+            <a:r>
+              <a:rPr/>
+              <a:t> </a:t>
+            </a:r>
+            <a:r>
+              <a:rPr/>
+              <a:t>both</a:t>
+            </a:r>
+            <a:r>
+              <a:rPr/>
+              <a:t> </a:t>
+            </a:r>
+            <a:r>
+              <a:rPr/>
+              <a:t>Python</a:t>
             </a:r>
             <a:r>
               <a:rPr/>
@@ -7460,39 +7870,207 @@
             </a:r>
             <a:r>
               <a:rPr/>
-              <a:t>dashed</a:t>
-            </a:r>
-            <a:r>
-              <a:rPr/>
-              <a:t> </a:t>
-            </a:r>
-            <a:r>
-              <a:rPr/>
-              <a:t>lines.</a:t>
-            </a:r>
-            <a:r>
-              <a:rPr/>
-              <a:t> </a:t>
-            </a:r>
-            <a:r>
-              <a:rPr/>
-              <a:t>In</a:t>
-            </a:r>
-            <a:r>
-              <a:rPr/>
-              <a:t> </a:t>
-            </a:r>
-            <a:r>
-              <a:rPr/>
-              <a:t>R,</a:t>
-            </a:r>
-            <a:r>
-              <a:rPr/>
-              <a:t> </a:t>
-            </a:r>
-            <a:r>
-              <a:rPr/>
-              <a:t>use</a:t>
+              <a:t>R.</a:t>
+            </a:r>
+            <a:r>
+              <a:rPr/>
+              <a:t> </a:t>
+            </a:r>
+            <a:r>
+              <a:rPr/>
+              <a:t>You</a:t>
+            </a:r>
+            <a:r>
+              <a:rPr/>
+              <a:t> </a:t>
+            </a:r>
+            <a:r>
+              <a:rPr/>
+              <a:t>specify</a:t>
+            </a:r>
+            <a:r>
+              <a:rPr/>
+              <a:t> </a:t>
+            </a:r>
+            <a:r>
+              <a:rPr/>
+              <a:t>a</a:t>
+            </a:r>
+            <a:r>
+              <a:rPr/>
+              <a:t> </a:t>
+            </a:r>
+            <a:r>
+              <a:rPr/>
+              <a:t>sequence</a:t>
+            </a:r>
+            <a:r>
+              <a:rPr/>
+              <a:t> </a:t>
+            </a:r>
+            <a:r>
+              <a:rPr/>
+              <a:t>of</a:t>
+            </a:r>
+            <a:r>
+              <a:rPr/>
+              <a:t> </a:t>
+            </a:r>
+            <a:r>
+              <a:rPr/>
+              <a:t>two</a:t>
+            </a:r>
+            <a:r>
+              <a:rPr/>
+              <a:t> </a:t>
+            </a:r>
+            <a:r>
+              <a:rPr/>
+              <a:t>(sometimes</a:t>
+            </a:r>
+            <a:r>
+              <a:rPr/>
+              <a:t> </a:t>
+            </a:r>
+            <a:r>
+              <a:rPr/>
+              <a:t>four)</a:t>
+            </a:r>
+            <a:r>
+              <a:rPr/>
+              <a:t> </a:t>
+            </a:r>
+            <a:r>
+              <a:rPr/>
+              <a:t>numbers.</a:t>
+            </a:r>
+            <a:r>
+              <a:rPr/>
+              <a:t> </a:t>
+            </a:r>
+            <a:r>
+              <a:rPr/>
+              <a:t>The</a:t>
+            </a:r>
+            <a:r>
+              <a:rPr/>
+              <a:t> </a:t>
+            </a:r>
+            <a:r>
+              <a:rPr/>
+              <a:t>odd</a:t>
+            </a:r>
+            <a:r>
+              <a:rPr/>
+              <a:t> </a:t>
+            </a:r>
+            <a:r>
+              <a:rPr/>
+              <a:t>numbered</a:t>
+            </a:r>
+            <a:r>
+              <a:rPr/>
+              <a:t> </a:t>
+            </a:r>
+            <a:r>
+              <a:rPr/>
+              <a:t>values</a:t>
+            </a:r>
+            <a:r>
+              <a:rPr/>
+              <a:t> </a:t>
+            </a:r>
+            <a:r>
+              <a:rPr/>
+              <a:t>(first,</a:t>
+            </a:r>
+            <a:r>
+              <a:rPr/>
+              <a:t> </a:t>
+            </a:r>
+            <a:r>
+              <a:rPr/>
+              <a:t>third,</a:t>
+            </a:r>
+            <a:r>
+              <a:rPr/>
+              <a:t> </a:t>
+            </a:r>
+            <a:r>
+              <a:rPr/>
+              <a:t>etc.)</a:t>
+            </a:r>
+            <a:r>
+              <a:rPr/>
+              <a:t> </a:t>
+            </a:r>
+            <a:r>
+              <a:rPr/>
+              <a:t>represent</a:t>
+            </a:r>
+            <a:r>
+              <a:rPr/>
+              <a:t> </a:t>
+            </a:r>
+            <a:r>
+              <a:rPr/>
+              <a:t>an</a:t>
+            </a:r>
+            <a:r>
+              <a:rPr/>
+              <a:t> </a:t>
+            </a:r>
+            <a:r>
+              <a:rPr/>
+              <a:t>“</a:t>
+            </a:r>
+            <a:r>
+              <a:rPr/>
+              <a:t>on</a:t>
+            </a:r>
+            <a:r>
+              <a:rPr/>
+              <a:t>”</a:t>
+            </a:r>
+            <a:r>
+              <a:rPr/>
+              <a:t> </a:t>
+            </a:r>
+            <a:r>
+              <a:rPr/>
+              <a:t>number</a:t>
+            </a:r>
+            <a:r>
+              <a:rPr/>
+              <a:t> </a:t>
+            </a:r>
+            <a:r>
+              <a:rPr/>
+              <a:t>of</a:t>
+            </a:r>
+            <a:r>
+              <a:rPr/>
+              <a:t> </a:t>
+            </a:r>
+            <a:r>
+              <a:rPr/>
+              <a:t>pixels</a:t>
+            </a:r>
+            <a:r>
+              <a:rPr/>
+              <a:t> </a:t>
+            </a:r>
+            <a:r>
+              <a:rPr/>
+              <a:t>which</a:t>
+            </a:r>
+            <a:r>
+              <a:rPr/>
+              <a:t> </a:t>
+            </a:r>
+            <a:r>
+              <a:rPr/>
+              <a:t>specifies</a:t>
             </a:r>
             <a:r>
               <a:rPr/>
@@ -7508,55 +8086,7 @@
             </a:r>
             <a:r>
               <a:rPr/>
-              <a:t>linetype</a:t>
-            </a:r>
-            <a:r>
-              <a:rPr/>
-              <a:t> </a:t>
-            </a:r>
-            <a:r>
-              <a:rPr/>
-              <a:t>argument.</a:t>
-            </a:r>
-            <a:r>
-              <a:rPr/>
-              <a:t> </a:t>
-            </a:r>
-            <a:r>
-              <a:rPr/>
-              <a:t>Tableau</a:t>
-            </a:r>
-            <a:r>
-              <a:rPr/>
-              <a:t> </a:t>
-            </a:r>
-            <a:r>
-              <a:rPr/>
-              <a:t>allows</a:t>
-            </a:r>
-            <a:r>
-              <a:rPr/>
-              <a:t> </a:t>
-            </a:r>
-            <a:r>
-              <a:rPr/>
-              <a:t>you</a:t>
-            </a:r>
-            <a:r>
-              <a:rPr/>
-              <a:t> </a:t>
-            </a:r>
-            <a:r>
-              <a:rPr/>
-              <a:t>a</a:t>
-            </a:r>
-            <a:r>
-              <a:rPr/>
-              <a:t> </a:t>
-            </a:r>
-            <a:r>
-              <a:rPr/>
-              <a:t>lot</a:t>
+              <a:t>length</a:t>
             </a:r>
             <a:r>
               <a:rPr/>
@@ -7572,222 +8102,6 @@
             </a:r>
             <a:r>
               <a:rPr/>
-              <a:t>freedom</a:t>
-            </a:r>
-            <a:r>
-              <a:rPr/>
-              <a:t> </a:t>
-            </a:r>
-            <a:r>
-              <a:rPr/>
-              <a:t>in</a:t>
-            </a:r>
-            <a:r>
-              <a:rPr/>
-              <a:t> </a:t>
-            </a:r>
-            <a:r>
-              <a:rPr/>
-              <a:t>choosing</a:t>
-            </a:r>
-            <a:r>
-              <a:rPr/>
-              <a:t> </a:t>
-            </a:r>
-            <a:r>
-              <a:rPr/>
-              <a:t>between</a:t>
-            </a:r>
-            <a:r>
-              <a:rPr/>
-              <a:t> </a:t>
-            </a:r>
-            <a:r>
-              <a:rPr/>
-              <a:t>dotted</a:t>
-            </a:r>
-            <a:r>
-              <a:rPr/>
-              <a:t> </a:t>
-            </a:r>
-            <a:r>
-              <a:rPr/>
-              <a:t>and</a:t>
-            </a:r>
-            <a:r>
-              <a:rPr/>
-              <a:t> </a:t>
-            </a:r>
-            <a:r>
-              <a:rPr/>
-              <a:t>dashed</a:t>
-            </a:r>
-            <a:r>
-              <a:rPr/>
-              <a:t> </a:t>
-            </a:r>
-            <a:r>
-              <a:rPr/>
-              <a:t>lines</a:t>
-            </a:r>
-            <a:r>
-              <a:rPr/>
-              <a:t> </a:t>
-            </a:r>
-            <a:r>
-              <a:rPr/>
-              <a:t>when</a:t>
-            </a:r>
-            <a:r>
-              <a:rPr/>
-              <a:t> </a:t>
-            </a:r>
-            <a:r>
-              <a:rPr/>
-              <a:t>you</a:t>
-            </a:r>
-            <a:r>
-              <a:rPr/>
-              <a:t> </a:t>
-            </a:r>
-            <a:r>
-              <a:rPr/>
-              <a:t>have</a:t>
-            </a:r>
-            <a:r>
-              <a:rPr/>
-              <a:t> </a:t>
-            </a:r>
-            <a:r>
-              <a:rPr/>
-              <a:t>two</a:t>
-            </a:r>
-            <a:r>
-              <a:rPr/>
-              <a:t> </a:t>
-            </a:r>
-            <a:r>
-              <a:rPr/>
-              <a:t>or</a:t>
-            </a:r>
-            <a:r>
-              <a:rPr/>
-              <a:t> </a:t>
-            </a:r>
-            <a:r>
-              <a:rPr/>
-              <a:t>more</a:t>
-            </a:r>
-            <a:r>
-              <a:rPr/>
-              <a:t> </a:t>
-            </a:r>
-            <a:r>
-              <a:rPr/>
-              <a:t>lines</a:t>
-            </a:r>
-            <a:r>
-              <a:rPr/>
-              <a:t> </a:t>
-            </a:r>
-            <a:r>
-              <a:rPr/>
-              <a:t>on</a:t>
-            </a:r>
-            <a:r>
-              <a:rPr/>
-              <a:t> </a:t>
-            </a:r>
-            <a:r>
-              <a:rPr/>
-              <a:t>a</a:t>
-            </a:r>
-            <a:r>
-              <a:rPr/>
-              <a:t> </a:t>
-            </a:r>
-            <a:r>
-              <a:rPr/>
-              <a:t>single</a:t>
-            </a:r>
-            <a:r>
-              <a:rPr/>
-              <a:t> </a:t>
-            </a:r>
-            <a:r>
-              <a:rPr/>
-              <a:t>graph,</a:t>
-            </a:r>
-            <a:r>
-              <a:rPr/>
-              <a:t> </a:t>
-            </a:r>
-            <a:r>
-              <a:rPr/>
-              <a:t>but</a:t>
-            </a:r>
-            <a:r>
-              <a:rPr/>
-              <a:t> </a:t>
-            </a:r>
-            <a:r>
-              <a:rPr/>
-              <a:t>it</a:t>
-            </a:r>
-            <a:r>
-              <a:rPr/>
-              <a:t> </a:t>
-            </a:r>
-            <a:r>
-              <a:rPr/>
-              <a:t>is</a:t>
-            </a:r>
-            <a:r>
-              <a:rPr/>
-              <a:t> </a:t>
-            </a:r>
-            <a:r>
-              <a:rPr/>
-              <a:t>surprisingly</a:t>
-            </a:r>
-            <a:r>
-              <a:rPr/>
-              <a:t> </a:t>
-            </a:r>
-            <a:r>
-              <a:rPr/>
-              <a:t>hard</a:t>
-            </a:r>
-            <a:r>
-              <a:rPr/>
-              <a:t> </a:t>
-            </a:r>
-            <a:r>
-              <a:rPr/>
-              <a:t>to</a:t>
-            </a:r>
-            <a:r>
-              <a:rPr/>
-              <a:t> </a:t>
-            </a:r>
-            <a:r>
-              <a:rPr/>
-              <a:t>deviate</a:t>
-            </a:r>
-            <a:r>
-              <a:rPr/>
-              <a:t> </a:t>
-            </a:r>
-            <a:r>
-              <a:rPr/>
-              <a:t>from</a:t>
-            </a:r>
-            <a:r>
-              <a:rPr/>
-              <a:t> </a:t>
-            </a:r>
-            <a:r>
-              <a:rPr/>
               <a:t>the</a:t>
             </a:r>
             <a:r>
@@ -7796,15 +8110,103 @@
             </a:r>
             <a:r>
               <a:rPr/>
-              <a:t>formal</a:t>
-            </a:r>
-            <a:r>
-              <a:rPr/>
-              <a:t> </a:t>
-            </a:r>
-            <a:r>
-              <a:rPr/>
-              <a:t>default</a:t>
+              <a:t>dash.</a:t>
+            </a:r>
+            <a:r>
+              <a:rPr/>
+              <a:t> </a:t>
+            </a:r>
+            <a:r>
+              <a:rPr/>
+              <a:t>The</a:t>
+            </a:r>
+            <a:r>
+              <a:rPr/>
+              <a:t> </a:t>
+            </a:r>
+            <a:r>
+              <a:rPr/>
+              <a:t>even</a:t>
+            </a:r>
+            <a:r>
+              <a:rPr/>
+              <a:t> </a:t>
+            </a:r>
+            <a:r>
+              <a:rPr/>
+              <a:t>numbered</a:t>
+            </a:r>
+            <a:r>
+              <a:rPr/>
+              <a:t> </a:t>
+            </a:r>
+            <a:r>
+              <a:rPr/>
+              <a:t>values</a:t>
+            </a:r>
+            <a:r>
+              <a:rPr/>
+              <a:t> </a:t>
+            </a:r>
+            <a:r>
+              <a:rPr/>
+              <a:t>(second,</a:t>
+            </a:r>
+            <a:r>
+              <a:rPr/>
+              <a:t> </a:t>
+            </a:r>
+            <a:r>
+              <a:rPr/>
+              <a:t>fourth,</a:t>
+            </a:r>
+            <a:r>
+              <a:rPr/>
+              <a:t> </a:t>
+            </a:r>
+            <a:r>
+              <a:rPr/>
+              <a:t>etc.)</a:t>
+            </a:r>
+            <a:r>
+              <a:rPr/>
+              <a:t> </a:t>
+            </a:r>
+            <a:r>
+              <a:rPr/>
+              <a:t>represent</a:t>
+            </a:r>
+            <a:r>
+              <a:rPr/>
+              <a:t> </a:t>
+            </a:r>
+            <a:r>
+              <a:rPr/>
+              <a:t>an</a:t>
+            </a:r>
+            <a:r>
+              <a:rPr/>
+              <a:t> </a:t>
+            </a:r>
+            <a:r>
+              <a:rPr/>
+              <a:t>“</a:t>
+            </a:r>
+            <a:r>
+              <a:rPr/>
+              <a:t>off</a:t>
+            </a:r>
+            <a:r>
+              <a:rPr/>
+              <a:t>”</a:t>
+            </a:r>
+            <a:r>
+              <a:rPr/>
+              <a:t> </a:t>
+            </a:r>
+            <a:r>
+              <a:rPr/>
+              <a:t>number</a:t>
             </a:r>
             <a:r>
               <a:rPr/>
@@ -7820,303 +8222,7 @@
             </a:r>
             <a:r>
               <a:rPr/>
-              <a:t>a</a:t>
-            </a:r>
-            <a:r>
-              <a:rPr/>
-              <a:t> </a:t>
-            </a:r>
-            <a:r>
-              <a:rPr/>
-              <a:t>solid</a:t>
-            </a:r>
-            <a:r>
-              <a:rPr/>
-              <a:t> </a:t>
-            </a:r>
-            <a:r>
-              <a:rPr/>
-              <a:t>line</a:t>
-            </a:r>
-            <a:r>
-              <a:rPr/>
-              <a:t> </a:t>
-            </a:r>
-            <a:r>
-              <a:rPr/>
-              <a:t>when</a:t>
-            </a:r>
-            <a:r>
-              <a:rPr/>
-              <a:t> </a:t>
-            </a:r>
-            <a:r>
-              <a:rPr/>
-              <a:t>you</a:t>
-            </a:r>
-            <a:r>
-              <a:rPr/>
-              <a:t> </a:t>
-            </a:r>
-            <a:r>
-              <a:rPr/>
-              <a:t>only</a:t>
-            </a:r>
-            <a:r>
-              <a:rPr/>
-              <a:t> </a:t>
-            </a:r>
-            <a:r>
-              <a:rPr/>
-              <a:t>have</a:t>
-            </a:r>
-            <a:r>
-              <a:rPr/>
-              <a:t> </a:t>
-            </a:r>
-            <a:r>
-              <a:rPr/>
-              <a:t>a</a:t>
-            </a:r>
-            <a:r>
-              <a:rPr/>
-              <a:t> </a:t>
-            </a:r>
-            <a:r>
-              <a:rPr/>
-              <a:t>single</a:t>
-            </a:r>
-            <a:r>
-              <a:rPr/>
-              <a:t> </a:t>
-            </a:r>
-            <a:r>
-              <a:rPr/>
-              <a:t>line</a:t>
-            </a:r>
-            <a:r>
-              <a:rPr/>
-              <a:t> </a:t>
-            </a:r>
-            <a:r>
-              <a:rPr/>
-              <a:t>on</a:t>
-            </a:r>
-            <a:r>
-              <a:rPr/>
-              <a:t> </a:t>
-            </a:r>
-            <a:r>
-              <a:rPr/>
-              <a:t>your</a:t>
-            </a:r>
-            <a:r>
-              <a:rPr/>
-              <a:t> </a:t>
-            </a:r>
-            <a:r>
-              <a:rPr/>
-              <a:t>graph.</a:t>
-            </a:r>
-            <a:r>
-              <a:rPr/>
-              <a:t> </a:t>
-            </a:r>
-            <a:r>
-              <a:rPr/>
-              <a:t>This</a:t>
-            </a:r>
-            <a:r>
-              <a:rPr/>
-              <a:t> </a:t>
-            </a:r>
-            <a:r>
-              <a:rPr/>
-              <a:t>is</a:t>
-            </a:r>
-            <a:r>
-              <a:rPr/>
-              <a:t> </a:t>
-            </a:r>
-            <a:r>
-              <a:rPr/>
-              <a:t>annoying,</a:t>
-            </a:r>
-            <a:r>
-              <a:rPr/>
-              <a:t> </a:t>
-            </a:r>
-            <a:r>
-              <a:rPr/>
-              <a:t>but</a:t>
-            </a:r>
-            <a:r>
-              <a:rPr/>
-              <a:t> </a:t>
-            </a:r>
-            <a:r>
-              <a:rPr/>
-              <a:t>quite</a:t>
-            </a:r>
-            <a:r>
-              <a:rPr/>
-              <a:t> </a:t>
-            </a:r>
-            <a:r>
-              <a:rPr/>
-              <a:t>honestly,</a:t>
-            </a:r>
-            <a:r>
-              <a:rPr/>
-              <a:t> </a:t>
-            </a:r>
-            <a:r>
-              <a:rPr/>
-              <a:t>there</a:t>
-            </a:r>
-            <a:r>
-              <a:rPr/>
-              <a:t> </a:t>
-            </a:r>
-            <a:r>
-              <a:rPr/>
-              <a:t>is</a:t>
-            </a:r>
-            <a:r>
-              <a:rPr/>
-              <a:t> </a:t>
-            </a:r>
-            <a:r>
-              <a:rPr/>
-              <a:t>little</a:t>
-            </a:r>
-            <a:r>
-              <a:rPr/>
-              <a:t> </a:t>
-            </a:r>
-            <a:r>
-              <a:rPr/>
-              <a:t>reason</a:t>
-            </a:r>
-            <a:r>
-              <a:rPr/>
-              <a:t> </a:t>
-            </a:r>
-            <a:r>
-              <a:rPr/>
-              <a:t>to</a:t>
-            </a:r>
-            <a:r>
-              <a:rPr/>
-              <a:t> </a:t>
-            </a:r>
-            <a:r>
-              <a:rPr/>
-              <a:t>deviate</a:t>
-            </a:r>
-            <a:r>
-              <a:rPr/>
-              <a:t> </a:t>
-            </a:r>
-            <a:r>
-              <a:rPr/>
-              <a:t>from</a:t>
-            </a:r>
-            <a:r>
-              <a:rPr/>
-              <a:t> </a:t>
-            </a:r>
-            <a:r>
-              <a:rPr/>
-              <a:t>a</a:t>
-            </a:r>
-            <a:r>
-              <a:rPr/>
-              <a:t> </a:t>
-            </a:r>
-            <a:r>
-              <a:rPr/>
-              <a:t>solid</a:t>
-            </a:r>
-            <a:r>
-              <a:rPr/>
-              <a:t> </a:t>
-            </a:r>
-            <a:r>
-              <a:rPr/>
-              <a:t>line</a:t>
-            </a:r>
-            <a:r>
-              <a:rPr/>
-              <a:t> </a:t>
-            </a:r>
-            <a:r>
-              <a:rPr/>
-              <a:t>when</a:t>
-            </a:r>
-            <a:r>
-              <a:rPr/>
-              <a:t> </a:t>
-            </a:r>
-            <a:r>
-              <a:rPr/>
-              <a:t>you</a:t>
-            </a:r>
-            <a:r>
-              <a:rPr/>
-              <a:t> </a:t>
-            </a:r>
-            <a:r>
-              <a:rPr/>
-              <a:t>only</a:t>
-            </a:r>
-            <a:r>
-              <a:rPr/>
-              <a:t> </a:t>
-            </a:r>
-            <a:r>
-              <a:rPr/>
-              <a:t>have</a:t>
-            </a:r>
-            <a:r>
-              <a:rPr/>
-              <a:t> </a:t>
-            </a:r>
-            <a:r>
-              <a:rPr/>
-              <a:t>one</a:t>
-            </a:r>
-            <a:r>
-              <a:rPr/>
-              <a:t> </a:t>
-            </a:r>
-            <a:r>
-              <a:rPr/>
-              <a:t>line</a:t>
-            </a:r>
-            <a:r>
-              <a:rPr/>
-              <a:t> </a:t>
-            </a:r>
-            <a:r>
-              <a:rPr/>
-              <a:t>on</a:t>
-            </a:r>
-            <a:r>
-              <a:rPr/>
-              <a:t> </a:t>
-            </a:r>
-            <a:r>
-              <a:rPr/>
-              <a:t>your</a:t>
-            </a:r>
-            <a:r>
-              <a:rPr/>
-              <a:t> </a:t>
-            </a:r>
-            <a:r>
-              <a:rPr/>
-              <a:t>graph.</a:t>
+              <a:t>pixels</a:t>
             </a:r>
           </a:p>
         </p:txBody>
@@ -8138,7 +8244,7 @@
           <a:p>
             <a:fld id="{18BDFEC3-8487-43E8-A154-7C12CBC1FFF2}" type="slidenum">
               <a:rPr lang="en-US"/>
-              <a:t>11</a:t>
+              <a:t>10</a:t>
             </a:fld>
             <a:endParaRPr lang="en-US"/>
           </a:p>
@@ -8198,7 +8304,23 @@
             </a:pPr>
             <a:r>
               <a:rPr/>
-              <a:t>Take</a:t>
+              <a:t>In</a:t>
+            </a:r>
+            <a:r>
+              <a:rPr/>
+              <a:t> </a:t>
+            </a:r>
+            <a:r>
+              <a:rPr/>
+              <a:t>Python,</a:t>
+            </a:r>
+            <a:r>
+              <a:rPr/>
+              <a:t> </a:t>
+            </a:r>
+            <a:r>
+              <a:rPr/>
+              <a:t>set</a:t>
             </a:r>
             <a:r>
               <a:rPr/>
@@ -8214,7 +8336,431 @@
             </a:r>
             <a:r>
               <a:rPr/>
-              <a:t>CPI</a:t>
+              <a:t>strokeDash</a:t>
+            </a:r>
+            <a:r>
+              <a:rPr/>
+              <a:t> </a:t>
+            </a:r>
+            <a:r>
+              <a:rPr/>
+              <a:t>argument</a:t>
+            </a:r>
+            <a:r>
+              <a:rPr/>
+              <a:t> </a:t>
+            </a:r>
+            <a:r>
+              <a:rPr/>
+              <a:t>to</a:t>
+            </a:r>
+            <a:r>
+              <a:rPr/>
+              <a:t> </a:t>
+            </a:r>
+            <a:r>
+              <a:rPr/>
+              <a:t>create</a:t>
+            </a:r>
+            <a:r>
+              <a:rPr/>
+              <a:t> </a:t>
+            </a:r>
+            <a:r>
+              <a:rPr/>
+              <a:t>various</a:t>
+            </a:r>
+            <a:r>
+              <a:rPr/>
+              <a:t> </a:t>
+            </a:r>
+            <a:r>
+              <a:rPr/>
+              <a:t>dotted</a:t>
+            </a:r>
+            <a:r>
+              <a:rPr/>
+              <a:t> </a:t>
+            </a:r>
+            <a:r>
+              <a:rPr/>
+              <a:t>and</a:t>
+            </a:r>
+            <a:r>
+              <a:rPr/>
+              <a:t> </a:t>
+            </a:r>
+            <a:r>
+              <a:rPr/>
+              <a:t>dashed</a:t>
+            </a:r>
+            <a:r>
+              <a:rPr/>
+              <a:t> </a:t>
+            </a:r>
+            <a:r>
+              <a:rPr/>
+              <a:t>lines.</a:t>
+            </a:r>
+            <a:r>
+              <a:rPr/>
+              <a:t> </a:t>
+            </a:r>
+            <a:r>
+              <a:rPr/>
+              <a:t>In</a:t>
+            </a:r>
+            <a:r>
+              <a:rPr/>
+              <a:t> </a:t>
+            </a:r>
+            <a:r>
+              <a:rPr/>
+              <a:t>R,</a:t>
+            </a:r>
+            <a:r>
+              <a:rPr/>
+              <a:t> </a:t>
+            </a:r>
+            <a:r>
+              <a:rPr/>
+              <a:t>use</a:t>
+            </a:r>
+            <a:r>
+              <a:rPr/>
+              <a:t> </a:t>
+            </a:r>
+            <a:r>
+              <a:rPr/>
+              <a:t>the</a:t>
+            </a:r>
+            <a:r>
+              <a:rPr/>
+              <a:t> </a:t>
+            </a:r>
+            <a:r>
+              <a:rPr/>
+              <a:t>linetype</a:t>
+            </a:r>
+            <a:r>
+              <a:rPr/>
+              <a:t> </a:t>
+            </a:r>
+            <a:r>
+              <a:rPr/>
+              <a:t>argument.</a:t>
+            </a:r>
+            <a:r>
+              <a:rPr/>
+              <a:t> </a:t>
+            </a:r>
+            <a:r>
+              <a:rPr/>
+              <a:t>Tableau</a:t>
+            </a:r>
+            <a:r>
+              <a:rPr/>
+              <a:t> </a:t>
+            </a:r>
+            <a:r>
+              <a:rPr/>
+              <a:t>allows</a:t>
+            </a:r>
+            <a:r>
+              <a:rPr/>
+              <a:t> </a:t>
+            </a:r>
+            <a:r>
+              <a:rPr/>
+              <a:t>you</a:t>
+            </a:r>
+            <a:r>
+              <a:rPr/>
+              <a:t> </a:t>
+            </a:r>
+            <a:r>
+              <a:rPr/>
+              <a:t>a</a:t>
+            </a:r>
+            <a:r>
+              <a:rPr/>
+              <a:t> </a:t>
+            </a:r>
+            <a:r>
+              <a:rPr/>
+              <a:t>lot</a:t>
+            </a:r>
+            <a:r>
+              <a:rPr/>
+              <a:t> </a:t>
+            </a:r>
+            <a:r>
+              <a:rPr/>
+              <a:t>of</a:t>
+            </a:r>
+            <a:r>
+              <a:rPr/>
+              <a:t> </a:t>
+            </a:r>
+            <a:r>
+              <a:rPr/>
+              <a:t>freedom</a:t>
+            </a:r>
+            <a:r>
+              <a:rPr/>
+              <a:t> </a:t>
+            </a:r>
+            <a:r>
+              <a:rPr/>
+              <a:t>in</a:t>
+            </a:r>
+            <a:r>
+              <a:rPr/>
+              <a:t> </a:t>
+            </a:r>
+            <a:r>
+              <a:rPr/>
+              <a:t>choosing</a:t>
+            </a:r>
+            <a:r>
+              <a:rPr/>
+              <a:t> </a:t>
+            </a:r>
+            <a:r>
+              <a:rPr/>
+              <a:t>between</a:t>
+            </a:r>
+            <a:r>
+              <a:rPr/>
+              <a:t> </a:t>
+            </a:r>
+            <a:r>
+              <a:rPr/>
+              <a:t>dotted</a:t>
+            </a:r>
+            <a:r>
+              <a:rPr/>
+              <a:t> </a:t>
+            </a:r>
+            <a:r>
+              <a:rPr/>
+              <a:t>and</a:t>
+            </a:r>
+            <a:r>
+              <a:rPr/>
+              <a:t> </a:t>
+            </a:r>
+            <a:r>
+              <a:rPr/>
+              <a:t>dashed</a:t>
+            </a:r>
+            <a:r>
+              <a:rPr/>
+              <a:t> </a:t>
+            </a:r>
+            <a:r>
+              <a:rPr/>
+              <a:t>lines</a:t>
+            </a:r>
+            <a:r>
+              <a:rPr/>
+              <a:t> </a:t>
+            </a:r>
+            <a:r>
+              <a:rPr/>
+              <a:t>when</a:t>
+            </a:r>
+            <a:r>
+              <a:rPr/>
+              <a:t> </a:t>
+            </a:r>
+            <a:r>
+              <a:rPr/>
+              <a:t>you</a:t>
+            </a:r>
+            <a:r>
+              <a:rPr/>
+              <a:t> </a:t>
+            </a:r>
+            <a:r>
+              <a:rPr/>
+              <a:t>have</a:t>
+            </a:r>
+            <a:r>
+              <a:rPr/>
+              <a:t> </a:t>
+            </a:r>
+            <a:r>
+              <a:rPr/>
+              <a:t>two</a:t>
+            </a:r>
+            <a:r>
+              <a:rPr/>
+              <a:t> </a:t>
+            </a:r>
+            <a:r>
+              <a:rPr/>
+              <a:t>or</a:t>
+            </a:r>
+            <a:r>
+              <a:rPr/>
+              <a:t> </a:t>
+            </a:r>
+            <a:r>
+              <a:rPr/>
+              <a:t>more</a:t>
+            </a:r>
+            <a:r>
+              <a:rPr/>
+              <a:t> </a:t>
+            </a:r>
+            <a:r>
+              <a:rPr/>
+              <a:t>lines</a:t>
+            </a:r>
+            <a:r>
+              <a:rPr/>
+              <a:t> </a:t>
+            </a:r>
+            <a:r>
+              <a:rPr/>
+              <a:t>on</a:t>
+            </a:r>
+            <a:r>
+              <a:rPr/>
+              <a:t> </a:t>
+            </a:r>
+            <a:r>
+              <a:rPr/>
+              <a:t>a</a:t>
+            </a:r>
+            <a:r>
+              <a:rPr/>
+              <a:t> </a:t>
+            </a:r>
+            <a:r>
+              <a:rPr/>
+              <a:t>single</a:t>
+            </a:r>
+            <a:r>
+              <a:rPr/>
+              <a:t> </a:t>
+            </a:r>
+            <a:r>
+              <a:rPr/>
+              <a:t>graph,</a:t>
+            </a:r>
+            <a:r>
+              <a:rPr/>
+              <a:t> </a:t>
+            </a:r>
+            <a:r>
+              <a:rPr/>
+              <a:t>but</a:t>
+            </a:r>
+            <a:r>
+              <a:rPr/>
+              <a:t> </a:t>
+            </a:r>
+            <a:r>
+              <a:rPr/>
+              <a:t>it</a:t>
+            </a:r>
+            <a:r>
+              <a:rPr/>
+              <a:t> </a:t>
+            </a:r>
+            <a:r>
+              <a:rPr/>
+              <a:t>is</a:t>
+            </a:r>
+            <a:r>
+              <a:rPr/>
+              <a:t> </a:t>
+            </a:r>
+            <a:r>
+              <a:rPr/>
+              <a:t>surprisingly</a:t>
+            </a:r>
+            <a:r>
+              <a:rPr/>
+              <a:t> </a:t>
+            </a:r>
+            <a:r>
+              <a:rPr/>
+              <a:t>hard</a:t>
+            </a:r>
+            <a:r>
+              <a:rPr/>
+              <a:t> </a:t>
+            </a:r>
+            <a:r>
+              <a:rPr/>
+              <a:t>to</a:t>
+            </a:r>
+            <a:r>
+              <a:rPr/>
+              <a:t> </a:t>
+            </a:r>
+            <a:r>
+              <a:rPr/>
+              <a:t>deviate</a:t>
+            </a:r>
+            <a:r>
+              <a:rPr/>
+              <a:t> </a:t>
+            </a:r>
+            <a:r>
+              <a:rPr/>
+              <a:t>from</a:t>
+            </a:r>
+            <a:r>
+              <a:rPr/>
+              <a:t> </a:t>
+            </a:r>
+            <a:r>
+              <a:rPr/>
+              <a:t>the</a:t>
+            </a:r>
+            <a:r>
+              <a:rPr/>
+              <a:t> </a:t>
+            </a:r>
+            <a:r>
+              <a:rPr/>
+              <a:t>formal</a:t>
+            </a:r>
+            <a:r>
+              <a:rPr/>
+              <a:t> </a:t>
+            </a:r>
+            <a:r>
+              <a:rPr/>
+              <a:t>default</a:t>
+            </a:r>
+            <a:r>
+              <a:rPr/>
+              <a:t> </a:t>
+            </a:r>
+            <a:r>
+              <a:rPr/>
+              <a:t>of</a:t>
+            </a:r>
+            <a:r>
+              <a:rPr/>
+              <a:t> </a:t>
+            </a:r>
+            <a:r>
+              <a:rPr/>
+              <a:t>a</a:t>
+            </a:r>
+            <a:r>
+              <a:rPr/>
+              <a:t> </a:t>
+            </a:r>
+            <a:r>
+              <a:rPr/>
+              <a:t>solid</a:t>
             </a:r>
             <a:r>
               <a:rPr/>
@@ -8230,79 +8776,47 @@
             </a:r>
             <a:r>
               <a:rPr/>
-              <a:t>graph</a:t>
-            </a:r>
-            <a:r>
-              <a:rPr/>
-              <a:t> </a:t>
-            </a:r>
-            <a:r>
-              <a:rPr/>
-              <a:t>and</a:t>
-            </a:r>
-            <a:r>
-              <a:rPr/>
-              <a:t> </a:t>
-            </a:r>
-            <a:r>
-              <a:rPr/>
-              <a:t>modify</a:t>
-            </a:r>
-            <a:r>
-              <a:rPr/>
-              <a:t> </a:t>
-            </a:r>
-            <a:r>
-              <a:rPr/>
-              <a:t>some</a:t>
-            </a:r>
-            <a:r>
-              <a:rPr/>
-              <a:t> </a:t>
-            </a:r>
-            <a:r>
-              <a:rPr/>
-              <a:t>of</a:t>
-            </a:r>
-            <a:r>
-              <a:rPr/>
-              <a:t> </a:t>
-            </a:r>
-            <a:r>
-              <a:rPr/>
-              <a:t>the</a:t>
-            </a:r>
-            <a:r>
-              <a:rPr/>
-              <a:t> </a:t>
-            </a:r>
-            <a:r>
-              <a:rPr/>
-              <a:t>default</a:t>
-            </a:r>
-            <a:r>
-              <a:rPr/>
-              <a:t> </a:t>
-            </a:r>
-            <a:r>
-              <a:rPr/>
-              <a:t>options.</a:t>
-            </a:r>
-            <a:r>
-              <a:rPr/>
-              <a:t> </a:t>
-            </a:r>
-            <a:r>
-              <a:rPr/>
-              <a:t>Make</a:t>
-            </a:r>
-            <a:r>
-              <a:rPr/>
-              <a:t> </a:t>
-            </a:r>
-            <a:r>
-              <a:rPr/>
-              <a:t>the</a:t>
+              <a:t>when</a:t>
+            </a:r>
+            <a:r>
+              <a:rPr/>
+              <a:t> </a:t>
+            </a:r>
+            <a:r>
+              <a:rPr/>
+              <a:t>you</a:t>
+            </a:r>
+            <a:r>
+              <a:rPr/>
+              <a:t> </a:t>
+            </a:r>
+            <a:r>
+              <a:rPr/>
+              <a:t>only</a:t>
+            </a:r>
+            <a:r>
+              <a:rPr/>
+              <a:t> </a:t>
+            </a:r>
+            <a:r>
+              <a:rPr/>
+              <a:t>have</a:t>
+            </a:r>
+            <a:r>
+              <a:rPr/>
+              <a:t> </a:t>
+            </a:r>
+            <a:r>
+              <a:rPr/>
+              <a:t>a</a:t>
+            </a:r>
+            <a:r>
+              <a:rPr/>
+              <a:t> </a:t>
+            </a:r>
+            <a:r>
+              <a:rPr/>
+              <a:t>single</a:t>
             </a:r>
             <a:r>
               <a:rPr/>
@@ -8318,39 +8832,103 @@
             </a:r>
             <a:r>
               <a:rPr/>
-              <a:t>green</a:t>
-            </a:r>
-            <a:r>
-              <a:rPr/>
-              <a:t> </a:t>
-            </a:r>
-            <a:r>
-              <a:rPr/>
-              <a:t>and</a:t>
-            </a:r>
-            <a:r>
-              <a:rPr/>
-              <a:t> </a:t>
-            </a:r>
-            <a:r>
-              <a:rPr/>
-              <a:t>increase</a:t>
-            </a:r>
-            <a:r>
-              <a:rPr/>
-              <a:t> </a:t>
-            </a:r>
-            <a:r>
-              <a:rPr/>
-              <a:t>the</a:t>
-            </a:r>
-            <a:r>
-              <a:rPr/>
-              <a:t> </a:t>
-            </a:r>
-            <a:r>
-              <a:rPr/>
-              <a:t>thickness</a:t>
+              <a:t>on</a:t>
+            </a:r>
+            <a:r>
+              <a:rPr/>
+              <a:t> </a:t>
+            </a:r>
+            <a:r>
+              <a:rPr/>
+              <a:t>your</a:t>
+            </a:r>
+            <a:r>
+              <a:rPr/>
+              <a:t> </a:t>
+            </a:r>
+            <a:r>
+              <a:rPr/>
+              <a:t>graph.</a:t>
+            </a:r>
+            <a:r>
+              <a:rPr/>
+              <a:t> </a:t>
+            </a:r>
+            <a:r>
+              <a:rPr/>
+              <a:t>This</a:t>
+            </a:r>
+            <a:r>
+              <a:rPr/>
+              <a:t> </a:t>
+            </a:r>
+            <a:r>
+              <a:rPr/>
+              <a:t>is</a:t>
+            </a:r>
+            <a:r>
+              <a:rPr/>
+              <a:t> </a:t>
+            </a:r>
+            <a:r>
+              <a:rPr/>
+              <a:t>annoying,</a:t>
+            </a:r>
+            <a:r>
+              <a:rPr/>
+              <a:t> </a:t>
+            </a:r>
+            <a:r>
+              <a:rPr/>
+              <a:t>but</a:t>
+            </a:r>
+            <a:r>
+              <a:rPr/>
+              <a:t> </a:t>
+            </a:r>
+            <a:r>
+              <a:rPr/>
+              <a:t>quite</a:t>
+            </a:r>
+            <a:r>
+              <a:rPr/>
+              <a:t> </a:t>
+            </a:r>
+            <a:r>
+              <a:rPr/>
+              <a:t>honestly,</a:t>
+            </a:r>
+            <a:r>
+              <a:rPr/>
+              <a:t> </a:t>
+            </a:r>
+            <a:r>
+              <a:rPr/>
+              <a:t>there</a:t>
+            </a:r>
+            <a:r>
+              <a:rPr/>
+              <a:t> </a:t>
+            </a:r>
+            <a:r>
+              <a:rPr/>
+              <a:t>is</a:t>
+            </a:r>
+            <a:r>
+              <a:rPr/>
+              <a:t> </a:t>
+            </a:r>
+            <a:r>
+              <a:rPr/>
+              <a:t>little</a:t>
+            </a:r>
+            <a:r>
+              <a:rPr/>
+              <a:t> </a:t>
+            </a:r>
+            <a:r>
+              <a:rPr/>
+              <a:t>reason</a:t>
             </a:r>
             <a:r>
               <a:rPr/>
@@ -8366,23 +8944,15 @@
             </a:r>
             <a:r>
               <a:rPr/>
-              <a:t>three</a:t>
-            </a:r>
-            <a:r>
-              <a:rPr/>
-              <a:t> </a:t>
-            </a:r>
-            <a:r>
-              <a:rPr/>
-              <a:t>pixels.</a:t>
-            </a:r>
-            <a:r>
-              <a:rPr/>
-              <a:t> </a:t>
-            </a:r>
-            <a:r>
-              <a:rPr/>
-              <a:t>Use</a:t>
+              <a:t>deviate</a:t>
+            </a:r>
+            <a:r>
+              <a:rPr/>
+              <a:t> </a:t>
+            </a:r>
+            <a:r>
+              <a:rPr/>
+              <a:t>from</a:t>
             </a:r>
             <a:r>
               <a:rPr/>
@@ -8398,7 +8968,7 @@
             </a:r>
             <a:r>
               <a:rPr/>
-              <a:t>dashed</a:t>
+              <a:t>solid</a:t>
             </a:r>
             <a:r>
               <a:rPr/>
@@ -8414,39 +8984,71 @@
             </a:r>
             <a:r>
               <a:rPr/>
-              <a:t>instead</a:t>
-            </a:r>
-            <a:r>
-              <a:rPr/>
-              <a:t> </a:t>
-            </a:r>
-            <a:r>
-              <a:rPr/>
-              <a:t>of</a:t>
-            </a:r>
-            <a:r>
-              <a:rPr/>
-              <a:t> </a:t>
-            </a:r>
-            <a:r>
-              <a:rPr/>
-              <a:t>a</a:t>
-            </a:r>
-            <a:r>
-              <a:rPr/>
-              <a:t> </a:t>
-            </a:r>
-            <a:r>
-              <a:rPr/>
-              <a:t>dotted</a:t>
-            </a:r>
-            <a:r>
-              <a:rPr/>
-              <a:t> </a:t>
-            </a:r>
-            <a:r>
-              <a:rPr/>
-              <a:t>line.</a:t>
+              <a:t>when</a:t>
+            </a:r>
+            <a:r>
+              <a:rPr/>
+              <a:t> </a:t>
+            </a:r>
+            <a:r>
+              <a:rPr/>
+              <a:t>you</a:t>
+            </a:r>
+            <a:r>
+              <a:rPr/>
+              <a:t> </a:t>
+            </a:r>
+            <a:r>
+              <a:rPr/>
+              <a:t>only</a:t>
+            </a:r>
+            <a:r>
+              <a:rPr/>
+              <a:t> </a:t>
+            </a:r>
+            <a:r>
+              <a:rPr/>
+              <a:t>have</a:t>
+            </a:r>
+            <a:r>
+              <a:rPr/>
+              <a:t> </a:t>
+            </a:r>
+            <a:r>
+              <a:rPr/>
+              <a:t>one</a:t>
+            </a:r>
+            <a:r>
+              <a:rPr/>
+              <a:t> </a:t>
+            </a:r>
+            <a:r>
+              <a:rPr/>
+              <a:t>line</a:t>
+            </a:r>
+            <a:r>
+              <a:rPr/>
+              <a:t> </a:t>
+            </a:r>
+            <a:r>
+              <a:rPr/>
+              <a:t>on</a:t>
+            </a:r>
+            <a:r>
+              <a:rPr/>
+              <a:t> </a:t>
+            </a:r>
+            <a:r>
+              <a:rPr/>
+              <a:t>your</a:t>
+            </a:r>
+            <a:r>
+              <a:rPr/>
+              <a:t> </a:t>
+            </a:r>
+            <a:r>
+              <a:rPr/>
+              <a:t>graph.</a:t>
             </a:r>
           </a:p>
         </p:txBody>
@@ -8468,7 +9070,7 @@
           <a:p>
             <a:fld id="{18BDFEC3-8487-43E8-A154-7C12CBC1FFF2}" type="slidenum">
               <a:rPr lang="en-US"/>
-              <a:t>12</a:t>
+              <a:t>11</a:t>
             </a:fld>
             <a:endParaRPr lang="en-US"/>
           </a:p>
@@ -11650,7 +12252,7 @@
           <p:nvPr/>
         </p:nvPicPr>
         <p:blipFill>
-          <a:blip r:embed="rId2"/>
+          <a:blip r:embed="rId3"/>
           <a:stretch>
             <a:fillRect/>
           </a:stretch>

</xml_diff>